<commit_message>
Atualização dos slides para apresentação
</commit_message>
<xml_diff>
--- a/documentacao/G4_Apresentacao1sem2014.pptx
+++ b/documentacao/G4_Apresentacao1sem2014.pptx
@@ -230,7 +230,7 @@
             <a:fld id="{387DC7E4-63C1-42C9-AC56-2D8DD4349572}" type="datetimeFigureOut">
               <a:rPr lang="pt-BR" smtClean="0"/>
               <a:pPr/>
-              <a:t>24/03/2014</a:t>
+              <a:t>30/03/2014</a:t>
             </a:fld>
             <a:endParaRPr lang="pt-BR"/>
           </a:p>
@@ -306,7 +306,7 @@
     </p:spTree>
     <p:extLst>
       <p:ext uri="{BB962C8B-B14F-4D97-AF65-F5344CB8AC3E}">
-        <p14:creationId xmlns:p14="http://schemas.microsoft.com/office/powerpoint/2010/main" val="3690707936"/>
+        <p14:creationId xmlns:p14="http://schemas.microsoft.com/office/powerpoint/2010/main" xmlns="" val="3690707936"/>
       </p:ext>
     </p:extLst>
   </p:cSld>
@@ -620,7 +620,7 @@
     </p:spTree>
     <p:extLst>
       <p:ext uri="{BB962C8B-B14F-4D97-AF65-F5344CB8AC3E}">
-        <p14:creationId xmlns:p14="http://schemas.microsoft.com/office/powerpoint/2010/main" val="753547333"/>
+        <p14:creationId xmlns:p14="http://schemas.microsoft.com/office/powerpoint/2010/main" xmlns="" val="753547333"/>
       </p:ext>
     </p:extLst>
   </p:cSld>
@@ -4894,6 +4894,10 @@
           <a:bodyPr/>
           <a:lstStyle/>
           <a:p>
+            <a:r>
+              <a:rPr lang="pt-BR" dirty="0" smtClean="0"/>
+              <a:t>SISTEMA DE CLÍNICA DE EXAMES</a:t>
+            </a:r>
             <a:endParaRPr lang="pt-BR" dirty="0"/>
           </a:p>
         </p:txBody>
@@ -4915,8 +4919,21 @@
           <a:p>
             <a:r>
               <a:rPr lang="pt-BR" dirty="0" smtClean="0"/>
-              <a:t>Grupo x:  integrante 1</a:t>
-            </a:r>
+              <a:t>Grupo </a:t>
+            </a:r>
+            <a:r>
+              <a:rPr lang="pt-BR" dirty="0" smtClean="0"/>
+              <a:t>4:  Danilo </a:t>
+            </a:r>
+            <a:r>
+              <a:rPr lang="pt-BR" dirty="0" err="1" smtClean="0"/>
+              <a:t>Missio</a:t>
+            </a:r>
+            <a:r>
+              <a:rPr lang="pt-BR" dirty="0" smtClean="0"/>
+              <a:t>	</a:t>
+            </a:r>
+            <a:endParaRPr lang="pt-BR" dirty="0" smtClean="0"/>
           </a:p>
           <a:p>
             <a:r>
@@ -4925,8 +4942,13 @@
             </a:r>
             <a:r>
               <a:rPr lang="pt-BR" dirty="0" smtClean="0"/>
-              <a:t>               integrante 2</a:t>
-            </a:r>
+              <a:t>               </a:t>
+            </a:r>
+            <a:r>
+              <a:rPr lang="pt-BR" dirty="0" smtClean="0"/>
+              <a:t>Gabriel Piccolo</a:t>
+            </a:r>
+            <a:endParaRPr lang="pt-BR" dirty="0" smtClean="0"/>
           </a:p>
           <a:p>
             <a:r>
@@ -4935,8 +4957,13 @@
             </a:r>
             <a:r>
               <a:rPr lang="pt-BR" dirty="0" smtClean="0"/>
-              <a:t>               integrante 3</a:t>
-            </a:r>
+              <a:t>               </a:t>
+            </a:r>
+            <a:r>
+              <a:rPr lang="pt-BR" dirty="0" smtClean="0"/>
+              <a:t>Pedro Gimenez</a:t>
+            </a:r>
+            <a:endParaRPr lang="pt-BR" dirty="0" smtClean="0"/>
           </a:p>
           <a:p>
             <a:r>
@@ -4944,13 +4971,10 @@
               <a:t>                </a:t>
             </a:r>
             <a:r>
-              <a:rPr lang="pt-BR" dirty="0"/>
-              <a:t>integrante </a:t>
-            </a:r>
-            <a:r>
               <a:rPr lang="pt-BR" dirty="0" smtClean="0"/>
-              <a:t>4                  </a:t>
-            </a:r>
+              <a:t>Vinicius Romão</a:t>
+            </a:r>
+            <a:endParaRPr lang="pt-BR" dirty="0" smtClean="0"/>
           </a:p>
         </p:txBody>
       </p:sp>
@@ -4969,7 +4993,11 @@
           <a:bodyPr/>
           <a:lstStyle/>
           <a:p>
-            <a:endParaRPr lang="pt-BR"/>
+            <a:r>
+              <a:rPr lang="pt-BR" dirty="0" smtClean="0"/>
+              <a:t>31/03/2014</a:t>
+            </a:r>
+            <a:endParaRPr lang="pt-BR" dirty="0"/>
           </a:p>
         </p:txBody>
       </p:sp>
@@ -5105,13 +5133,18 @@
           <a:p>
             <a:r>
               <a:rPr lang="pt-BR" dirty="0" smtClean="0"/>
-              <a:t>Duas frases descrevendo o que o sistema faz.</a:t>
-            </a:r>
-          </a:p>
-          <a:p>
+              <a:t>Sistema para gerenciar uma clínica de exames e buscar praticidade para o paciente</a:t>
+            </a:r>
             <a:r>
               <a:rPr lang="pt-BR" dirty="0" smtClean="0"/>
-              <a:t>Identifique usuários para seu sistema</a:t>
+              <a:t>.</a:t>
+            </a:r>
+            <a:endParaRPr lang="pt-BR" dirty="0" smtClean="0"/>
+          </a:p>
+          <a:p>
+            <a:r>
+              <a:rPr lang="pt-BR" dirty="0" smtClean="0"/>
+              <a:t>Usuários: Paciente, Gestor e Administrador.</a:t>
             </a:r>
             <a:endParaRPr lang="pt-BR" dirty="0"/>
           </a:p>
@@ -5132,7 +5165,13 @@
           <a:bodyPr/>
           <a:lstStyle/>
           <a:p>
-            <a:endParaRPr lang="pt-BR"/>
+            <a:r>
+              <a:rPr lang="pt-BR" dirty="0" smtClean="0"/>
+              <a:t>31/03/2014</a:t>
+            </a:r>
+          </a:p>
+          <a:p>
+            <a:endParaRPr lang="pt-BR" dirty="0"/>
           </a:p>
         </p:txBody>
       </p:sp>
@@ -5247,12 +5286,12 @@
       </p:sp>
       <p:sp>
         <p:nvSpPr>
-          <p:cNvPr id="19459" name="Rectangle 3"/>
-          <p:cNvSpPr>
-            <a:spLocks noGrp="1" noChangeArrowheads="1"/>
-          </p:cNvSpPr>
-          <p:nvPr>
-            <p:ph type="body" idx="1"/>
+          <p:cNvPr id="6" name="Espaço Reservado para Data 5"/>
+          <p:cNvSpPr>
+            <a:spLocks noGrp="1"/>
+          </p:cNvSpPr>
+          <p:nvPr>
+            <p:ph type="dt" sz="half" idx="10"/>
           </p:nvPr>
         </p:nvSpPr>
         <p:spPr/>
@@ -5262,48 +5301,11 @@
           <a:p>
             <a:r>
               <a:rPr lang="pt-BR" dirty="0" smtClean="0"/>
-              <a:t>Apresente o diagrama de caso de uso de seu sistema</a:t>
-            </a:r>
-          </a:p>
-          <a:p>
-            <a:r>
-              <a:rPr lang="pt-BR" dirty="0" smtClean="0"/>
-              <a:t>Na apresentação ressalte as principais funcionalidades.</a:t>
-            </a:r>
-          </a:p>
-          <a:p>
-            <a:r>
-              <a:rPr lang="pt-BR" dirty="0" smtClean="0"/>
-              <a:t>Ressalte os que serão implementados</a:t>
-            </a:r>
-          </a:p>
-          <a:p>
-            <a:r>
-              <a:rPr lang="pt-BR" dirty="0" smtClean="0"/>
-              <a:t>Legível</a:t>
+              <a:t>31/03/2014</a:t>
             </a:r>
           </a:p>
           <a:p>
             <a:endParaRPr lang="pt-BR" dirty="0"/>
-          </a:p>
-        </p:txBody>
-      </p:sp>
-      <p:sp>
-        <p:nvSpPr>
-          <p:cNvPr id="6" name="Espaço Reservado para Data 5"/>
-          <p:cNvSpPr>
-            <a:spLocks noGrp="1"/>
-          </p:cNvSpPr>
-          <p:nvPr>
-            <p:ph type="dt" sz="half" idx="10"/>
-          </p:nvPr>
-        </p:nvSpPr>
-        <p:spPr/>
-        <p:txBody>
-          <a:bodyPr/>
-          <a:lstStyle/>
-          <a:p>
-            <a:endParaRPr lang="pt-BR"/>
           </a:p>
         </p:txBody>
       </p:sp>
@@ -5358,6 +5360,32 @@
           </a:p>
         </p:txBody>
       </p:sp>
+      <p:pic>
+        <p:nvPicPr>
+          <p:cNvPr id="1027" name="Picture 3" descr="C:\Users\'\Desktop\Diagrama casos de uso.png"/>
+          <p:cNvPicPr>
+            <a:picLocks noChangeAspect="1" noChangeArrowheads="1"/>
+          </p:cNvPicPr>
+          <p:nvPr/>
+        </p:nvPicPr>
+        <p:blipFill>
+          <a:blip r:embed="rId2"/>
+          <a:srcRect/>
+          <a:stretch>
+            <a:fillRect/>
+          </a:stretch>
+        </p:blipFill>
+        <p:spPr bwMode="auto">
+          <a:xfrm>
+            <a:off x="2643174" y="1571612"/>
+            <a:ext cx="4063953" cy="4572032"/>
+          </a:xfrm>
+          <a:prstGeom prst="rect">
+            <a:avLst/>
+          </a:prstGeom>
+          <a:noFill/>
+        </p:spPr>
+      </p:pic>
     </p:spTree>
   </p:cSld>
   <p:clrMapOvr>
@@ -5418,12 +5446,12 @@
       </p:sp>
       <p:sp>
         <p:nvSpPr>
-          <p:cNvPr id="3" name="Espaço Reservado para Conteúdo 2"/>
-          <p:cNvSpPr>
-            <a:spLocks noGrp="1"/>
-          </p:cNvSpPr>
-          <p:nvPr>
-            <p:ph idx="1"/>
+          <p:cNvPr id="4" name="Espaço Reservado para Data 3"/>
+          <p:cNvSpPr>
+            <a:spLocks noGrp="1"/>
+          </p:cNvSpPr>
+          <p:nvPr>
+            <p:ph type="dt" sz="half" idx="10"/>
           </p:nvPr>
         </p:nvSpPr>
         <p:spPr/>
@@ -5431,26 +5459,13 @@
           <a:bodyPr/>
           <a:lstStyle/>
           <a:p>
+            <a:r>
+              <a:rPr lang="pt-BR" dirty="0" smtClean="0"/>
+              <a:t>31/03/2014</a:t>
+            </a:r>
+          </a:p>
+          <a:p>
             <a:endParaRPr lang="pt-BR" dirty="0"/>
-          </a:p>
-        </p:txBody>
-      </p:sp>
-      <p:sp>
-        <p:nvSpPr>
-          <p:cNvPr id="4" name="Espaço Reservado para Data 3"/>
-          <p:cNvSpPr>
-            <a:spLocks noGrp="1"/>
-          </p:cNvSpPr>
-          <p:nvPr>
-            <p:ph type="dt" sz="half" idx="10"/>
-          </p:nvPr>
-        </p:nvSpPr>
-        <p:spPr/>
-        <p:txBody>
-          <a:bodyPr/>
-          <a:lstStyle/>
-          <a:p>
-            <a:endParaRPr lang="pt-BR"/>
           </a:p>
         </p:txBody>
       </p:sp>
@@ -5501,16 +5516,49 @@
           </a:p>
         </p:txBody>
       </p:sp>
+      <p:pic>
+        <p:nvPicPr>
+          <p:cNvPr id="2052" name="Picture 4" descr="C:\Users\'\Desktop\Capturar.PNG"/>
+          <p:cNvPicPr>
+            <a:picLocks noChangeAspect="1" noChangeArrowheads="1"/>
+          </p:cNvPicPr>
+          <p:nvPr/>
+        </p:nvPicPr>
+        <p:blipFill>
+          <a:blip r:embed="rId2"/>
+          <a:srcRect/>
+          <a:stretch>
+            <a:fillRect/>
+          </a:stretch>
+        </p:blipFill>
+        <p:spPr bwMode="auto">
+          <a:xfrm>
+            <a:off x="1571604" y="1500174"/>
+            <a:ext cx="6088063" cy="4600575"/>
+          </a:xfrm>
+          <a:prstGeom prst="rect">
+            <a:avLst/>
+          </a:prstGeom>
+          <a:noFill/>
+        </p:spPr>
+      </p:pic>
     </p:spTree>
     <p:extLst>
       <p:ext uri="{BB962C8B-B14F-4D97-AF65-F5344CB8AC3E}">
-        <p14:creationId xmlns:p14="http://schemas.microsoft.com/office/powerpoint/2010/main" val="2898236993"/>
+        <p14:creationId xmlns:p14="http://schemas.microsoft.com/office/powerpoint/2010/main" xmlns="" val="2898236993"/>
       </p:ext>
     </p:extLst>
   </p:cSld>
   <p:clrMapOvr>
     <a:masterClrMapping/>
   </p:clrMapOvr>
+  <p:timing>
+    <p:tnLst>
+      <p:par>
+        <p:cTn id="1" dur="indefinite" restart="never" nodeType="tmRoot"/>
+      </p:par>
+    </p:tnLst>
+  </p:timing>
 </p:sld>
 </file>
 
@@ -5571,7 +5619,7 @@
           <a:p>
             <a:r>
               <a:rPr lang="pt-BR" dirty="0" smtClean="0"/>
-              <a:t>Ressalte os resultados alcançados e futuras expansões.</a:t>
+              <a:t>Praticidade para o paciente e organização gerencial da clínica. </a:t>
             </a:r>
             <a:endParaRPr lang="pt-BR" dirty="0"/>
           </a:p>
@@ -5592,7 +5640,11 @@
           <a:bodyPr/>
           <a:lstStyle/>
           <a:p>
-            <a:endParaRPr lang="pt-BR"/>
+            <a:r>
+              <a:rPr lang="pt-BR" dirty="0" smtClean="0"/>
+              <a:t>31/03/2014</a:t>
+            </a:r>
+            <a:endParaRPr lang="pt-BR" dirty="0"/>
           </a:p>
         </p:txBody>
       </p:sp>

</xml_diff>

<commit_message>
Atualização do slide para apresentação
</commit_message>
<xml_diff>
--- a/documentacao/G4_Apresentacao1sem2014.pptx
+++ b/documentacao/G4_Apresentacao1sem2014.pptx
@@ -230,7 +230,7 @@
             <a:fld id="{387DC7E4-63C1-42C9-AC56-2D8DD4349572}" type="datetimeFigureOut">
               <a:rPr lang="pt-BR" smtClean="0"/>
               <a:pPr/>
-              <a:t>30/03/2014</a:t>
+              <a:t>31/03/2014</a:t>
             </a:fld>
             <a:endParaRPr lang="pt-BR"/>
           </a:p>
@@ -306,7 +306,7 @@
     </p:spTree>
     <p:extLst>
       <p:ext uri="{BB962C8B-B14F-4D97-AF65-F5344CB8AC3E}">
-        <p14:creationId xmlns:p14="http://schemas.microsoft.com/office/powerpoint/2010/main" xmlns="" val="3690707936"/>
+        <p14:creationId xmlns:p14="http://schemas.microsoft.com/office/powerpoint/2010/main" val="3690707936"/>
       </p:ext>
     </p:extLst>
   </p:cSld>
@@ -620,7 +620,7 @@
     </p:spTree>
     <p:extLst>
       <p:ext uri="{BB962C8B-B14F-4D97-AF65-F5344CB8AC3E}">
-        <p14:creationId xmlns:p14="http://schemas.microsoft.com/office/powerpoint/2010/main" xmlns="" val="753547333"/>
+        <p14:creationId xmlns:p14="http://schemas.microsoft.com/office/powerpoint/2010/main" val="753547333"/>
       </p:ext>
     </p:extLst>
   </p:cSld>
@@ -4919,11 +4919,7 @@
           <a:p>
             <a:r>
               <a:rPr lang="pt-BR" dirty="0" smtClean="0"/>
-              <a:t>Grupo </a:t>
-            </a:r>
-            <a:r>
-              <a:rPr lang="pt-BR" dirty="0" smtClean="0"/>
-              <a:t>4:  Danilo </a:t>
+              <a:t>Grupo 4:  Danilo </a:t>
             </a:r>
             <a:r>
               <a:rPr lang="pt-BR" dirty="0" err="1" smtClean="0"/>
@@ -4933,7 +4929,6 @@
               <a:rPr lang="pt-BR" dirty="0" smtClean="0"/>
               <a:t>	</a:t>
             </a:r>
-            <a:endParaRPr lang="pt-BR" dirty="0" smtClean="0"/>
           </a:p>
           <a:p>
             <a:r>
@@ -4942,13 +4937,8 @@
             </a:r>
             <a:r>
               <a:rPr lang="pt-BR" dirty="0" smtClean="0"/>
-              <a:t>               </a:t>
-            </a:r>
-            <a:r>
-              <a:rPr lang="pt-BR" dirty="0" smtClean="0"/>
-              <a:t>Gabriel Piccolo</a:t>
-            </a:r>
-            <a:endParaRPr lang="pt-BR" dirty="0" smtClean="0"/>
+              <a:t>               Gabriel Piccolo</a:t>
+            </a:r>
           </a:p>
           <a:p>
             <a:r>
@@ -4957,24 +4947,14 @@
             </a:r>
             <a:r>
               <a:rPr lang="pt-BR" dirty="0" smtClean="0"/>
-              <a:t>               </a:t>
-            </a:r>
+              <a:t>               Pedro Gimenez</a:t>
+            </a:r>
+          </a:p>
+          <a:p>
             <a:r>
               <a:rPr lang="pt-BR" dirty="0" smtClean="0"/>
-              <a:t>Pedro Gimenez</a:t>
-            </a:r>
-            <a:endParaRPr lang="pt-BR" dirty="0" smtClean="0"/>
-          </a:p>
-          <a:p>
-            <a:r>
-              <a:rPr lang="pt-BR" dirty="0" smtClean="0"/>
-              <a:t>                </a:t>
-            </a:r>
-            <a:r>
-              <a:rPr lang="pt-BR" dirty="0" smtClean="0"/>
-              <a:t>Vinicius Romão</a:t>
-            </a:r>
-            <a:endParaRPr lang="pt-BR" dirty="0" smtClean="0"/>
+              <a:t>                Vinicius Romão</a:t>
+            </a:r>
           </a:p>
         </p:txBody>
       </p:sp>
@@ -5133,13 +5113,8 @@
           <a:p>
             <a:r>
               <a:rPr lang="pt-BR" dirty="0" smtClean="0"/>
-              <a:t>Sistema para gerenciar uma clínica de exames e buscar praticidade para o paciente</a:t>
-            </a:r>
-            <a:r>
-              <a:rPr lang="pt-BR" dirty="0" smtClean="0"/>
-              <a:t>.</a:t>
-            </a:r>
-            <a:endParaRPr lang="pt-BR" dirty="0" smtClean="0"/>
+              <a:t>Sistema para gerenciar uma clínica de exames e buscar praticidade para o paciente.</a:t>
+            </a:r>
           </a:p>
           <a:p>
             <a:r>
@@ -5534,7 +5509,7 @@
         <p:spPr bwMode="auto">
           <a:xfrm>
             <a:off x="1571604" y="1500174"/>
-            <a:ext cx="6088063" cy="4600575"/>
+            <a:ext cx="6240756" cy="4600575"/>
           </a:xfrm>
           <a:prstGeom prst="rect">
             <a:avLst/>
@@ -5545,7 +5520,7 @@
     </p:spTree>
     <p:extLst>
       <p:ext uri="{BB962C8B-B14F-4D97-AF65-F5344CB8AC3E}">
-        <p14:creationId xmlns:p14="http://schemas.microsoft.com/office/powerpoint/2010/main" xmlns="" val="2898236993"/>
+        <p14:creationId xmlns:p14="http://schemas.microsoft.com/office/powerpoint/2010/main" val="2898236993"/>
       </p:ext>
     </p:extLst>
   </p:cSld>
@@ -5620,6 +5595,26 @@
             <a:r>
               <a:rPr lang="pt-BR" dirty="0" smtClean="0"/>
               <a:t>Praticidade para o paciente e organização gerencial da clínica. </a:t>
+            </a:r>
+          </a:p>
+          <a:p>
+            <a:r>
+              <a:rPr lang="pt-BR" dirty="0" smtClean="0"/>
+              <a:t>Ajustar o website da clínica para dispositivos mobile.</a:t>
+            </a:r>
+          </a:p>
+          <a:p>
+            <a:r>
+              <a:rPr lang="pt-BR" dirty="0" smtClean="0"/>
+              <a:t>Em um futuro</a:t>
+            </a:r>
+            <a:r>
+              <a:rPr lang="pt-BR" smtClean="0"/>
+              <a:t>, poderá </a:t>
+            </a:r>
+            <a:r>
+              <a:rPr lang="pt-BR" dirty="0" smtClean="0"/>
+              <a:t>ser acrescentado um sistema de agendamento de exames online no website da clínica, sempre buscando o máximo de facilidade para o paciente.</a:t>
             </a:r>
             <a:endParaRPr lang="pt-BR" dirty="0"/>
           </a:p>

</xml_diff>

<commit_message>
Reposicionamento do diagrama de caso de uso para apresentação.
</commit_message>
<xml_diff>
--- a/documentacao/G4_Apresentacao1sem2014.pptx
+++ b/documentacao/G4_Apresentacao1sem2014.pptx
@@ -5,17 +5,18 @@
     <p:sldMasterId id="2147483657" r:id="rId1"/>
   </p:sldMasterIdLst>
   <p:notesMasterIdLst>
-    <p:notesMasterId r:id="rId7"/>
+    <p:notesMasterId r:id="rId8"/>
   </p:notesMasterIdLst>
   <p:handoutMasterIdLst>
-    <p:handoutMasterId r:id="rId8"/>
+    <p:handoutMasterId r:id="rId9"/>
   </p:handoutMasterIdLst>
   <p:sldIdLst>
     <p:sldId id="256" r:id="rId2"/>
     <p:sldId id="258" r:id="rId3"/>
-    <p:sldId id="259" r:id="rId4"/>
-    <p:sldId id="264" r:id="rId5"/>
-    <p:sldId id="263" r:id="rId6"/>
+    <p:sldId id="265" r:id="rId4"/>
+    <p:sldId id="266" r:id="rId5"/>
+    <p:sldId id="264" r:id="rId6"/>
+    <p:sldId id="263" r:id="rId7"/>
   </p:sldIdLst>
   <p:sldSz cx="9144000" cy="6858000" type="screen4x3"/>
   <p:notesSz cx="7010400" cy="9296400"/>
@@ -5337,14 +5338,20 @@
       </p:sp>
       <p:pic>
         <p:nvPicPr>
-          <p:cNvPr id="1027" name="Picture 3" descr="C:\Users\'\Desktop\Diagrama casos de uso.png"/>
+          <p:cNvPr id="2" name="Picture 3" descr="C:\Users\42207662861\Desktop\tab1.png"/>
           <p:cNvPicPr>
             <a:picLocks noChangeAspect="1" noChangeArrowheads="1"/>
           </p:cNvPicPr>
           <p:nvPr/>
         </p:nvPicPr>
         <p:blipFill>
-          <a:blip r:embed="rId2"/>
+          <a:blip r:embed="rId2">
+            <a:extLst>
+              <a:ext uri="{28A0092B-C50C-407E-A947-70E740481C1C}">
+                <a14:useLocalDpi xmlns:a14="http://schemas.microsoft.com/office/drawing/2010/main" val="0"/>
+              </a:ext>
+            </a:extLst>
+          </a:blip>
           <a:srcRect/>
           <a:stretch>
             <a:fillRect/>
@@ -5352,16 +5359,30 @@
         </p:blipFill>
         <p:spPr bwMode="auto">
           <a:xfrm>
-            <a:off x="2643174" y="1571612"/>
-            <a:ext cx="4063953" cy="4572032"/>
+            <a:off x="251519" y="2305134"/>
+            <a:ext cx="8833585" cy="2996074"/>
           </a:xfrm>
           <a:prstGeom prst="rect">
             <a:avLst/>
           </a:prstGeom>
           <a:noFill/>
+          <a:extLst>
+            <a:ext uri="{909E8E84-426E-40DD-AFC4-6F175D3DCCD1}">
+              <a14:hiddenFill xmlns:a14="http://schemas.microsoft.com/office/drawing/2010/main">
+                <a:solidFill>
+                  <a:srgbClr val="FFFFFF"/>
+                </a:solidFill>
+              </a14:hiddenFill>
+            </a:ext>
+          </a:extLst>
         </p:spPr>
       </p:pic>
     </p:spTree>
+    <p:extLst>
+      <p:ext uri="{BB962C8B-B14F-4D97-AF65-F5344CB8AC3E}">
+        <p14:creationId xmlns:p14="http://schemas.microsoft.com/office/powerpoint/2010/main" val="3867898359"/>
+      </p:ext>
+    </p:extLst>
   </p:cSld>
   <p:clrMapOvr>
     <a:masterClrMapping/>
@@ -5398,6 +5419,186 @@
       </p:grpSpPr>
       <p:sp>
         <p:nvSpPr>
+          <p:cNvPr id="19458" name="Rectangle 2"/>
+          <p:cNvSpPr>
+            <a:spLocks noGrp="1" noChangeArrowheads="1"/>
+          </p:cNvSpPr>
+          <p:nvPr>
+            <p:ph type="title"/>
+          </p:nvPr>
+        </p:nvSpPr>
+        <p:spPr/>
+        <p:txBody>
+          <a:bodyPr/>
+          <a:lstStyle/>
+          <a:p>
+            <a:r>
+              <a:rPr lang="pt-BR" dirty="0" smtClean="0"/>
+              <a:t>Diagrama Caso Uso</a:t>
+            </a:r>
+            <a:endParaRPr lang="pt-BR" dirty="0"/>
+          </a:p>
+        </p:txBody>
+      </p:sp>
+      <p:sp>
+        <p:nvSpPr>
+          <p:cNvPr id="6" name="Espaço Reservado para Data 5"/>
+          <p:cNvSpPr>
+            <a:spLocks noGrp="1"/>
+          </p:cNvSpPr>
+          <p:nvPr>
+            <p:ph type="dt" sz="half" idx="10"/>
+          </p:nvPr>
+        </p:nvSpPr>
+        <p:spPr/>
+        <p:txBody>
+          <a:bodyPr/>
+          <a:lstStyle/>
+          <a:p>
+            <a:r>
+              <a:rPr lang="pt-BR" dirty="0" smtClean="0"/>
+              <a:t>31/03/2014</a:t>
+            </a:r>
+          </a:p>
+          <a:p>
+            <a:endParaRPr lang="pt-BR" dirty="0"/>
+          </a:p>
+        </p:txBody>
+      </p:sp>
+      <p:sp>
+        <p:nvSpPr>
+          <p:cNvPr id="7" name="Espaço Reservado para Número de Slide 6"/>
+          <p:cNvSpPr>
+            <a:spLocks noGrp="1"/>
+          </p:cNvSpPr>
+          <p:nvPr>
+            <p:ph type="sldNum" sz="quarter" idx="12"/>
+          </p:nvPr>
+        </p:nvSpPr>
+        <p:spPr/>
+        <p:txBody>
+          <a:bodyPr/>
+          <a:lstStyle/>
+          <a:p>
+            <a:fld id="{516476CB-12D4-456A-BCEE-8469A8C40045}" type="slidenum">
+              <a:rPr lang="pt-BR" smtClean="0"/>
+              <a:pPr/>
+              <a:t>4</a:t>
+            </a:fld>
+            <a:endParaRPr lang="pt-BR" dirty="0"/>
+          </a:p>
+        </p:txBody>
+      </p:sp>
+      <p:sp>
+        <p:nvSpPr>
+          <p:cNvPr id="8" name="Espaço Reservado para Rodapé 7"/>
+          <p:cNvSpPr>
+            <a:spLocks noGrp="1"/>
+          </p:cNvSpPr>
+          <p:nvPr>
+            <p:ph type="ftr" sz="quarter" idx="11"/>
+          </p:nvPr>
+        </p:nvSpPr>
+        <p:spPr/>
+        <p:txBody>
+          <a:bodyPr/>
+          <a:lstStyle/>
+          <a:p>
+            <a:r>
+              <a:rPr lang="pt-BR" dirty="0" err="1" smtClean="0"/>
+              <a:t>Veris</a:t>
+            </a:r>
+            <a:r>
+              <a:rPr lang="pt-BR" dirty="0" smtClean="0"/>
+              <a:t> Faculdades TCM/3ADS</a:t>
+            </a:r>
+            <a:endParaRPr lang="pt-BR" dirty="0"/>
+          </a:p>
+        </p:txBody>
+      </p:sp>
+      <p:pic>
+        <p:nvPicPr>
+          <p:cNvPr id="2050" name="Picture 2" descr="C:\Users\42207662861\Desktop\tab2.png"/>
+          <p:cNvPicPr>
+            <a:picLocks noChangeAspect="1" noChangeArrowheads="1"/>
+          </p:cNvPicPr>
+          <p:nvPr/>
+        </p:nvPicPr>
+        <p:blipFill>
+          <a:blip r:embed="rId2">
+            <a:extLst>
+              <a:ext uri="{28A0092B-C50C-407E-A947-70E740481C1C}">
+                <a14:useLocalDpi xmlns:a14="http://schemas.microsoft.com/office/drawing/2010/main" val="0"/>
+              </a:ext>
+            </a:extLst>
+          </a:blip>
+          <a:srcRect/>
+          <a:stretch>
+            <a:fillRect/>
+          </a:stretch>
+        </p:blipFill>
+        <p:spPr bwMode="auto">
+          <a:xfrm>
+            <a:off x="2122058" y="1611683"/>
+            <a:ext cx="5040560" cy="4413332"/>
+          </a:xfrm>
+          <a:prstGeom prst="rect">
+            <a:avLst/>
+          </a:prstGeom>
+          <a:noFill/>
+          <a:extLst>
+            <a:ext uri="{909E8E84-426E-40DD-AFC4-6F175D3DCCD1}">
+              <a14:hiddenFill xmlns:a14="http://schemas.microsoft.com/office/drawing/2010/main">
+                <a:solidFill>
+                  <a:srgbClr val="FFFFFF"/>
+                </a:solidFill>
+              </a14:hiddenFill>
+            </a:ext>
+          </a:extLst>
+        </p:spPr>
+      </p:pic>
+    </p:spTree>
+    <p:extLst>
+      <p:ext uri="{BB962C8B-B14F-4D97-AF65-F5344CB8AC3E}">
+        <p14:creationId xmlns:p14="http://schemas.microsoft.com/office/powerpoint/2010/main" val="3412004320"/>
+      </p:ext>
+    </p:extLst>
+  </p:cSld>
+  <p:clrMapOvr>
+    <a:masterClrMapping/>
+  </p:clrMapOvr>
+  <p:transition spd="med">
+    <p:fade/>
+  </p:transition>
+  <p:timing>
+    <p:tnLst>
+      <p:par>
+        <p:cTn id="1" dur="indefinite" restart="never" nodeType="tmRoot"/>
+      </p:par>
+    </p:tnLst>
+  </p:timing>
+</p:sld>
+</file>
+
+<file path=ppt/slides/slide5.xml><?xml version="1.0" encoding="utf-8"?>
+<p:sld xmlns:a="http://schemas.openxmlformats.org/drawingml/2006/main" xmlns:r="http://schemas.openxmlformats.org/officeDocument/2006/relationships" xmlns:p="http://schemas.openxmlformats.org/presentationml/2006/main">
+  <p:cSld>
+    <p:spTree>
+      <p:nvGrpSpPr>
+        <p:cNvPr id="1" name=""/>
+        <p:cNvGrpSpPr/>
+        <p:nvPr/>
+      </p:nvGrpSpPr>
+      <p:grpSpPr>
+        <a:xfrm>
+          <a:off x="0" y="0"/>
+          <a:ext cx="0" cy="0"/>
+          <a:chOff x="0" y="0"/>
+          <a:chExt cx="0" cy="0"/>
+        </a:xfrm>
+      </p:grpSpPr>
+      <p:sp>
+        <p:nvSpPr>
           <p:cNvPr id="2" name="Título 1"/>
           <p:cNvSpPr>
             <a:spLocks noGrp="1"/>
@@ -5485,7 +5686,7 @@
             <a:fld id="{516476CB-12D4-456A-BCEE-8469A8C40045}" type="slidenum">
               <a:rPr lang="pt-BR" smtClean="0"/>
               <a:pPr/>
-              <a:t>4</a:t>
+              <a:t>5</a:t>
             </a:fld>
             <a:endParaRPr lang="pt-BR"/>
           </a:p>
@@ -5537,7 +5738,7 @@
 </p:sld>
 </file>
 
-<file path=ppt/slides/slide5.xml><?xml version="1.0" encoding="utf-8"?>
+<file path=ppt/slides/slide6.xml><?xml version="1.0" encoding="utf-8"?>
 <p:sld xmlns:a="http://schemas.openxmlformats.org/drawingml/2006/main" xmlns:r="http://schemas.openxmlformats.org/officeDocument/2006/relationships" xmlns:p="http://schemas.openxmlformats.org/presentationml/2006/main">
   <p:cSld>
     <p:spTree>
@@ -5647,7 +5848,7 @@
             <a:fld id="{516476CB-12D4-456A-BCEE-8469A8C40045}" type="slidenum">
               <a:rPr lang="pt-BR" smtClean="0"/>
               <a:pPr/>
-              <a:t>5</a:t>
+              <a:t>6</a:t>
             </a:fld>
             <a:endParaRPr lang="pt-BR" dirty="0"/>
           </a:p>

</xml_diff>

<commit_message>
Atualização dos slides de diagrama de caso de uso e escopo.
</commit_message>
<xml_diff>
--- a/documentacao/G4_Apresentacao1sem2014.pptx
+++ b/documentacao/G4_Apresentacao1sem2014.pptx
@@ -5,18 +5,20 @@
     <p:sldMasterId id="2147483657" r:id="rId1"/>
   </p:sldMasterIdLst>
   <p:notesMasterIdLst>
-    <p:notesMasterId r:id="rId8"/>
+    <p:notesMasterId r:id="rId10"/>
   </p:notesMasterIdLst>
   <p:handoutMasterIdLst>
-    <p:handoutMasterId r:id="rId9"/>
+    <p:handoutMasterId r:id="rId11"/>
   </p:handoutMasterIdLst>
   <p:sldIdLst>
     <p:sldId id="256" r:id="rId2"/>
     <p:sldId id="258" r:id="rId3"/>
     <p:sldId id="265" r:id="rId4"/>
-    <p:sldId id="266" r:id="rId5"/>
-    <p:sldId id="264" r:id="rId6"/>
-    <p:sldId id="263" r:id="rId7"/>
+    <p:sldId id="267" r:id="rId5"/>
+    <p:sldId id="266" r:id="rId6"/>
+    <p:sldId id="264" r:id="rId7"/>
+    <p:sldId id="268" r:id="rId8"/>
+    <p:sldId id="263" r:id="rId9"/>
   </p:sldIdLst>
   <p:sldSz cx="9144000" cy="6858000" type="screen4x3"/>
   <p:notesSz cx="7010400" cy="9296400"/>
@@ -145,6 +147,36 @@
       </a:defRPr>
     </a:lvl9pPr>
   </p:defaultTextStyle>
+  <p:extLst>
+    <p:ext uri="{EFAFB233-063F-42B5-8137-9DF3F51BA10A}">
+      <p15:sldGuideLst xmlns:p15="http://schemas.microsoft.com/office/powerpoint/2012/main">
+        <p15:guide id="1" orient="horz" pos="2160">
+          <p15:clr>
+            <a:srgbClr val="A4A3A4"/>
+          </p15:clr>
+        </p15:guide>
+        <p15:guide id="2" pos="2880">
+          <p15:clr>
+            <a:srgbClr val="A4A3A4"/>
+          </p15:clr>
+        </p15:guide>
+      </p15:sldGuideLst>
+    </p:ext>
+    <p:ext uri="{2D200454-40CA-4A62-9FC3-DE9A4176ACB9}">
+      <p15:notesGuideLst xmlns:p15="http://schemas.microsoft.com/office/powerpoint/2012/main">
+        <p15:guide id="1" orient="horz" pos="2928">
+          <p15:clr>
+            <a:srgbClr val="A4A3A4"/>
+          </p15:clr>
+        </p15:guide>
+        <p15:guide id="2" pos="2208">
+          <p15:clr>
+            <a:srgbClr val="A4A3A4"/>
+          </p15:clr>
+        </p15:guide>
+      </p15:notesGuideLst>
+    </p:ext>
+  </p:extLst>
 </p:presentation>
 </file>
 
@@ -231,7 +263,7 @@
             <a:fld id="{387DC7E4-63C1-42C9-AC56-2D8DD4349572}" type="datetimeFigureOut">
               <a:rPr lang="pt-BR" smtClean="0"/>
               <a:pPr/>
-              <a:t>31/03/2014</a:t>
+              <a:t>01/04/2014</a:t>
             </a:fld>
             <a:endParaRPr lang="pt-BR"/>
           </a:p>
@@ -828,6 +860,11 @@
         </p:txBody>
       </p:sp>
     </p:spTree>
+    <p:extLst>
+      <p:ext uri="{BB962C8B-B14F-4D97-AF65-F5344CB8AC3E}">
+        <p14:creationId xmlns:p14="http://schemas.microsoft.com/office/powerpoint/2010/main" val="552911737"/>
+      </p:ext>
+    </p:extLst>
   </p:cSld>
   <p:clrMapOvr>
     <a:masterClrMapping/>
@@ -5518,9 +5555,9 @@
       </p:sp>
       <p:pic>
         <p:nvPicPr>
-          <p:cNvPr id="2050" name="Picture 2" descr="C:\Users\42207662861\Desktop\tab2.png"/>
+          <p:cNvPr id="3" name="Imagem 2"/>
           <p:cNvPicPr>
-            <a:picLocks noChangeAspect="1" noChangeArrowheads="1"/>
+            <a:picLocks noChangeAspect="1"/>
           </p:cNvPicPr>
           <p:nvPr/>
         </p:nvPicPr>
@@ -5532,35 +5569,24 @@
               </a:ext>
             </a:extLst>
           </a:blip>
-          <a:srcRect/>
           <a:stretch>
             <a:fillRect/>
           </a:stretch>
         </p:blipFill>
-        <p:spPr bwMode="auto">
+        <p:spPr>
           <a:xfrm>
-            <a:off x="2122058" y="1611683"/>
-            <a:ext cx="5040560" cy="4413332"/>
+            <a:off x="1907704" y="1478529"/>
+            <a:ext cx="5468181" cy="4769871"/>
           </a:xfrm>
           <a:prstGeom prst="rect">
             <a:avLst/>
           </a:prstGeom>
-          <a:noFill/>
-          <a:extLst>
-            <a:ext uri="{909E8E84-426E-40DD-AFC4-6F175D3DCCD1}">
-              <a14:hiddenFill xmlns:a14="http://schemas.microsoft.com/office/drawing/2010/main">
-                <a:solidFill>
-                  <a:srgbClr val="FFFFFF"/>
-                </a:solidFill>
-              </a14:hiddenFill>
-            </a:ext>
-          </a:extLst>
         </p:spPr>
       </p:pic>
     </p:spTree>
     <p:extLst>
       <p:ext uri="{BB962C8B-B14F-4D97-AF65-F5344CB8AC3E}">
-        <p14:creationId xmlns:p14="http://schemas.microsoft.com/office/powerpoint/2010/main" val="3412004320"/>
+        <p14:creationId xmlns:p14="http://schemas.microsoft.com/office/powerpoint/2010/main" val="1403961185"/>
       </p:ext>
     </p:extLst>
   </p:cSld>
@@ -5599,9 +5625,9 @@
       </p:grpSpPr>
       <p:sp>
         <p:nvSpPr>
-          <p:cNvPr id="2" name="Título 1"/>
-          <p:cNvSpPr>
-            <a:spLocks noGrp="1"/>
+          <p:cNvPr id="19458" name="Rectangle 2"/>
+          <p:cNvSpPr>
+            <a:spLocks noGrp="1" noChangeArrowheads="1"/>
           </p:cNvSpPr>
           <p:nvPr>
             <p:ph type="title"/>
@@ -5614,7 +5640,7 @@
           <a:p>
             <a:r>
               <a:rPr lang="pt-BR" dirty="0" smtClean="0"/>
-              <a:t>Escopo do Sistema</a:t>
+              <a:t>Diagrama Caso Uso</a:t>
             </a:r>
             <a:endParaRPr lang="pt-BR" dirty="0"/>
           </a:p>
@@ -5622,7 +5648,7 @@
       </p:sp>
       <p:sp>
         <p:nvSpPr>
-          <p:cNvPr id="4" name="Espaço Reservado para Data 3"/>
+          <p:cNvPr id="6" name="Espaço Reservado para Data 5"/>
           <p:cNvSpPr>
             <a:spLocks noGrp="1"/>
           </p:cNvSpPr>
@@ -5647,30 +5673,7 @@
       </p:sp>
       <p:sp>
         <p:nvSpPr>
-          <p:cNvPr id="5" name="Espaço Reservado para Rodapé 4"/>
-          <p:cNvSpPr>
-            <a:spLocks noGrp="1"/>
-          </p:cNvSpPr>
-          <p:nvPr>
-            <p:ph type="ftr" sz="quarter" idx="11"/>
-          </p:nvPr>
-        </p:nvSpPr>
-        <p:spPr/>
-        <p:txBody>
-          <a:bodyPr/>
-          <a:lstStyle/>
-          <a:p>
-            <a:r>
-              <a:rPr lang="pt-BR" smtClean="0"/>
-              <a:t>Veris Faculdades TCM/3ADS</a:t>
-            </a:r>
-            <a:endParaRPr lang="pt-BR" dirty="0"/>
-          </a:p>
-        </p:txBody>
-      </p:sp>
-      <p:sp>
-        <p:nvSpPr>
-          <p:cNvPr id="6" name="Espaço Reservado para Número de Slide 5"/>
+          <p:cNvPr id="7" name="Espaço Reservado para Número de Slide 6"/>
           <p:cNvSpPr>
             <a:spLocks noGrp="1"/>
           </p:cNvSpPr>
@@ -5688,46 +5691,147 @@
               <a:pPr/>
               <a:t>5</a:t>
             </a:fld>
-            <a:endParaRPr lang="pt-BR"/>
+            <a:endParaRPr lang="pt-BR" dirty="0"/>
+          </a:p>
+        </p:txBody>
+      </p:sp>
+      <p:sp>
+        <p:nvSpPr>
+          <p:cNvPr id="8" name="Espaço Reservado para Rodapé 7"/>
+          <p:cNvSpPr>
+            <a:spLocks noGrp="1"/>
+          </p:cNvSpPr>
+          <p:nvPr>
+            <p:ph type="ftr" sz="quarter" idx="11"/>
+          </p:nvPr>
+        </p:nvSpPr>
+        <p:spPr/>
+        <p:txBody>
+          <a:bodyPr/>
+          <a:lstStyle/>
+          <a:p>
+            <a:r>
+              <a:rPr lang="pt-BR" dirty="0" err="1" smtClean="0"/>
+              <a:t>Veris</a:t>
+            </a:r>
+            <a:r>
+              <a:rPr lang="pt-BR" dirty="0" smtClean="0"/>
+              <a:t> Faculdades TCM/3ADS</a:t>
+            </a:r>
+            <a:endParaRPr lang="pt-BR" dirty="0"/>
           </a:p>
         </p:txBody>
       </p:sp>
       <p:pic>
         <p:nvPicPr>
-          <p:cNvPr id="2052" name="Picture 4" descr="C:\Users\'\Desktop\Capturar.PNG"/>
+          <p:cNvPr id="2" name="Imagem 1"/>
           <p:cNvPicPr>
-            <a:picLocks noChangeAspect="1" noChangeArrowheads="1"/>
+            <a:picLocks noChangeAspect="1"/>
           </p:cNvPicPr>
           <p:nvPr/>
         </p:nvPicPr>
         <p:blipFill>
-          <a:blip r:embed="rId2"/>
-          <a:srcRect/>
+          <a:blip r:embed="rId2">
+            <a:extLst>
+              <a:ext uri="{28A0092B-C50C-407E-A947-70E740481C1C}">
+                <a14:useLocalDpi xmlns:a14="http://schemas.microsoft.com/office/drawing/2010/main" val="0"/>
+              </a:ext>
+            </a:extLst>
+          </a:blip>
           <a:stretch>
             <a:fillRect/>
           </a:stretch>
         </p:blipFill>
-        <p:spPr bwMode="auto">
+        <p:spPr>
           <a:xfrm>
-            <a:off x="1571604" y="1500174"/>
-            <a:ext cx="6240756" cy="4600575"/>
+            <a:off x="827582" y="1484784"/>
+            <a:ext cx="7437075" cy="4763616"/>
           </a:xfrm>
           <a:prstGeom prst="rect">
             <a:avLst/>
           </a:prstGeom>
-          <a:noFill/>
         </p:spPr>
       </p:pic>
+      <p:pic>
+        <p:nvPicPr>
+          <p:cNvPr id="3" name="Imagem 2"/>
+          <p:cNvPicPr>
+            <a:picLocks noChangeAspect="1"/>
+          </p:cNvPicPr>
+          <p:nvPr/>
+        </p:nvPicPr>
+        <p:blipFill>
+          <a:blip r:embed="rId3" cstate="print">
+            <a:extLst>
+              <a:ext uri="{28A0092B-C50C-407E-A947-70E740481C1C}">
+                <a14:useLocalDpi xmlns:a14="http://schemas.microsoft.com/office/drawing/2010/main" val="0"/>
+              </a:ext>
+            </a:extLst>
+          </a:blip>
+          <a:stretch>
+            <a:fillRect/>
+          </a:stretch>
+        </p:blipFill>
+        <p:spPr>
+          <a:xfrm>
+            <a:off x="1907704" y="1644093"/>
+            <a:ext cx="2089462" cy="2188582"/>
+          </a:xfrm>
+          <a:prstGeom prst="rect">
+            <a:avLst/>
+          </a:prstGeom>
+        </p:spPr>
+      </p:pic>
+      <p:sp>
+        <p:nvSpPr>
+          <p:cNvPr id="9" name="Retângulo 8"/>
+          <p:cNvSpPr/>
+          <p:nvPr/>
+        </p:nvSpPr>
+        <p:spPr>
+          <a:xfrm>
+            <a:off x="4019411" y="1647178"/>
+            <a:ext cx="2879344" cy="1200329"/>
+          </a:xfrm>
+          <a:prstGeom prst="rect">
+            <a:avLst/>
+          </a:prstGeom>
+        </p:spPr>
+        <p:txBody>
+          <a:bodyPr wrap="square">
+            <a:spAutoFit/>
+          </a:bodyPr>
+          <a:lstStyle/>
+          <a:p>
+            <a:r>
+              <a:rPr lang="pt-BR" dirty="0" smtClean="0">
+                <a:solidFill>
+                  <a:srgbClr val="FF0000"/>
+                </a:solidFill>
+              </a:rPr>
+              <a:t>*</a:t>
+            </a:r>
+            <a:r>
+              <a:rPr lang="pt-BR" dirty="0" smtClean="0"/>
+              <a:t>Os casos de uso do gestor podem ser melhor visualizados no slide anterior</a:t>
+            </a:r>
+            <a:endParaRPr lang="pt-BR" dirty="0"/>
+          </a:p>
+        </p:txBody>
+      </p:sp>
     </p:spTree>
     <p:extLst>
       <p:ext uri="{BB962C8B-B14F-4D97-AF65-F5344CB8AC3E}">
-        <p14:creationId xmlns:p14="http://schemas.microsoft.com/office/powerpoint/2010/main" val="2898236993"/>
+        <p14:creationId xmlns:p14="http://schemas.microsoft.com/office/powerpoint/2010/main" val="3412004320"/>
       </p:ext>
     </p:extLst>
   </p:cSld>
   <p:clrMapOvr>
     <a:masterClrMapping/>
   </p:clrMapOvr>
+  <p:transition spd="med">
+    <p:fade/>
+  </p:transition>
   <p:timing>
     <p:tnLst>
       <p:par>
@@ -5757,6 +5861,330 @@
       </p:grpSpPr>
       <p:sp>
         <p:nvSpPr>
+          <p:cNvPr id="2" name="Título 1"/>
+          <p:cNvSpPr>
+            <a:spLocks noGrp="1"/>
+          </p:cNvSpPr>
+          <p:nvPr>
+            <p:ph type="title"/>
+          </p:nvPr>
+        </p:nvSpPr>
+        <p:spPr/>
+        <p:txBody>
+          <a:bodyPr/>
+          <a:lstStyle/>
+          <a:p>
+            <a:r>
+              <a:rPr lang="pt-BR" dirty="0" smtClean="0"/>
+              <a:t>Escopo do Sistema</a:t>
+            </a:r>
+            <a:endParaRPr lang="pt-BR" dirty="0"/>
+          </a:p>
+        </p:txBody>
+      </p:sp>
+      <p:sp>
+        <p:nvSpPr>
+          <p:cNvPr id="4" name="Espaço Reservado para Data 3"/>
+          <p:cNvSpPr>
+            <a:spLocks noGrp="1"/>
+          </p:cNvSpPr>
+          <p:nvPr>
+            <p:ph type="dt" sz="half" idx="10"/>
+          </p:nvPr>
+        </p:nvSpPr>
+        <p:spPr/>
+        <p:txBody>
+          <a:bodyPr/>
+          <a:lstStyle/>
+          <a:p>
+            <a:r>
+              <a:rPr lang="pt-BR" dirty="0" smtClean="0"/>
+              <a:t>31/03/2014</a:t>
+            </a:r>
+          </a:p>
+          <a:p>
+            <a:endParaRPr lang="pt-BR" dirty="0"/>
+          </a:p>
+        </p:txBody>
+      </p:sp>
+      <p:sp>
+        <p:nvSpPr>
+          <p:cNvPr id="5" name="Espaço Reservado para Rodapé 4"/>
+          <p:cNvSpPr>
+            <a:spLocks noGrp="1"/>
+          </p:cNvSpPr>
+          <p:nvPr>
+            <p:ph type="ftr" sz="quarter" idx="11"/>
+          </p:nvPr>
+        </p:nvSpPr>
+        <p:spPr/>
+        <p:txBody>
+          <a:bodyPr/>
+          <a:lstStyle/>
+          <a:p>
+            <a:r>
+              <a:rPr lang="pt-BR" smtClean="0"/>
+              <a:t>Veris Faculdades TCM/3ADS</a:t>
+            </a:r>
+            <a:endParaRPr lang="pt-BR" dirty="0"/>
+          </a:p>
+        </p:txBody>
+      </p:sp>
+      <p:sp>
+        <p:nvSpPr>
+          <p:cNvPr id="6" name="Espaço Reservado para Número de Slide 5"/>
+          <p:cNvSpPr>
+            <a:spLocks noGrp="1"/>
+          </p:cNvSpPr>
+          <p:nvPr>
+            <p:ph type="sldNum" sz="quarter" idx="12"/>
+          </p:nvPr>
+        </p:nvSpPr>
+        <p:spPr/>
+        <p:txBody>
+          <a:bodyPr/>
+          <a:lstStyle/>
+          <a:p>
+            <a:fld id="{516476CB-12D4-456A-BCEE-8469A8C40045}" type="slidenum">
+              <a:rPr lang="pt-BR" smtClean="0"/>
+              <a:pPr/>
+              <a:t>6</a:t>
+            </a:fld>
+            <a:endParaRPr lang="pt-BR"/>
+          </a:p>
+        </p:txBody>
+      </p:sp>
+      <p:pic>
+        <p:nvPicPr>
+          <p:cNvPr id="7" name="Imagem 6"/>
+          <p:cNvPicPr>
+            <a:picLocks noChangeAspect="1"/>
+          </p:cNvPicPr>
+          <p:nvPr/>
+        </p:nvPicPr>
+        <p:blipFill>
+          <a:blip r:embed="rId2">
+            <a:extLst>
+              <a:ext uri="{28A0092B-C50C-407E-A947-70E740481C1C}">
+                <a14:useLocalDpi xmlns:a14="http://schemas.microsoft.com/office/drawing/2010/main" val="0"/>
+              </a:ext>
+            </a:extLst>
+          </a:blip>
+          <a:stretch>
+            <a:fillRect/>
+          </a:stretch>
+        </p:blipFill>
+        <p:spPr>
+          <a:xfrm>
+            <a:off x="457200" y="2060848"/>
+            <a:ext cx="8448938" cy="3384376"/>
+          </a:xfrm>
+          <a:prstGeom prst="rect">
+            <a:avLst/>
+          </a:prstGeom>
+        </p:spPr>
+      </p:pic>
+    </p:spTree>
+    <p:extLst>
+      <p:ext uri="{BB962C8B-B14F-4D97-AF65-F5344CB8AC3E}">
+        <p14:creationId xmlns:p14="http://schemas.microsoft.com/office/powerpoint/2010/main" val="2898236993"/>
+      </p:ext>
+    </p:extLst>
+  </p:cSld>
+  <p:clrMapOvr>
+    <a:masterClrMapping/>
+  </p:clrMapOvr>
+  <p:timing>
+    <p:tnLst>
+      <p:par>
+        <p:cTn id="1" dur="indefinite" restart="never" nodeType="tmRoot"/>
+      </p:par>
+    </p:tnLst>
+  </p:timing>
+</p:sld>
+</file>
+
+<file path=ppt/slides/slide7.xml><?xml version="1.0" encoding="utf-8"?>
+<p:sld xmlns:a="http://schemas.openxmlformats.org/drawingml/2006/main" xmlns:r="http://schemas.openxmlformats.org/officeDocument/2006/relationships" xmlns:p="http://schemas.openxmlformats.org/presentationml/2006/main">
+  <p:cSld>
+    <p:spTree>
+      <p:nvGrpSpPr>
+        <p:cNvPr id="1" name=""/>
+        <p:cNvGrpSpPr/>
+        <p:nvPr/>
+      </p:nvGrpSpPr>
+      <p:grpSpPr>
+        <a:xfrm>
+          <a:off x="0" y="0"/>
+          <a:ext cx="0" cy="0"/>
+          <a:chOff x="0" y="0"/>
+          <a:chExt cx="0" cy="0"/>
+        </a:xfrm>
+      </p:grpSpPr>
+      <p:sp>
+        <p:nvSpPr>
+          <p:cNvPr id="2" name="Título 1"/>
+          <p:cNvSpPr>
+            <a:spLocks noGrp="1"/>
+          </p:cNvSpPr>
+          <p:nvPr>
+            <p:ph type="title"/>
+          </p:nvPr>
+        </p:nvSpPr>
+        <p:spPr/>
+        <p:txBody>
+          <a:bodyPr/>
+          <a:lstStyle/>
+          <a:p>
+            <a:r>
+              <a:rPr lang="pt-BR" dirty="0" smtClean="0"/>
+              <a:t>Escopo do Sistema</a:t>
+            </a:r>
+            <a:endParaRPr lang="pt-BR" dirty="0"/>
+          </a:p>
+        </p:txBody>
+      </p:sp>
+      <p:sp>
+        <p:nvSpPr>
+          <p:cNvPr id="4" name="Espaço Reservado para Data 3"/>
+          <p:cNvSpPr>
+            <a:spLocks noGrp="1"/>
+          </p:cNvSpPr>
+          <p:nvPr>
+            <p:ph type="dt" sz="half" idx="10"/>
+          </p:nvPr>
+        </p:nvSpPr>
+        <p:spPr/>
+        <p:txBody>
+          <a:bodyPr/>
+          <a:lstStyle/>
+          <a:p>
+            <a:r>
+              <a:rPr lang="pt-BR" dirty="0" smtClean="0"/>
+              <a:t>31/03/2014</a:t>
+            </a:r>
+          </a:p>
+          <a:p>
+            <a:endParaRPr lang="pt-BR" dirty="0"/>
+          </a:p>
+        </p:txBody>
+      </p:sp>
+      <p:sp>
+        <p:nvSpPr>
+          <p:cNvPr id="5" name="Espaço Reservado para Rodapé 4"/>
+          <p:cNvSpPr>
+            <a:spLocks noGrp="1"/>
+          </p:cNvSpPr>
+          <p:nvPr>
+            <p:ph type="ftr" sz="quarter" idx="11"/>
+          </p:nvPr>
+        </p:nvSpPr>
+        <p:spPr/>
+        <p:txBody>
+          <a:bodyPr/>
+          <a:lstStyle/>
+          <a:p>
+            <a:r>
+              <a:rPr lang="pt-BR" smtClean="0"/>
+              <a:t>Veris Faculdades TCM/3ADS</a:t>
+            </a:r>
+            <a:endParaRPr lang="pt-BR" dirty="0"/>
+          </a:p>
+        </p:txBody>
+      </p:sp>
+      <p:sp>
+        <p:nvSpPr>
+          <p:cNvPr id="6" name="Espaço Reservado para Número de Slide 5"/>
+          <p:cNvSpPr>
+            <a:spLocks noGrp="1"/>
+          </p:cNvSpPr>
+          <p:nvPr>
+            <p:ph type="sldNum" sz="quarter" idx="12"/>
+          </p:nvPr>
+        </p:nvSpPr>
+        <p:spPr/>
+        <p:txBody>
+          <a:bodyPr/>
+          <a:lstStyle/>
+          <a:p>
+            <a:fld id="{516476CB-12D4-456A-BCEE-8469A8C40045}" type="slidenum">
+              <a:rPr lang="pt-BR" smtClean="0"/>
+              <a:pPr/>
+              <a:t>7</a:t>
+            </a:fld>
+            <a:endParaRPr lang="pt-BR"/>
+          </a:p>
+        </p:txBody>
+      </p:sp>
+      <p:pic>
+        <p:nvPicPr>
+          <p:cNvPr id="7" name="Imagem 6"/>
+          <p:cNvPicPr>
+            <a:picLocks noChangeAspect="1"/>
+          </p:cNvPicPr>
+          <p:nvPr/>
+        </p:nvPicPr>
+        <p:blipFill>
+          <a:blip r:embed="rId2">
+            <a:extLst>
+              <a:ext uri="{28A0092B-C50C-407E-A947-70E740481C1C}">
+                <a14:useLocalDpi xmlns:a14="http://schemas.microsoft.com/office/drawing/2010/main" val="0"/>
+              </a:ext>
+            </a:extLst>
+          </a:blip>
+          <a:stretch>
+            <a:fillRect/>
+          </a:stretch>
+        </p:blipFill>
+        <p:spPr>
+          <a:xfrm>
+            <a:off x="457200" y="2348880"/>
+            <a:ext cx="8430038" cy="3024336"/>
+          </a:xfrm>
+          <a:prstGeom prst="rect">
+            <a:avLst/>
+          </a:prstGeom>
+        </p:spPr>
+      </p:pic>
+    </p:spTree>
+    <p:extLst>
+      <p:ext uri="{BB962C8B-B14F-4D97-AF65-F5344CB8AC3E}">
+        <p14:creationId xmlns:p14="http://schemas.microsoft.com/office/powerpoint/2010/main" val="3321499385"/>
+      </p:ext>
+    </p:extLst>
+  </p:cSld>
+  <p:clrMapOvr>
+    <a:masterClrMapping/>
+  </p:clrMapOvr>
+  <p:timing>
+    <p:tnLst>
+      <p:par>
+        <p:cTn id="1" dur="indefinite" restart="never" nodeType="tmRoot"/>
+      </p:par>
+    </p:tnLst>
+  </p:timing>
+</p:sld>
+</file>
+
+<file path=ppt/slides/slide8.xml><?xml version="1.0" encoding="utf-8"?>
+<p:sld xmlns:a="http://schemas.openxmlformats.org/drawingml/2006/main" xmlns:r="http://schemas.openxmlformats.org/officeDocument/2006/relationships" xmlns:p="http://schemas.openxmlformats.org/presentationml/2006/main">
+  <p:cSld>
+    <p:spTree>
+      <p:nvGrpSpPr>
+        <p:cNvPr id="1" name=""/>
+        <p:cNvGrpSpPr/>
+        <p:nvPr/>
+      </p:nvGrpSpPr>
+      <p:grpSpPr>
+        <a:xfrm>
+          <a:off x="0" y="0"/>
+          <a:ext cx="0" cy="0"/>
+          <a:chOff x="0" y="0"/>
+          <a:chExt cx="0" cy="0"/>
+        </a:xfrm>
+      </p:grpSpPr>
+      <p:sp>
+        <p:nvSpPr>
           <p:cNvPr id="19458" name="Rectangle 2"/>
           <p:cNvSpPr>
             <a:spLocks noGrp="1" noChangeArrowheads="1"/>
@@ -5800,10 +6228,9 @@
           </a:p>
           <a:p>
             <a:r>
-              <a:rPr lang="pt-BR"/>
+              <a:rPr lang="pt-BR" dirty="0"/>
               <a:t>Em futuras implantações, poderá ser acrescentado um sistema de agendamento de exames online no website da clínica e realizar o ajuste do website para dispositivos mobile, sempre buscando o máximo de facilidade para o paciente.</a:t>
             </a:r>
-            <a:endParaRPr lang="pt-BR" dirty="0"/>
           </a:p>
         </p:txBody>
       </p:sp>
@@ -5848,7 +6275,7 @@
             <a:fld id="{516476CB-12D4-456A-BCEE-8469A8C40045}" type="slidenum">
               <a:rPr lang="pt-BR" smtClean="0"/>
               <a:pPr/>
-              <a:t>6</a:t>
+              <a:t>8</a:t>
             </a:fld>
             <a:endParaRPr lang="pt-BR" dirty="0"/>
           </a:p>

</xml_diff>

<commit_message>
-Atualização do slide de apresentação(Conclusão)
</commit_message>
<xml_diff>
--- a/documentacao/G4_Apresentacao1sem2014.pptx
+++ b/documentacao/G4_Apresentacao1sem2014.pptx
@@ -5,10 +5,10 @@
     <p:sldMasterId id="2147483657" r:id="rId1"/>
   </p:sldMasterIdLst>
   <p:notesMasterIdLst>
-    <p:notesMasterId r:id="rId34"/>
+    <p:notesMasterId r:id="rId35"/>
   </p:notesMasterIdLst>
   <p:handoutMasterIdLst>
-    <p:handoutMasterId r:id="rId35"/>
+    <p:handoutMasterId r:id="rId36"/>
   </p:handoutMasterIdLst>
   <p:sldIdLst>
     <p:sldId id="256" r:id="rId2"/>
@@ -43,6 +43,7 @@
     <p:sldId id="285" r:id="rId31"/>
     <p:sldId id="284" r:id="rId32"/>
     <p:sldId id="263" r:id="rId33"/>
+    <p:sldId id="293" r:id="rId34"/>
   </p:sldIdLst>
   <p:sldSz cx="9144000" cy="6858000" type="screen4x3"/>
   <p:notesSz cx="7010400" cy="9296400"/>
@@ -4925,15 +4926,7 @@
           <a:p>
             <a:r>
               <a:rPr lang="pt-BR" dirty="0" smtClean="0"/>
-              <a:t>Grupo 4:  Danilo </a:t>
-            </a:r>
-            <a:r>
-              <a:rPr lang="pt-BR" dirty="0" smtClean="0"/>
-              <a:t>Míssio</a:t>
-            </a:r>
-            <a:r>
-              <a:rPr lang="pt-BR" dirty="0" smtClean="0"/>
-              <a:t>	</a:t>
+              <a:t>Grupo 4:  Danilo Míssio	</a:t>
             </a:r>
           </a:p>
           <a:p>
@@ -4953,13 +4946,8 @@
             </a:r>
             <a:r>
               <a:rPr lang="pt-BR" dirty="0" smtClean="0"/>
-              <a:t>               Pedro </a:t>
-            </a:r>
-            <a:r>
-              <a:rPr lang="pt-BR" dirty="0" smtClean="0"/>
-              <a:t>Gimenes</a:t>
-            </a:r>
-            <a:endParaRPr lang="pt-BR" dirty="0" smtClean="0"/>
+              <a:t>               Pedro Gimenes</a:t>
+            </a:r>
           </a:p>
           <a:p>
             <a:r>
@@ -5497,11 +5485,7 @@
           <a:p>
             <a:r>
               <a:rPr lang="pt-BR" dirty="0" smtClean="0"/>
-              <a:t>Diagrama </a:t>
-            </a:r>
-            <a:r>
-              <a:rPr lang="pt-BR" dirty="0" smtClean="0"/>
-              <a:t>de Classe</a:t>
+              <a:t>Diagrama de Classe</a:t>
             </a:r>
             <a:endParaRPr lang="pt-BR" dirty="0"/>
           </a:p>
@@ -5667,11 +5651,7 @@
           <a:p>
             <a:r>
               <a:rPr lang="pt-BR" dirty="0" smtClean="0"/>
-              <a:t>Diagrama </a:t>
-            </a:r>
-            <a:r>
-              <a:rPr lang="pt-BR" dirty="0" smtClean="0"/>
-              <a:t>de Classe</a:t>
+              <a:t>Diagrama de Classe</a:t>
             </a:r>
             <a:endParaRPr lang="pt-BR" dirty="0"/>
           </a:p>
@@ -5837,11 +5817,7 @@
           <a:p>
             <a:r>
               <a:rPr lang="pt-BR" dirty="0" smtClean="0"/>
-              <a:t>Diagrama </a:t>
-            </a:r>
-            <a:r>
-              <a:rPr lang="pt-BR" dirty="0" smtClean="0"/>
-              <a:t>de Classe</a:t>
+              <a:t>Diagrama de Classe</a:t>
             </a:r>
             <a:endParaRPr lang="pt-BR" dirty="0"/>
           </a:p>
@@ -6007,15 +5983,7 @@
           <a:p>
             <a:r>
               <a:rPr lang="pt-BR" dirty="0" smtClean="0"/>
-              <a:t>Diagrama </a:t>
-            </a:r>
-            <a:r>
-              <a:rPr lang="pt-BR" dirty="0" smtClean="0"/>
-              <a:t>de Comunicaç</a:t>
-            </a:r>
-            <a:r>
-              <a:rPr lang="pt-BR" dirty="0" smtClean="0"/>
-              <a:t>ão</a:t>
+              <a:t>Diagrama de Comunicação</a:t>
             </a:r>
             <a:endParaRPr lang="pt-BR" dirty="0"/>
           </a:p>
@@ -6181,15 +6149,7 @@
           <a:p>
             <a:r>
               <a:rPr lang="pt-BR" dirty="0" smtClean="0"/>
-              <a:t>Diagrama </a:t>
-            </a:r>
-            <a:r>
-              <a:rPr lang="pt-BR" dirty="0" smtClean="0"/>
-              <a:t>de Comunicaç</a:t>
-            </a:r>
-            <a:r>
-              <a:rPr lang="pt-BR" dirty="0" smtClean="0"/>
-              <a:t>ão</a:t>
+              <a:t>Diagrama de Comunicação</a:t>
             </a:r>
             <a:endParaRPr lang="pt-BR" dirty="0"/>
           </a:p>
@@ -6355,15 +6315,7 @@
           <a:p>
             <a:r>
               <a:rPr lang="pt-BR" dirty="0" smtClean="0"/>
-              <a:t>Diagrama </a:t>
-            </a:r>
-            <a:r>
-              <a:rPr lang="pt-BR" dirty="0" smtClean="0"/>
-              <a:t>de Comunicaç</a:t>
-            </a:r>
-            <a:r>
-              <a:rPr lang="pt-BR" dirty="0" smtClean="0"/>
-              <a:t>ão</a:t>
+              <a:t>Diagrama de Comunicação</a:t>
             </a:r>
             <a:endParaRPr lang="pt-BR" dirty="0"/>
           </a:p>
@@ -6529,11 +6481,7 @@
           <a:p>
             <a:r>
               <a:rPr lang="pt-BR" dirty="0" smtClean="0"/>
-              <a:t>Diagrama </a:t>
-            </a:r>
-            <a:r>
-              <a:rPr lang="pt-BR" dirty="0" smtClean="0"/>
-              <a:t>de Classe</a:t>
+              <a:t>Diagrama de Classe</a:t>
             </a:r>
             <a:endParaRPr lang="pt-BR" dirty="0"/>
           </a:p>
@@ -6699,11 +6647,7 @@
           <a:p>
             <a:r>
               <a:rPr lang="pt-BR" dirty="0" smtClean="0"/>
-              <a:t>Diagrama </a:t>
-            </a:r>
-            <a:r>
-              <a:rPr lang="pt-BR" dirty="0" smtClean="0"/>
-              <a:t>de Classe</a:t>
+              <a:t>Diagrama de Classe</a:t>
             </a:r>
             <a:endParaRPr lang="pt-BR" dirty="0"/>
           </a:p>
@@ -6899,11 +6843,7 @@
           <a:p>
             <a:r>
               <a:rPr lang="pt-BR" dirty="0" smtClean="0"/>
-              <a:t>Descrição </a:t>
-            </a:r>
-            <a:r>
-              <a:rPr lang="pt-BR" dirty="0" smtClean="0"/>
-              <a:t>do Sistema</a:t>
+              <a:t>Descrição do Sistema</a:t>
             </a:r>
             <a:endParaRPr lang="pt-BR" dirty="0"/>
           </a:p>
@@ -6928,26 +6868,17 @@
               <a:rPr lang="pt-BR" dirty="0" smtClean="0"/>
               <a:t>Sistema de gerenciamento, gestão e controle de um clinica de exames, visando facilidade e praticidade para o paciente e maior controle sobre tudo que acontece dentro da clinica.</a:t>
             </a:r>
-            <a:endParaRPr lang="pt-BR" dirty="0" smtClean="0"/>
           </a:p>
           <a:p>
             <a:r>
               <a:rPr lang="pt-BR" dirty="0" smtClean="0"/>
-              <a:t>Usuários: Paciente, Gestor e Administrador</a:t>
-            </a:r>
+              <a:t>Usuários: Paciente, Gestor e Administrador.</a:t>
+            </a:r>
+          </a:p>
+          <a:p>
             <a:r>
               <a:rPr lang="pt-BR" dirty="0" smtClean="0"/>
-              <a:t>.</a:t>
-            </a:r>
-          </a:p>
-          <a:p>
-            <a:r>
-              <a:rPr lang="pt-BR" dirty="0" smtClean="0"/>
-              <a:t>Ambientes: WebSite</a:t>
-            </a:r>
-            <a:r>
-              <a:rPr lang="pt-BR" dirty="0" smtClean="0"/>
-              <a:t>, Sistema Interno(Desktop).</a:t>
+              <a:t>Ambientes: WebSite, Sistema Interno(Desktop).</a:t>
             </a:r>
             <a:endParaRPr lang="pt-BR" dirty="0"/>
           </a:p>
@@ -6972,7 +6903,6 @@
               <a:rPr lang="pt-BR" dirty="0" smtClean="0"/>
               <a:t>09/06/2014</a:t>
             </a:r>
-            <a:endParaRPr lang="pt-BR" dirty="0" smtClean="0"/>
           </a:p>
           <a:p>
             <a:endParaRPr lang="pt-BR" dirty="0"/>
@@ -7078,11 +7008,7 @@
           <a:p>
             <a:r>
               <a:rPr lang="pt-BR" dirty="0" smtClean="0"/>
-              <a:t>Diagrama </a:t>
-            </a:r>
-            <a:r>
-              <a:rPr lang="pt-BR" dirty="0" smtClean="0"/>
-              <a:t>de Classe</a:t>
+              <a:t>Diagrama de Classe</a:t>
             </a:r>
             <a:endParaRPr lang="pt-BR" dirty="0"/>
           </a:p>
@@ -7248,11 +7174,7 @@
           <a:p>
             <a:r>
               <a:rPr lang="pt-BR" dirty="0" smtClean="0"/>
-              <a:t>Diagrama </a:t>
-            </a:r>
-            <a:r>
-              <a:rPr lang="pt-BR" dirty="0" smtClean="0"/>
-              <a:t>de Classe</a:t>
+              <a:t>Diagrama de Classe</a:t>
             </a:r>
             <a:endParaRPr lang="pt-BR" dirty="0"/>
           </a:p>
@@ -7448,11 +7370,7 @@
           <a:p>
             <a:r>
               <a:rPr lang="pt-BR" dirty="0" smtClean="0"/>
-              <a:t>Diagrama </a:t>
-            </a:r>
-            <a:r>
-              <a:rPr lang="pt-BR" dirty="0" smtClean="0"/>
-              <a:t>de Comunicação</a:t>
+              <a:t>Diagrama de Comunicação</a:t>
             </a:r>
             <a:endParaRPr lang="pt-BR" dirty="0"/>
           </a:p>
@@ -7618,11 +7536,7 @@
           <a:p>
             <a:r>
               <a:rPr lang="pt-BR" dirty="0" smtClean="0"/>
-              <a:t>Diagrama </a:t>
-            </a:r>
-            <a:r>
-              <a:rPr lang="pt-BR" dirty="0" smtClean="0"/>
-              <a:t>de Comunicação</a:t>
+              <a:t>Diagrama de Comunicação</a:t>
             </a:r>
             <a:endParaRPr lang="pt-BR" dirty="0"/>
           </a:p>
@@ -7788,11 +7702,7 @@
           <a:p>
             <a:r>
               <a:rPr lang="pt-BR" dirty="0" smtClean="0"/>
-              <a:t>Diagrama </a:t>
-            </a:r>
-            <a:r>
-              <a:rPr lang="pt-BR" dirty="0" smtClean="0"/>
-              <a:t>de Comunicação</a:t>
+              <a:t>Diagrama de Comunicação</a:t>
             </a:r>
             <a:endParaRPr lang="pt-BR" dirty="0"/>
           </a:p>
@@ -7958,11 +7868,7 @@
           <a:p>
             <a:r>
               <a:rPr lang="pt-BR" dirty="0" smtClean="0"/>
-              <a:t>Diagrama </a:t>
-            </a:r>
-            <a:r>
-              <a:rPr lang="pt-BR" dirty="0" smtClean="0"/>
-              <a:t>de Classe</a:t>
+              <a:t>Diagrama de Classe</a:t>
             </a:r>
             <a:endParaRPr lang="pt-BR" dirty="0"/>
           </a:p>
@@ -8158,11 +8064,7 @@
           <a:p>
             <a:r>
               <a:rPr lang="pt-BR" dirty="0" smtClean="0"/>
-              <a:t>Diagrama </a:t>
-            </a:r>
-            <a:r>
-              <a:rPr lang="pt-BR" dirty="0" smtClean="0"/>
-              <a:t>de Comunicação</a:t>
+              <a:t>Diagrama de Comunicação</a:t>
             </a:r>
             <a:endParaRPr lang="pt-BR" dirty="0"/>
           </a:p>
@@ -8328,11 +8230,7 @@
           <a:p>
             <a:r>
               <a:rPr lang="pt-BR" dirty="0" smtClean="0"/>
-              <a:t>Diagrama </a:t>
-            </a:r>
-            <a:r>
-              <a:rPr lang="pt-BR" dirty="0" smtClean="0"/>
-              <a:t>de Comunicação</a:t>
+              <a:t>Diagrama de Comunicação</a:t>
             </a:r>
             <a:endParaRPr lang="pt-BR" dirty="0"/>
           </a:p>
@@ -8498,11 +8396,7 @@
           <a:p>
             <a:r>
               <a:rPr lang="pt-BR" dirty="0" smtClean="0"/>
-              <a:t>Diagrama </a:t>
-            </a:r>
-            <a:r>
-              <a:rPr lang="pt-BR" dirty="0" smtClean="0"/>
-              <a:t>de Comunicação</a:t>
+              <a:t>Diagrama de Comunicação</a:t>
             </a:r>
             <a:endParaRPr lang="pt-BR" dirty="0"/>
           </a:p>
@@ -8668,11 +8562,7 @@
           <a:p>
             <a:r>
               <a:rPr lang="pt-BR" dirty="0" smtClean="0"/>
-              <a:t>Diagrama </a:t>
-            </a:r>
-            <a:r>
-              <a:rPr lang="pt-BR" dirty="0" smtClean="0"/>
-              <a:t>de Classe</a:t>
+              <a:t>Diagrama de Classe</a:t>
             </a:r>
             <a:endParaRPr lang="pt-BR" dirty="0"/>
           </a:p>
@@ -9004,11 +8894,7 @@
           <a:p>
             <a:r>
               <a:rPr lang="pt-BR" dirty="0" smtClean="0"/>
-              <a:t>Diagrama </a:t>
-            </a:r>
-            <a:r>
-              <a:rPr lang="pt-BR" dirty="0" smtClean="0"/>
-              <a:t>de Classe</a:t>
+              <a:t>Diagrama de Classe</a:t>
             </a:r>
             <a:endParaRPr lang="pt-BR" dirty="0"/>
           </a:p>
@@ -9174,11 +9060,7 @@
           <a:p>
             <a:r>
               <a:rPr lang="pt-BR" dirty="0" smtClean="0"/>
-              <a:t>Diagrama </a:t>
-            </a:r>
-            <a:r>
-              <a:rPr lang="pt-BR" dirty="0" smtClean="0"/>
-              <a:t>de Classe</a:t>
+              <a:t>Diagrama de Classe</a:t>
             </a:r>
             <a:endParaRPr lang="pt-BR" dirty="0"/>
           </a:p>
@@ -9367,14 +9249,19 @@
           <a:p>
             <a:r>
               <a:rPr lang="pt-BR" dirty="0" smtClean="0"/>
-              <a:t>Praticidade para o paciente e organização gerencial da clínica. </a:t>
-            </a:r>
-          </a:p>
-          <a:p>
-            <a:r>
-              <a:rPr lang="pt-BR" dirty="0"/>
-              <a:t>Em futuras implantações, poderá ser acrescentado um sistema de agendamento de exames online no website da clínica e realizar o ajuste do website para dispositivos mobile, sempre buscando o máximo de facilidade para o paciente.</a:t>
-            </a:r>
+              <a:t>O ponto forte do sistema é a possibilidade de controle e gestão que ele oferece para a clínica, além de facilidade para o paciente que for realizar um exame.</a:t>
+            </a:r>
+          </a:p>
+          <a:p>
+            <a:r>
+              <a:rPr lang="pt-BR" dirty="0" smtClean="0"/>
+              <a:t>O ponto fraco do sistema é a quantidade pequena de </a:t>
+            </a:r>
+            <a:r>
+              <a:rPr lang="pt-BR" smtClean="0"/>
+              <a:t>funcionalidades dele.</a:t>
+            </a:r>
+            <a:endParaRPr lang="pt-BR" dirty="0" smtClean="0"/>
           </a:p>
         </p:txBody>
       </p:sp>
@@ -9397,7 +9284,6 @@
               <a:rPr lang="pt-BR" dirty="0"/>
               <a:t>09/06/2014</a:t>
             </a:r>
-            <a:endParaRPr lang="pt-BR" dirty="0"/>
           </a:p>
         </p:txBody>
       </p:sp>
@@ -9449,6 +9335,164 @@
         </p:txBody>
       </p:sp>
     </p:spTree>
+  </p:cSld>
+  <p:clrMapOvr>
+    <a:masterClrMapping/>
+  </p:clrMapOvr>
+  <p:transition spd="med">
+    <p:fade/>
+  </p:transition>
+  <p:timing>
+    <p:tnLst>
+      <p:par>
+        <p:cTn id="1" dur="indefinite" restart="never" nodeType="tmRoot"/>
+      </p:par>
+    </p:tnLst>
+  </p:timing>
+</p:sld>
+</file>
+
+<file path=ppt/slides/slide33.xml><?xml version="1.0" encoding="utf-8"?>
+<p:sld xmlns:a="http://schemas.openxmlformats.org/drawingml/2006/main" xmlns:r="http://schemas.openxmlformats.org/officeDocument/2006/relationships" xmlns:p="http://schemas.openxmlformats.org/presentationml/2006/main">
+  <p:cSld>
+    <p:spTree>
+      <p:nvGrpSpPr>
+        <p:cNvPr id="1" name=""/>
+        <p:cNvGrpSpPr/>
+        <p:nvPr/>
+      </p:nvGrpSpPr>
+      <p:grpSpPr>
+        <a:xfrm>
+          <a:off x="0" y="0"/>
+          <a:ext cx="0" cy="0"/>
+          <a:chOff x="0" y="0"/>
+          <a:chExt cx="0" cy="0"/>
+        </a:xfrm>
+      </p:grpSpPr>
+      <p:sp>
+        <p:nvSpPr>
+          <p:cNvPr id="19458" name="Rectangle 2"/>
+          <p:cNvSpPr>
+            <a:spLocks noGrp="1" noChangeArrowheads="1"/>
+          </p:cNvSpPr>
+          <p:nvPr>
+            <p:ph type="title"/>
+          </p:nvPr>
+        </p:nvSpPr>
+        <p:spPr/>
+        <p:txBody>
+          <a:bodyPr/>
+          <a:lstStyle/>
+          <a:p>
+            <a:r>
+              <a:rPr lang="pt-BR" dirty="0" smtClean="0"/>
+              <a:t>Conclusão</a:t>
+            </a:r>
+            <a:endParaRPr lang="pt-BR" dirty="0"/>
+          </a:p>
+        </p:txBody>
+      </p:sp>
+      <p:sp>
+        <p:nvSpPr>
+          <p:cNvPr id="19459" name="Rectangle 3"/>
+          <p:cNvSpPr>
+            <a:spLocks noGrp="1" noChangeArrowheads="1"/>
+          </p:cNvSpPr>
+          <p:nvPr>
+            <p:ph type="body" idx="1"/>
+          </p:nvPr>
+        </p:nvSpPr>
+        <p:spPr/>
+        <p:txBody>
+          <a:bodyPr/>
+          <a:lstStyle/>
+          <a:p>
+            <a:r>
+              <a:rPr lang="pt-BR" dirty="0" smtClean="0"/>
+              <a:t>Em </a:t>
+            </a:r>
+            <a:r>
+              <a:rPr lang="pt-BR" dirty="0"/>
+              <a:t>futuras implantações, poderá ser acrescentado um sistema de agendamento de exames online no website da clínica e realizar o ajuste do website para dispositivos mobile, sempre buscando o máximo de facilidade para o paciente.</a:t>
+            </a:r>
+          </a:p>
+        </p:txBody>
+      </p:sp>
+      <p:sp>
+        <p:nvSpPr>
+          <p:cNvPr id="6" name="Espaço Reservado para Data 5"/>
+          <p:cNvSpPr>
+            <a:spLocks noGrp="1"/>
+          </p:cNvSpPr>
+          <p:nvPr>
+            <p:ph type="dt" sz="half" idx="10"/>
+          </p:nvPr>
+        </p:nvSpPr>
+        <p:spPr/>
+        <p:txBody>
+          <a:bodyPr/>
+          <a:lstStyle/>
+          <a:p>
+            <a:r>
+              <a:rPr lang="pt-BR" dirty="0"/>
+              <a:t>09/06/2014</a:t>
+            </a:r>
+          </a:p>
+        </p:txBody>
+      </p:sp>
+      <p:sp>
+        <p:nvSpPr>
+          <p:cNvPr id="7" name="Espaço Reservado para Número de Slide 6"/>
+          <p:cNvSpPr>
+            <a:spLocks noGrp="1"/>
+          </p:cNvSpPr>
+          <p:nvPr>
+            <p:ph type="sldNum" sz="quarter" idx="12"/>
+          </p:nvPr>
+        </p:nvSpPr>
+        <p:spPr/>
+        <p:txBody>
+          <a:bodyPr/>
+          <a:lstStyle/>
+          <a:p>
+            <a:fld id="{516476CB-12D4-456A-BCEE-8469A8C40045}" type="slidenum">
+              <a:rPr lang="pt-BR" smtClean="0"/>
+              <a:pPr/>
+              <a:t>33</a:t>
+            </a:fld>
+            <a:endParaRPr lang="pt-BR" dirty="0"/>
+          </a:p>
+        </p:txBody>
+      </p:sp>
+      <p:sp>
+        <p:nvSpPr>
+          <p:cNvPr id="8" name="Espaço Reservado para Rodapé 7"/>
+          <p:cNvSpPr>
+            <a:spLocks noGrp="1"/>
+          </p:cNvSpPr>
+          <p:nvPr>
+            <p:ph type="ftr" sz="quarter" idx="11"/>
+          </p:nvPr>
+        </p:nvSpPr>
+        <p:spPr/>
+        <p:txBody>
+          <a:bodyPr/>
+          <a:lstStyle/>
+          <a:p>
+            <a:r>
+              <a:rPr lang="pt-BR" dirty="0" smtClean="0"/>
+              <a:t>Veris Faculdades TCM/3ADS</a:t>
+            </a:r>
+            <a:endParaRPr lang="pt-BR" dirty="0"/>
+          </a:p>
+        </p:txBody>
+      </p:sp>
+    </p:spTree>
+    <p:extLst>
+      <p:ext uri="{BB962C8B-B14F-4D97-AF65-F5344CB8AC3E}">
+        <p14:creationId xmlns:p14="http://schemas.microsoft.com/office/powerpoint/2010/main" val="3588191264"/>
+      </p:ext>
+    </p:extLst>
   </p:cSld>
   <p:clrMapOvr>
     <a:masterClrMapping/>
@@ -10175,11 +10219,7 @@
             </a:r>
             <a:r>
               <a:rPr lang="pt-BR" sz="2400" dirty="0" smtClean="0"/>
-              <a:t>Os casos de uso do gestor podem ser melhor visualizados </a:t>
-            </a:r>
-            <a:r>
-              <a:rPr lang="pt-BR" sz="2400" dirty="0" smtClean="0"/>
-              <a:t>nos slides anterior.</a:t>
+              <a:t>Os casos de uso do gestor podem ser melhor visualizados nos slides anterior.</a:t>
             </a:r>
             <a:endParaRPr lang="pt-BR" sz="2400" dirty="0"/>
           </a:p>

</xml_diff>

<commit_message>
APRESENTAÇÃO: Caso de uso gestor: passe 3 casos de uso para o lado esquerdo. passe um caso de uso para a "cabeça do gestor". Apresente como um unica figura.
Escopo: apresente em forma de tabela somente aqueles que se transformaram em código.

Caso de Uso: Cadastro Paciente:
A ideia é tornar visivel. As vezes basta aumentar a figura ou trabalhar o posicionamento.
Somente divida se for inevitável.

Conclusão:
Trocar "Ponto Fraco" por "Nas proximas interações da implementação novas funcionalidades serão agregadas ao sistema"
</commit_message>
<xml_diff>
--- a/documentacao/G4_Apresentacao1sem2014.pptx
+++ b/documentacao/G4_Apresentacao1sem2014.pptx
@@ -174,7 +174,7 @@
   </p:defaultTextStyle>
   <p:extLst>
     <p:ext uri="{EFAFB233-063F-42B5-8137-9DF3F51BA10A}">
-      <p15:sldGuideLst xmlns:p15="http://schemas.microsoft.com/office/powerpoint/2012/main">
+      <p15:sldGuideLst xmlns:p15="http://schemas.microsoft.com/office/powerpoint/2012/main" xmlns="">
         <p15:guide id="1" orient="horz" pos="2160">
           <p15:clr>
             <a:srgbClr val="A4A3A4"/>
@@ -188,7 +188,7 @@
       </p15:sldGuideLst>
     </p:ext>
     <p:ext uri="{2D200454-40CA-4A62-9FC3-DE9A4176ACB9}">
-      <p15:notesGuideLst xmlns:p15="http://schemas.microsoft.com/office/powerpoint/2012/main">
+      <p15:notesGuideLst xmlns:p15="http://schemas.microsoft.com/office/powerpoint/2012/main" xmlns="">
         <p15:guide id="1" orient="horz" pos="2928">
           <p15:clr>
             <a:srgbClr val="A4A3A4"/>
@@ -203,6 +203,54 @@
     </p:ext>
   </p:extLst>
 </p:presentation>
+</file>
+
+<file path=ppt/commentAuthors.xml><?xml version="1.0" encoding="utf-8"?>
+<p:cmAuthorLst xmlns:a="http://schemas.openxmlformats.org/drawingml/2006/main" xmlns:r="http://schemas.openxmlformats.org/officeDocument/2006/relationships" xmlns:p="http://schemas.openxmlformats.org/presentationml/2006/main">
+  <p:cmAuthor id="0" name="Helio " initials="ha" lastIdx="4" clrIdx="0"/>
+</p:cmAuthorLst>
+</file>
+
+<file path=ppt/comments/comment1.xml><?xml version="1.0" encoding="utf-8"?>
+<p:cmLst xmlns:a="http://schemas.openxmlformats.org/drawingml/2006/main" xmlns:r="http://schemas.openxmlformats.org/officeDocument/2006/relationships" xmlns:p="http://schemas.openxmlformats.org/presentationml/2006/main">
+  <p:cm authorId="0" dt="2014-05-18T09:06:01.150" idx="1">
+    <p:pos x="3267" y="440"/>
+    <p:text>sugestão: 
+Caso de uso gestor: passe 3 casos de uso para o lado esquerdo.
+passe um caso de uso para a "cabeça do gestor". 
+Apresente como um unica figura.</p:text>
+  </p:cm>
+</p:cmLst>
+</file>
+
+<file path=ppt/comments/comment2.xml><?xml version="1.0" encoding="utf-8"?>
+<p:cmLst xmlns:a="http://schemas.openxmlformats.org/drawingml/2006/main" xmlns:r="http://schemas.openxmlformats.org/officeDocument/2006/relationships" xmlns:p="http://schemas.openxmlformats.org/presentationml/2006/main">
+  <p:cm authorId="0" dt="2014-05-18T09:18:31.135" idx="2">
+    <p:pos x="4259" y="440"/>
+    <p:text>Caso de Uso: Cadastro Paciente:
+A ideia é tornar visivel. As vezes basta aumentar a figura ou trabalhar o posicionamento.
+Somente divida se for inevitável.</p:text>
+  </p:cm>
+</p:cmLst>
+</file>
+
+<file path=ppt/comments/comment3.xml><?xml version="1.0" encoding="utf-8"?>
+<p:cmLst xmlns:a="http://schemas.openxmlformats.org/drawingml/2006/main" xmlns:r="http://schemas.openxmlformats.org/officeDocument/2006/relationships" xmlns:p="http://schemas.openxmlformats.org/presentationml/2006/main">
+  <p:cm authorId="0" dt="2014-05-18T09:19:36.916" idx="3">
+    <p:pos x="3244" y="440"/>
+    <p:text/>
+  </p:cm>
+</p:cmLst>
+</file>
+
+<file path=ppt/comments/comment4.xml><?xml version="1.0" encoding="utf-8"?>
+<p:cmLst xmlns:a="http://schemas.openxmlformats.org/drawingml/2006/main" xmlns:r="http://schemas.openxmlformats.org/officeDocument/2006/relationships" xmlns:p="http://schemas.openxmlformats.org/presentationml/2006/main">
+  <p:cm authorId="0" dt="2014-05-18T09:26:53.119" idx="4">
+    <p:pos x="1917" y="2107"/>
+    <p:text>Conclusão:
+Trocar "Ponto Fraco" por "Nas proximas interações da implementação novas funcionalidades serão agregadas ao sistema"</p:text>
+  </p:cm>
+</p:cmLst>
 </file>
 
 <file path=ppt/handoutMasters/handoutMaster1.xml><?xml version="1.0" encoding="utf-8"?>
@@ -288,7 +336,7 @@
             <a:fld id="{387DC7E4-63C1-42C9-AC56-2D8DD4349572}" type="datetimeFigureOut">
               <a:rPr lang="pt-BR" smtClean="0"/>
               <a:pPr/>
-              <a:t>17/05/2014</a:t>
+              <a:t>18/5/2014</a:t>
             </a:fld>
             <a:endParaRPr lang="pt-BR"/>
           </a:p>
@@ -364,7 +412,7 @@
     </p:spTree>
     <p:extLst>
       <p:ext uri="{BB962C8B-B14F-4D97-AF65-F5344CB8AC3E}">
-        <p14:creationId xmlns:p14="http://schemas.microsoft.com/office/powerpoint/2010/main" val="3690707936"/>
+        <p14:creationId xmlns:p14="http://schemas.microsoft.com/office/powerpoint/2010/main" xmlns="" val="3690707936"/>
       </p:ext>
     </p:extLst>
   </p:cSld>
@@ -678,7 +726,7 @@
     </p:spTree>
     <p:extLst>
       <p:ext uri="{BB962C8B-B14F-4D97-AF65-F5344CB8AC3E}">
-        <p14:creationId xmlns:p14="http://schemas.microsoft.com/office/powerpoint/2010/main" val="753547333"/>
+        <p14:creationId xmlns:p14="http://schemas.microsoft.com/office/powerpoint/2010/main" xmlns="" val="753547333"/>
       </p:ext>
     </p:extLst>
   </p:cSld>
@@ -887,7 +935,7 @@
     </p:spTree>
     <p:extLst>
       <p:ext uri="{BB962C8B-B14F-4D97-AF65-F5344CB8AC3E}">
-        <p14:creationId xmlns:p14="http://schemas.microsoft.com/office/powerpoint/2010/main" val="552911737"/>
+        <p14:creationId xmlns:p14="http://schemas.microsoft.com/office/powerpoint/2010/main" xmlns="" val="552911737"/>
       </p:ext>
     </p:extLst>
   </p:cSld>
@@ -2156,10 +2204,14 @@
           <a:lstStyle/>
           <a:p>
             <a:r>
-              <a:rPr lang="pt-BR" smtClean="0"/>
-              <a:t>Clique para editar o estilo do título mestre</a:t>
-            </a:r>
-            <a:endParaRPr lang="pt-BR"/>
+              <a:rPr lang="pt-BR" dirty="0" smtClean="0"/>
+              <a:t>Clique para editar o estilo do </a:t>
+            </a:r>
+            <a:r>
+              <a:rPr lang="pt-BR" dirty="0" smtClean="0"/>
+              <a:t>título mestre</a:t>
+            </a:r>
+            <a:endParaRPr lang="pt-BR" dirty="0"/>
           </a:p>
         </p:txBody>
       </p:sp>
@@ -5257,7 +5309,7 @@
     </p:spTree>
     <p:extLst>
       <p:ext uri="{BB962C8B-B14F-4D97-AF65-F5344CB8AC3E}">
-        <p14:creationId xmlns:p14="http://schemas.microsoft.com/office/powerpoint/2010/main" val="2996355730"/>
+        <p14:creationId xmlns:p14="http://schemas.microsoft.com/office/powerpoint/2010/main" xmlns="" val="2996355730"/>
       </p:ext>
     </p:extLst>
   </p:cSld>
@@ -5407,10 +5459,10 @@
           <p:nvPr/>
         </p:nvPicPr>
         <p:blipFill>
-          <a:blip r:embed="rId2">
+          <a:blip r:embed="rId2" cstate="print">
             <a:extLst>
               <a:ext uri="{28A0092B-C50C-407E-A947-70E740481C1C}">
-                <a14:useLocalDpi xmlns:a14="http://schemas.microsoft.com/office/drawing/2010/main" val="0"/>
+                <a14:useLocalDpi xmlns:a14="http://schemas.microsoft.com/office/drawing/2010/main" xmlns="" val="0"/>
               </a:ext>
             </a:extLst>
           </a:blip>
@@ -5431,7 +5483,7 @@
     </p:spTree>
     <p:extLst>
       <p:ext uri="{BB962C8B-B14F-4D97-AF65-F5344CB8AC3E}">
-        <p14:creationId xmlns:p14="http://schemas.microsoft.com/office/powerpoint/2010/main" val="4277231462"/>
+        <p14:creationId xmlns:p14="http://schemas.microsoft.com/office/powerpoint/2010/main" xmlns="" val="4277231462"/>
       </p:ext>
     </p:extLst>
   </p:cSld>
@@ -5573,10 +5625,10 @@
           <p:nvPr/>
         </p:nvPicPr>
         <p:blipFill>
-          <a:blip r:embed="rId2">
+          <a:blip r:embed="rId2" cstate="print">
             <a:extLst>
               <a:ext uri="{28A0092B-C50C-407E-A947-70E740481C1C}">
-                <a14:useLocalDpi xmlns:a14="http://schemas.microsoft.com/office/drawing/2010/main" val="0"/>
+                <a14:useLocalDpi xmlns:a14="http://schemas.microsoft.com/office/drawing/2010/main" xmlns="" val="0"/>
               </a:ext>
             </a:extLst>
           </a:blip>
@@ -5586,8 +5638,8 @@
         </p:blipFill>
         <p:spPr>
           <a:xfrm>
-            <a:off x="1975195" y="1494958"/>
-            <a:ext cx="5193610" cy="4754349"/>
+            <a:off x="1975194" y="1494958"/>
+            <a:ext cx="5765157" cy="5277556"/>
           </a:xfrm>
           <a:prstGeom prst="rect">
             <a:avLst/>
@@ -5597,7 +5649,7 @@
     </p:spTree>
     <p:extLst>
       <p:ext uri="{BB962C8B-B14F-4D97-AF65-F5344CB8AC3E}">
-        <p14:creationId xmlns:p14="http://schemas.microsoft.com/office/powerpoint/2010/main" val="1162909256"/>
+        <p14:creationId xmlns:p14="http://schemas.microsoft.com/office/powerpoint/2010/main" xmlns="" val="1162909256"/>
       </p:ext>
     </p:extLst>
   </p:cSld>
@@ -5739,10 +5791,10 @@
           <p:nvPr/>
         </p:nvPicPr>
         <p:blipFill>
-          <a:blip r:embed="rId2">
+          <a:blip r:embed="rId2" cstate="print">
             <a:extLst>
               <a:ext uri="{28A0092B-C50C-407E-A947-70E740481C1C}">
-                <a14:useLocalDpi xmlns:a14="http://schemas.microsoft.com/office/drawing/2010/main" val="0"/>
+                <a14:useLocalDpi xmlns:a14="http://schemas.microsoft.com/office/drawing/2010/main" xmlns="" val="0"/>
               </a:ext>
             </a:extLst>
           </a:blip>
@@ -5763,7 +5815,7 @@
     </p:spTree>
     <p:extLst>
       <p:ext uri="{BB962C8B-B14F-4D97-AF65-F5344CB8AC3E}">
-        <p14:creationId xmlns:p14="http://schemas.microsoft.com/office/powerpoint/2010/main" val="368072451"/>
+        <p14:creationId xmlns:p14="http://schemas.microsoft.com/office/powerpoint/2010/main" xmlns="" val="368072451"/>
       </p:ext>
     </p:extLst>
   </p:cSld>
@@ -5905,10 +5957,10 @@
           <p:nvPr/>
         </p:nvPicPr>
         <p:blipFill>
-          <a:blip r:embed="rId2">
+          <a:blip r:embed="rId2" cstate="print">
             <a:extLst>
               <a:ext uri="{28A0092B-C50C-407E-A947-70E740481C1C}">
-                <a14:useLocalDpi xmlns:a14="http://schemas.microsoft.com/office/drawing/2010/main" val="0"/>
+                <a14:useLocalDpi xmlns:a14="http://schemas.microsoft.com/office/drawing/2010/main" xmlns="" val="0"/>
               </a:ext>
             </a:extLst>
           </a:blip>
@@ -5929,7 +5981,7 @@
     </p:spTree>
     <p:extLst>
       <p:ext uri="{BB962C8B-B14F-4D97-AF65-F5344CB8AC3E}">
-        <p14:creationId xmlns:p14="http://schemas.microsoft.com/office/powerpoint/2010/main" val="917990213"/>
+        <p14:creationId xmlns:p14="http://schemas.microsoft.com/office/powerpoint/2010/main" xmlns="" val="917990213"/>
       </p:ext>
     </p:extLst>
   </p:cSld>
@@ -6064,38 +6116,80 @@
       </p:sp>
       <p:pic>
         <p:nvPicPr>
-          <p:cNvPr id="3" name="Imagem 2"/>
+          <p:cNvPr id="9" name="Imagem 8" descr="aluno.jpg"/>
           <p:cNvPicPr>
             <a:picLocks noChangeAspect="1"/>
           </p:cNvPicPr>
           <p:nvPr/>
         </p:nvPicPr>
         <p:blipFill>
-          <a:blip r:embed="rId2">
-            <a:extLst>
-              <a:ext uri="{28A0092B-C50C-407E-A947-70E740481C1C}">
-                <a14:useLocalDpi xmlns:a14="http://schemas.microsoft.com/office/drawing/2010/main" val="0"/>
-              </a:ext>
-            </a:extLst>
-          </a:blip>
+          <a:blip r:embed="rId2" cstate="print"/>
           <a:stretch>
             <a:fillRect/>
           </a:stretch>
         </p:blipFill>
         <p:spPr>
           <a:xfrm>
-            <a:off x="1101694" y="1455526"/>
-            <a:ext cx="6940611" cy="4793035"/>
+            <a:off x="467544" y="1508664"/>
+            <a:ext cx="8487946" cy="5301208"/>
           </a:xfrm>
           <a:prstGeom prst="rect">
             <a:avLst/>
           </a:prstGeom>
         </p:spPr>
       </p:pic>
+      <p:sp>
+        <p:nvSpPr>
+          <p:cNvPr id="10" name="CaixaDeTexto 9"/>
+          <p:cNvSpPr txBox="1"/>
+          <p:nvPr/>
+        </p:nvSpPr>
+        <p:spPr>
+          <a:xfrm>
+            <a:off x="395536" y="6021288"/>
+            <a:ext cx="2082621" cy="646331"/>
+          </a:xfrm>
+          <a:prstGeom prst="rect">
+            <a:avLst/>
+          </a:prstGeom>
+          <a:noFill/>
+        </p:spPr>
+        <p:txBody>
+          <a:bodyPr wrap="none" rtlCol="0">
+            <a:spAutoFit/>
+          </a:bodyPr>
+          <a:lstStyle/>
+          <a:p>
+            <a:r>
+              <a:rPr lang="pt-BR" dirty="0" smtClean="0">
+                <a:solidFill>
+                  <a:srgbClr val="0000FF"/>
+                </a:solidFill>
+              </a:rPr>
+              <a:t>Caso de Uso:</a:t>
+            </a:r>
+          </a:p>
+          <a:p>
+            <a:r>
+              <a:rPr lang="pt-BR" dirty="0" smtClean="0">
+                <a:solidFill>
+                  <a:srgbClr val="0000FF"/>
+                </a:solidFill>
+              </a:rPr>
+              <a:t>Cadastro Paciente</a:t>
+            </a:r>
+            <a:endParaRPr lang="pt-BR" dirty="0">
+              <a:solidFill>
+                <a:srgbClr val="0000FF"/>
+              </a:solidFill>
+            </a:endParaRPr>
+          </a:p>
+        </p:txBody>
+      </p:sp>
     </p:spTree>
     <p:extLst>
       <p:ext uri="{BB962C8B-B14F-4D97-AF65-F5344CB8AC3E}">
-        <p14:creationId xmlns:p14="http://schemas.microsoft.com/office/powerpoint/2010/main" val="269218475"/>
+        <p14:creationId xmlns:p14="http://schemas.microsoft.com/office/powerpoint/2010/main" xmlns="" val="269218475"/>
       </p:ext>
     </p:extLst>
   </p:cSld>
@@ -6237,10 +6331,10 @@
           <p:nvPr/>
         </p:nvPicPr>
         <p:blipFill>
-          <a:blip r:embed="rId2">
+          <a:blip r:embed="rId2" cstate="print">
             <a:extLst>
               <a:ext uri="{28A0092B-C50C-407E-A947-70E740481C1C}">
-                <a14:useLocalDpi xmlns:a14="http://schemas.microsoft.com/office/drawing/2010/main" val="0"/>
+                <a14:useLocalDpi xmlns:a14="http://schemas.microsoft.com/office/drawing/2010/main" xmlns="" val="0"/>
               </a:ext>
             </a:extLst>
           </a:blip>
@@ -6261,7 +6355,7 @@
     </p:spTree>
     <p:extLst>
       <p:ext uri="{BB962C8B-B14F-4D97-AF65-F5344CB8AC3E}">
-        <p14:creationId xmlns:p14="http://schemas.microsoft.com/office/powerpoint/2010/main" val="2856898022"/>
+        <p14:creationId xmlns:p14="http://schemas.microsoft.com/office/powerpoint/2010/main" xmlns="" val="2856898022"/>
       </p:ext>
     </p:extLst>
   </p:cSld>
@@ -6403,10 +6497,10 @@
           <p:nvPr/>
         </p:nvPicPr>
         <p:blipFill>
-          <a:blip r:embed="rId2">
+          <a:blip r:embed="rId2" cstate="print">
             <a:extLst>
               <a:ext uri="{28A0092B-C50C-407E-A947-70E740481C1C}">
-                <a14:useLocalDpi xmlns:a14="http://schemas.microsoft.com/office/drawing/2010/main" val="0"/>
+                <a14:useLocalDpi xmlns:a14="http://schemas.microsoft.com/office/drawing/2010/main" xmlns="" val="0"/>
               </a:ext>
             </a:extLst>
           </a:blip>
@@ -6427,7 +6521,7 @@
     </p:spTree>
     <p:extLst>
       <p:ext uri="{BB962C8B-B14F-4D97-AF65-F5344CB8AC3E}">
-        <p14:creationId xmlns:p14="http://schemas.microsoft.com/office/powerpoint/2010/main" val="1363267461"/>
+        <p14:creationId xmlns:p14="http://schemas.microsoft.com/office/powerpoint/2010/main" xmlns="" val="1363267461"/>
       </p:ext>
     </p:extLst>
   </p:cSld>
@@ -6569,10 +6663,10 @@
           <p:nvPr/>
         </p:nvPicPr>
         <p:blipFill>
-          <a:blip r:embed="rId2">
+          <a:blip r:embed="rId2" cstate="print">
             <a:extLst>
               <a:ext uri="{28A0092B-C50C-407E-A947-70E740481C1C}">
-                <a14:useLocalDpi xmlns:a14="http://schemas.microsoft.com/office/drawing/2010/main" val="0"/>
+                <a14:useLocalDpi xmlns:a14="http://schemas.microsoft.com/office/drawing/2010/main" xmlns="" val="0"/>
               </a:ext>
             </a:extLst>
           </a:blip>
@@ -6593,7 +6687,7 @@
     </p:spTree>
     <p:extLst>
       <p:ext uri="{BB962C8B-B14F-4D97-AF65-F5344CB8AC3E}">
-        <p14:creationId xmlns:p14="http://schemas.microsoft.com/office/powerpoint/2010/main" val="1273683969"/>
+        <p14:creationId xmlns:p14="http://schemas.microsoft.com/office/powerpoint/2010/main" xmlns="" val="1273683969"/>
       </p:ext>
     </p:extLst>
   </p:cSld>
@@ -6735,10 +6829,10 @@
           <p:nvPr/>
         </p:nvPicPr>
         <p:blipFill>
-          <a:blip r:embed="rId2">
+          <a:blip r:embed="rId2" cstate="print">
             <a:extLst>
               <a:ext uri="{28A0092B-C50C-407E-A947-70E740481C1C}">
-                <a14:useLocalDpi xmlns:a14="http://schemas.microsoft.com/office/drawing/2010/main" val="0"/>
+                <a14:useLocalDpi xmlns:a14="http://schemas.microsoft.com/office/drawing/2010/main" xmlns="" val="0"/>
               </a:ext>
             </a:extLst>
           </a:blip>
@@ -6765,10 +6859,10 @@
           <p:nvPr/>
         </p:nvPicPr>
         <p:blipFill>
-          <a:blip r:embed="rId3">
+          <a:blip r:embed="rId3" cstate="print">
             <a:extLst>
               <a:ext uri="{28A0092B-C50C-407E-A947-70E740481C1C}">
-                <a14:useLocalDpi xmlns:a14="http://schemas.microsoft.com/office/drawing/2010/main" val="0"/>
+                <a14:useLocalDpi xmlns:a14="http://schemas.microsoft.com/office/drawing/2010/main" xmlns="" val="0"/>
               </a:ext>
             </a:extLst>
           </a:blip>
@@ -6789,7 +6883,7 @@
     </p:spTree>
     <p:extLst>
       <p:ext uri="{BB962C8B-B14F-4D97-AF65-F5344CB8AC3E}">
-        <p14:creationId xmlns:p14="http://schemas.microsoft.com/office/powerpoint/2010/main" val="2007851057"/>
+        <p14:creationId xmlns:p14="http://schemas.microsoft.com/office/powerpoint/2010/main" xmlns="" val="2007851057"/>
       </p:ext>
     </p:extLst>
   </p:cSld>
@@ -7096,10 +7190,10 @@
           <p:nvPr/>
         </p:nvPicPr>
         <p:blipFill>
-          <a:blip r:embed="rId2">
+          <a:blip r:embed="rId2" cstate="print">
             <a:extLst>
               <a:ext uri="{28A0092B-C50C-407E-A947-70E740481C1C}">
-                <a14:useLocalDpi xmlns:a14="http://schemas.microsoft.com/office/drawing/2010/main" val="0"/>
+                <a14:useLocalDpi xmlns:a14="http://schemas.microsoft.com/office/drawing/2010/main" xmlns="" val="0"/>
               </a:ext>
             </a:extLst>
           </a:blip>
@@ -7120,7 +7214,7 @@
     </p:spTree>
     <p:extLst>
       <p:ext uri="{BB962C8B-B14F-4D97-AF65-F5344CB8AC3E}">
-        <p14:creationId xmlns:p14="http://schemas.microsoft.com/office/powerpoint/2010/main" val="479288004"/>
+        <p14:creationId xmlns:p14="http://schemas.microsoft.com/office/powerpoint/2010/main" xmlns="" val="479288004"/>
       </p:ext>
     </p:extLst>
   </p:cSld>
@@ -7262,10 +7356,10 @@
           <p:nvPr/>
         </p:nvPicPr>
         <p:blipFill>
-          <a:blip r:embed="rId2">
+          <a:blip r:embed="rId2" cstate="print">
             <a:extLst>
               <a:ext uri="{28A0092B-C50C-407E-A947-70E740481C1C}">
-                <a14:useLocalDpi xmlns:a14="http://schemas.microsoft.com/office/drawing/2010/main" val="0"/>
+                <a14:useLocalDpi xmlns:a14="http://schemas.microsoft.com/office/drawing/2010/main" xmlns="" val="0"/>
               </a:ext>
             </a:extLst>
           </a:blip>
@@ -7292,10 +7386,10 @@
           <p:nvPr/>
         </p:nvPicPr>
         <p:blipFill>
-          <a:blip r:embed="rId3">
+          <a:blip r:embed="rId3" cstate="print">
             <a:extLst>
               <a:ext uri="{28A0092B-C50C-407E-A947-70E740481C1C}">
-                <a14:useLocalDpi xmlns:a14="http://schemas.microsoft.com/office/drawing/2010/main" val="0"/>
+                <a14:useLocalDpi xmlns:a14="http://schemas.microsoft.com/office/drawing/2010/main" xmlns="" val="0"/>
               </a:ext>
             </a:extLst>
           </a:blip>
@@ -7316,7 +7410,7 @@
     </p:spTree>
     <p:extLst>
       <p:ext uri="{BB962C8B-B14F-4D97-AF65-F5344CB8AC3E}">
-        <p14:creationId xmlns:p14="http://schemas.microsoft.com/office/powerpoint/2010/main" val="1486041614"/>
+        <p14:creationId xmlns:p14="http://schemas.microsoft.com/office/powerpoint/2010/main" xmlns="" val="1486041614"/>
       </p:ext>
     </p:extLst>
   </p:cSld>
@@ -7458,10 +7552,10 @@
           <p:nvPr/>
         </p:nvPicPr>
         <p:blipFill>
-          <a:blip r:embed="rId2">
+          <a:blip r:embed="rId2" cstate="print">
             <a:extLst>
               <a:ext uri="{28A0092B-C50C-407E-A947-70E740481C1C}">
-                <a14:useLocalDpi xmlns:a14="http://schemas.microsoft.com/office/drawing/2010/main" val="0"/>
+                <a14:useLocalDpi xmlns:a14="http://schemas.microsoft.com/office/drawing/2010/main" xmlns="" val="0"/>
               </a:ext>
             </a:extLst>
           </a:blip>
@@ -7482,7 +7576,7 @@
     </p:spTree>
     <p:extLst>
       <p:ext uri="{BB962C8B-B14F-4D97-AF65-F5344CB8AC3E}">
-        <p14:creationId xmlns:p14="http://schemas.microsoft.com/office/powerpoint/2010/main" val="2149158567"/>
+        <p14:creationId xmlns:p14="http://schemas.microsoft.com/office/powerpoint/2010/main" xmlns="" val="2149158567"/>
       </p:ext>
     </p:extLst>
   </p:cSld>
@@ -7624,10 +7718,10 @@
           <p:nvPr/>
         </p:nvPicPr>
         <p:blipFill>
-          <a:blip r:embed="rId2">
+          <a:blip r:embed="rId2" cstate="print">
             <a:extLst>
               <a:ext uri="{28A0092B-C50C-407E-A947-70E740481C1C}">
-                <a14:useLocalDpi xmlns:a14="http://schemas.microsoft.com/office/drawing/2010/main" val="0"/>
+                <a14:useLocalDpi xmlns:a14="http://schemas.microsoft.com/office/drawing/2010/main" xmlns="" val="0"/>
               </a:ext>
             </a:extLst>
           </a:blip>
@@ -7648,7 +7742,7 @@
     </p:spTree>
     <p:extLst>
       <p:ext uri="{BB962C8B-B14F-4D97-AF65-F5344CB8AC3E}">
-        <p14:creationId xmlns:p14="http://schemas.microsoft.com/office/powerpoint/2010/main" val="3605697371"/>
+        <p14:creationId xmlns:p14="http://schemas.microsoft.com/office/powerpoint/2010/main" xmlns="" val="3605697371"/>
       </p:ext>
     </p:extLst>
   </p:cSld>
@@ -7790,10 +7884,10 @@
           <p:nvPr/>
         </p:nvPicPr>
         <p:blipFill>
-          <a:blip r:embed="rId2">
+          <a:blip r:embed="rId2" cstate="print">
             <a:extLst>
               <a:ext uri="{28A0092B-C50C-407E-A947-70E740481C1C}">
-                <a14:useLocalDpi xmlns:a14="http://schemas.microsoft.com/office/drawing/2010/main" val="0"/>
+                <a14:useLocalDpi xmlns:a14="http://schemas.microsoft.com/office/drawing/2010/main" xmlns="" val="0"/>
               </a:ext>
             </a:extLst>
           </a:blip>
@@ -7814,7 +7908,7 @@
     </p:spTree>
     <p:extLst>
       <p:ext uri="{BB962C8B-B14F-4D97-AF65-F5344CB8AC3E}">
-        <p14:creationId xmlns:p14="http://schemas.microsoft.com/office/powerpoint/2010/main" val="278049137"/>
+        <p14:creationId xmlns:p14="http://schemas.microsoft.com/office/powerpoint/2010/main" xmlns="" val="278049137"/>
       </p:ext>
     </p:extLst>
   </p:cSld>
@@ -7956,10 +8050,10 @@
           <p:nvPr/>
         </p:nvPicPr>
         <p:blipFill>
-          <a:blip r:embed="rId2">
+          <a:blip r:embed="rId2" cstate="print">
             <a:extLst>
               <a:ext uri="{28A0092B-C50C-407E-A947-70E740481C1C}">
-                <a14:useLocalDpi xmlns:a14="http://schemas.microsoft.com/office/drawing/2010/main" val="0"/>
+                <a14:useLocalDpi xmlns:a14="http://schemas.microsoft.com/office/drawing/2010/main" xmlns="" val="0"/>
               </a:ext>
             </a:extLst>
           </a:blip>
@@ -7986,10 +8080,10 @@
           <p:nvPr/>
         </p:nvPicPr>
         <p:blipFill>
-          <a:blip r:embed="rId3">
+          <a:blip r:embed="rId3" cstate="print">
             <a:extLst>
               <a:ext uri="{28A0092B-C50C-407E-A947-70E740481C1C}">
-                <a14:useLocalDpi xmlns:a14="http://schemas.microsoft.com/office/drawing/2010/main" val="0"/>
+                <a14:useLocalDpi xmlns:a14="http://schemas.microsoft.com/office/drawing/2010/main" xmlns="" val="0"/>
               </a:ext>
             </a:extLst>
           </a:blip>
@@ -8010,7 +8104,7 @@
     </p:spTree>
     <p:extLst>
       <p:ext uri="{BB962C8B-B14F-4D97-AF65-F5344CB8AC3E}">
-        <p14:creationId xmlns:p14="http://schemas.microsoft.com/office/powerpoint/2010/main" val="3479499341"/>
+        <p14:creationId xmlns:p14="http://schemas.microsoft.com/office/powerpoint/2010/main" xmlns="" val="3479499341"/>
       </p:ext>
     </p:extLst>
   </p:cSld>
@@ -8152,10 +8246,10 @@
           <p:nvPr/>
         </p:nvPicPr>
         <p:blipFill>
-          <a:blip r:embed="rId2">
+          <a:blip r:embed="rId2" cstate="print">
             <a:extLst>
               <a:ext uri="{28A0092B-C50C-407E-A947-70E740481C1C}">
-                <a14:useLocalDpi xmlns:a14="http://schemas.microsoft.com/office/drawing/2010/main" val="0"/>
+                <a14:useLocalDpi xmlns:a14="http://schemas.microsoft.com/office/drawing/2010/main" xmlns="" val="0"/>
               </a:ext>
             </a:extLst>
           </a:blip>
@@ -8176,7 +8270,7 @@
     </p:spTree>
     <p:extLst>
       <p:ext uri="{BB962C8B-B14F-4D97-AF65-F5344CB8AC3E}">
-        <p14:creationId xmlns:p14="http://schemas.microsoft.com/office/powerpoint/2010/main" val="2927019537"/>
+        <p14:creationId xmlns:p14="http://schemas.microsoft.com/office/powerpoint/2010/main" xmlns="" val="2927019537"/>
       </p:ext>
     </p:extLst>
   </p:cSld>
@@ -8318,10 +8412,10 @@
           <p:nvPr/>
         </p:nvPicPr>
         <p:blipFill>
-          <a:blip r:embed="rId2">
+          <a:blip r:embed="rId2" cstate="print">
             <a:extLst>
               <a:ext uri="{28A0092B-C50C-407E-A947-70E740481C1C}">
-                <a14:useLocalDpi xmlns:a14="http://schemas.microsoft.com/office/drawing/2010/main" val="0"/>
+                <a14:useLocalDpi xmlns:a14="http://schemas.microsoft.com/office/drawing/2010/main" xmlns="" val="0"/>
               </a:ext>
             </a:extLst>
           </a:blip>
@@ -8342,7 +8436,7 @@
     </p:spTree>
     <p:extLst>
       <p:ext uri="{BB962C8B-B14F-4D97-AF65-F5344CB8AC3E}">
-        <p14:creationId xmlns:p14="http://schemas.microsoft.com/office/powerpoint/2010/main" val="2764742115"/>
+        <p14:creationId xmlns:p14="http://schemas.microsoft.com/office/powerpoint/2010/main" xmlns="" val="2764742115"/>
       </p:ext>
     </p:extLst>
   </p:cSld>
@@ -8484,10 +8578,10 @@
           <p:nvPr/>
         </p:nvPicPr>
         <p:blipFill>
-          <a:blip r:embed="rId2">
+          <a:blip r:embed="rId2" cstate="print">
             <a:extLst>
               <a:ext uri="{28A0092B-C50C-407E-A947-70E740481C1C}">
-                <a14:useLocalDpi xmlns:a14="http://schemas.microsoft.com/office/drawing/2010/main" val="0"/>
+                <a14:useLocalDpi xmlns:a14="http://schemas.microsoft.com/office/drawing/2010/main" xmlns="" val="0"/>
               </a:ext>
             </a:extLst>
           </a:blip>
@@ -8508,7 +8602,7 @@
     </p:spTree>
     <p:extLst>
       <p:ext uri="{BB962C8B-B14F-4D97-AF65-F5344CB8AC3E}">
-        <p14:creationId xmlns:p14="http://schemas.microsoft.com/office/powerpoint/2010/main" val="2749198392"/>
+        <p14:creationId xmlns:p14="http://schemas.microsoft.com/office/powerpoint/2010/main" xmlns="" val="2749198392"/>
       </p:ext>
     </p:extLst>
   </p:cSld>
@@ -8650,10 +8744,10 @@
           <p:nvPr/>
         </p:nvPicPr>
         <p:blipFill>
-          <a:blip r:embed="rId2">
+          <a:blip r:embed="rId2" cstate="print">
             <a:extLst>
               <a:ext uri="{28A0092B-C50C-407E-A947-70E740481C1C}">
-                <a14:useLocalDpi xmlns:a14="http://schemas.microsoft.com/office/drawing/2010/main" val="0"/>
+                <a14:useLocalDpi xmlns:a14="http://schemas.microsoft.com/office/drawing/2010/main" xmlns="" val="0"/>
               </a:ext>
             </a:extLst>
           </a:blip>
@@ -8674,7 +8768,7 @@
     </p:spTree>
     <p:extLst>
       <p:ext uri="{BB962C8B-B14F-4D97-AF65-F5344CB8AC3E}">
-        <p14:creationId xmlns:p14="http://schemas.microsoft.com/office/powerpoint/2010/main" val="3861423228"/>
+        <p14:creationId xmlns:p14="http://schemas.microsoft.com/office/powerpoint/2010/main" xmlns="" val="3861423228"/>
       </p:ext>
     </p:extLst>
   </p:cSld>
@@ -8816,10 +8910,10 @@
           <p:nvPr/>
         </p:nvPicPr>
         <p:blipFill>
-          <a:blip r:embed="rId2">
+          <a:blip r:embed="rId2" cstate="print">
             <a:extLst>
               <a:ext uri="{28A0092B-C50C-407E-A947-70E740481C1C}">
-                <a14:useLocalDpi xmlns:a14="http://schemas.microsoft.com/office/drawing/2010/main" val="0"/>
+                <a14:useLocalDpi xmlns:a14="http://schemas.microsoft.com/office/drawing/2010/main" xmlns="" val="0"/>
               </a:ext>
             </a:extLst>
           </a:blip>
@@ -8840,7 +8934,7 @@
     </p:spTree>
     <p:extLst>
       <p:ext uri="{BB962C8B-B14F-4D97-AF65-F5344CB8AC3E}">
-        <p14:creationId xmlns:p14="http://schemas.microsoft.com/office/powerpoint/2010/main" val="1503807568"/>
+        <p14:creationId xmlns:p14="http://schemas.microsoft.com/office/powerpoint/2010/main" xmlns="" val="1503807568"/>
       </p:ext>
     </p:extLst>
   </p:cSld>
@@ -8982,10 +9076,10 @@
           <p:nvPr/>
         </p:nvPicPr>
         <p:blipFill>
-          <a:blip r:embed="rId2">
+          <a:blip r:embed="rId2" cstate="print">
             <a:extLst>
               <a:ext uri="{28A0092B-C50C-407E-A947-70E740481C1C}">
-                <a14:useLocalDpi xmlns:a14="http://schemas.microsoft.com/office/drawing/2010/main" val="0"/>
+                <a14:useLocalDpi xmlns:a14="http://schemas.microsoft.com/office/drawing/2010/main" xmlns="" val="0"/>
               </a:ext>
             </a:extLst>
           </a:blip>
@@ -9006,7 +9100,7 @@
     </p:spTree>
     <p:extLst>
       <p:ext uri="{BB962C8B-B14F-4D97-AF65-F5344CB8AC3E}">
-        <p14:creationId xmlns:p14="http://schemas.microsoft.com/office/powerpoint/2010/main" val="3864861450"/>
+        <p14:creationId xmlns:p14="http://schemas.microsoft.com/office/powerpoint/2010/main" xmlns="" val="3864861450"/>
       </p:ext>
     </p:extLst>
   </p:cSld>
@@ -9148,10 +9242,10 @@
           <p:nvPr/>
         </p:nvPicPr>
         <p:blipFill>
-          <a:blip r:embed="rId2">
+          <a:blip r:embed="rId2" cstate="print">
             <a:extLst>
               <a:ext uri="{28A0092B-C50C-407E-A947-70E740481C1C}">
-                <a14:useLocalDpi xmlns:a14="http://schemas.microsoft.com/office/drawing/2010/main" val="0"/>
+                <a14:useLocalDpi xmlns:a14="http://schemas.microsoft.com/office/drawing/2010/main" xmlns="" val="0"/>
               </a:ext>
             </a:extLst>
           </a:blip>
@@ -9172,7 +9266,7 @@
     </p:spTree>
     <p:extLst>
       <p:ext uri="{BB962C8B-B14F-4D97-AF65-F5344CB8AC3E}">
-        <p14:creationId xmlns:p14="http://schemas.microsoft.com/office/powerpoint/2010/main" val="252870303"/>
+        <p14:creationId xmlns:p14="http://schemas.microsoft.com/office/powerpoint/2010/main" xmlns="" val="252870303"/>
       </p:ext>
     </p:extLst>
   </p:cSld>
@@ -9255,13 +9349,16 @@
           <a:p>
             <a:r>
               <a:rPr lang="pt-BR" dirty="0" smtClean="0"/>
-              <a:t>O ponto fraco do sistema é a quantidade pequena de </a:t>
-            </a:r>
-            <a:r>
-              <a:rPr lang="pt-BR" smtClean="0"/>
-              <a:t>funcionalidades dele.</a:t>
-            </a:r>
-            <a:endParaRPr lang="pt-BR" dirty="0" smtClean="0"/>
+              <a:t>O </a:t>
+            </a:r>
+            <a:r>
+              <a:rPr lang="pt-BR" dirty="0" smtClean="0"/>
+              <a:t>ponto fraco </a:t>
+            </a:r>
+            <a:r>
+              <a:rPr lang="pt-BR" dirty="0" smtClean="0"/>
+              <a:t>do sistema é a quantidade pequena de funcionalidades dele.</a:t>
+            </a:r>
           </a:p>
         </p:txBody>
       </p:sp>
@@ -9490,7 +9587,7 @@
     </p:spTree>
     <p:extLst>
       <p:ext uri="{BB962C8B-B14F-4D97-AF65-F5344CB8AC3E}">
-        <p14:creationId xmlns:p14="http://schemas.microsoft.com/office/powerpoint/2010/main" val="3588191264"/>
+        <p14:creationId xmlns:p14="http://schemas.microsoft.com/office/powerpoint/2010/main" xmlns="" val="3588191264"/>
       </p:ext>
     </p:extLst>
   </p:cSld>
@@ -9632,10 +9729,10 @@
           <p:nvPr/>
         </p:nvPicPr>
         <p:blipFill>
-          <a:blip r:embed="rId2">
+          <a:blip r:embed="rId2" cstate="print">
             <a:extLst>
               <a:ext uri="{28A0092B-C50C-407E-A947-70E740481C1C}">
-                <a14:useLocalDpi xmlns:a14="http://schemas.microsoft.com/office/drawing/2010/main" val="0"/>
+                <a14:useLocalDpi xmlns:a14="http://schemas.microsoft.com/office/drawing/2010/main" xmlns="" val="0"/>
               </a:ext>
             </a:extLst>
           </a:blip>
@@ -9656,7 +9753,7 @@
     </p:spTree>
     <p:extLst>
       <p:ext uri="{BB962C8B-B14F-4D97-AF65-F5344CB8AC3E}">
-        <p14:creationId xmlns:p14="http://schemas.microsoft.com/office/powerpoint/2010/main" val="3867898359"/>
+        <p14:creationId xmlns:p14="http://schemas.microsoft.com/office/powerpoint/2010/main" xmlns="" val="3867898359"/>
       </p:ext>
     </p:extLst>
   </p:cSld>
@@ -9798,10 +9895,10 @@
           <p:nvPr/>
         </p:nvPicPr>
         <p:blipFill>
-          <a:blip r:embed="rId2">
+          <a:blip r:embed="rId2" cstate="print">
             <a:extLst>
               <a:ext uri="{28A0092B-C50C-407E-A947-70E740481C1C}">
-                <a14:useLocalDpi xmlns:a14="http://schemas.microsoft.com/office/drawing/2010/main" val="0"/>
+                <a14:useLocalDpi xmlns:a14="http://schemas.microsoft.com/office/drawing/2010/main" xmlns="" val="0"/>
               </a:ext>
             </a:extLst>
           </a:blip>
@@ -9822,7 +9919,7 @@
     </p:spTree>
     <p:extLst>
       <p:ext uri="{BB962C8B-B14F-4D97-AF65-F5344CB8AC3E}">
-        <p14:creationId xmlns:p14="http://schemas.microsoft.com/office/powerpoint/2010/main" val="1403961185"/>
+        <p14:creationId xmlns:p14="http://schemas.microsoft.com/office/powerpoint/2010/main" xmlns="" val="1403961185"/>
       </p:ext>
     </p:extLst>
   </p:cSld>
@@ -9964,10 +10061,10 @@
           <p:nvPr/>
         </p:nvPicPr>
         <p:blipFill>
-          <a:blip r:embed="rId2">
+          <a:blip r:embed="rId2" cstate="print">
             <a:extLst>
               <a:ext uri="{28A0092B-C50C-407E-A947-70E740481C1C}">
-                <a14:useLocalDpi xmlns:a14="http://schemas.microsoft.com/office/drawing/2010/main" val="0"/>
+                <a14:useLocalDpi xmlns:a14="http://schemas.microsoft.com/office/drawing/2010/main" xmlns="" val="0"/>
               </a:ext>
             </a:extLst>
           </a:blip>
@@ -10025,7 +10122,7 @@
     </p:spTree>
     <p:extLst>
       <p:ext uri="{BB962C8B-B14F-4D97-AF65-F5344CB8AC3E}">
-        <p14:creationId xmlns:p14="http://schemas.microsoft.com/office/powerpoint/2010/main" val="2925749522"/>
+        <p14:creationId xmlns:p14="http://schemas.microsoft.com/office/powerpoint/2010/main" xmlns="" val="2925749522"/>
       </p:ext>
     </p:extLst>
   </p:cSld>
@@ -10170,7 +10267,7 @@
           <a:blip r:embed="rId2" cstate="print">
             <a:extLst>
               <a:ext uri="{28A0092B-C50C-407E-A947-70E740481C1C}">
-                <a14:useLocalDpi xmlns:a14="http://schemas.microsoft.com/office/drawing/2010/main" val="0"/>
+                <a14:useLocalDpi xmlns:a14="http://schemas.microsoft.com/office/drawing/2010/main" xmlns="" val="0"/>
               </a:ext>
             </a:extLst>
           </a:blip>
@@ -10234,10 +10331,10 @@
           <p:nvPr/>
         </p:nvPicPr>
         <p:blipFill>
-          <a:blip r:embed="rId3">
+          <a:blip r:embed="rId3" cstate="print">
             <a:extLst>
               <a:ext uri="{28A0092B-C50C-407E-A947-70E740481C1C}">
-                <a14:useLocalDpi xmlns:a14="http://schemas.microsoft.com/office/drawing/2010/main" val="0"/>
+                <a14:useLocalDpi xmlns:a14="http://schemas.microsoft.com/office/drawing/2010/main" xmlns="" val="0"/>
               </a:ext>
             </a:extLst>
           </a:blip>
@@ -10264,10 +10361,10 @@
           <p:nvPr/>
         </p:nvPicPr>
         <p:blipFill>
-          <a:blip r:embed="rId4">
+          <a:blip r:embed="rId4" cstate="print">
             <a:extLst>
               <a:ext uri="{28A0092B-C50C-407E-A947-70E740481C1C}">
-                <a14:useLocalDpi xmlns:a14="http://schemas.microsoft.com/office/drawing/2010/main" val="0"/>
+                <a14:useLocalDpi xmlns:a14="http://schemas.microsoft.com/office/drawing/2010/main" xmlns="" val="0"/>
               </a:ext>
             </a:extLst>
           </a:blip>
@@ -10288,7 +10385,7 @@
     </p:spTree>
     <p:extLst>
       <p:ext uri="{BB962C8B-B14F-4D97-AF65-F5344CB8AC3E}">
-        <p14:creationId xmlns:p14="http://schemas.microsoft.com/office/powerpoint/2010/main" val="3412004320"/>
+        <p14:creationId xmlns:p14="http://schemas.microsoft.com/office/powerpoint/2010/main" xmlns="" val="3412004320"/>
       </p:ext>
     </p:extLst>
   </p:cSld>
@@ -10430,10 +10527,10 @@
           <p:nvPr/>
         </p:nvPicPr>
         <p:blipFill>
-          <a:blip r:embed="rId2">
+          <a:blip r:embed="rId2" cstate="print">
             <a:extLst>
               <a:ext uri="{28A0092B-C50C-407E-A947-70E740481C1C}">
-                <a14:useLocalDpi xmlns:a14="http://schemas.microsoft.com/office/drawing/2010/main" val="0"/>
+                <a14:useLocalDpi xmlns:a14="http://schemas.microsoft.com/office/drawing/2010/main" xmlns="" val="0"/>
               </a:ext>
             </a:extLst>
           </a:blip>
@@ -10454,7 +10551,7 @@
     </p:spTree>
     <p:extLst>
       <p:ext uri="{BB962C8B-B14F-4D97-AF65-F5344CB8AC3E}">
-        <p14:creationId xmlns:p14="http://schemas.microsoft.com/office/powerpoint/2010/main" val="2898236993"/>
+        <p14:creationId xmlns:p14="http://schemas.microsoft.com/office/powerpoint/2010/main" xmlns="" val="2898236993"/>
       </p:ext>
     </p:extLst>
   </p:cSld>
@@ -10593,10 +10690,10 @@
           <p:nvPr/>
         </p:nvPicPr>
         <p:blipFill>
-          <a:blip r:embed="rId2">
+          <a:blip r:embed="rId2" cstate="print">
             <a:extLst>
               <a:ext uri="{28A0092B-C50C-407E-A947-70E740481C1C}">
-                <a14:useLocalDpi xmlns:a14="http://schemas.microsoft.com/office/drawing/2010/main" val="0"/>
+                <a14:useLocalDpi xmlns:a14="http://schemas.microsoft.com/office/drawing/2010/main" xmlns="" val="0"/>
               </a:ext>
             </a:extLst>
           </a:blip>
@@ -10617,7 +10714,7 @@
     </p:spTree>
     <p:extLst>
       <p:ext uri="{BB962C8B-B14F-4D97-AF65-F5344CB8AC3E}">
-        <p14:creationId xmlns:p14="http://schemas.microsoft.com/office/powerpoint/2010/main" val="3321499385"/>
+        <p14:creationId xmlns:p14="http://schemas.microsoft.com/office/powerpoint/2010/main" xmlns="" val="3321499385"/>
       </p:ext>
     </p:extLst>
   </p:cSld>

</xml_diff>

<commit_message>
Atualização de todos os slides para apresentação, visando atender os comentarios e ideias proprostas pelo professor.
</commit_message>
<xml_diff>
--- a/documentacao/G4_Apresentacao1sem2014.pptx
+++ b/documentacao/G4_Apresentacao1sem2014.pptx
@@ -5,10 +5,10 @@
     <p:sldMasterId id="2147483657" r:id="rId1"/>
   </p:sldMasterIdLst>
   <p:notesMasterIdLst>
-    <p:notesMasterId r:id="rId35"/>
+    <p:notesMasterId r:id="rId19"/>
   </p:notesMasterIdLst>
   <p:handoutMasterIdLst>
-    <p:handoutMasterId r:id="rId36"/>
+    <p:handoutMasterId r:id="rId20"/>
   </p:handoutMasterIdLst>
   <p:sldIdLst>
     <p:sldId id="256" r:id="rId2"/>
@@ -16,34 +16,18 @@
     <p:sldId id="270" r:id="rId4"/>
     <p:sldId id="265" r:id="rId5"/>
     <p:sldId id="267" r:id="rId6"/>
-    <p:sldId id="269" r:id="rId7"/>
-    <p:sldId id="266" r:id="rId8"/>
-    <p:sldId id="264" r:id="rId9"/>
-    <p:sldId id="268" r:id="rId10"/>
-    <p:sldId id="271" r:id="rId11"/>
-    <p:sldId id="272" r:id="rId12"/>
-    <p:sldId id="278" r:id="rId13"/>
-    <p:sldId id="273" r:id="rId14"/>
-    <p:sldId id="274" r:id="rId15"/>
-    <p:sldId id="286" r:id="rId16"/>
-    <p:sldId id="287" r:id="rId17"/>
-    <p:sldId id="288" r:id="rId18"/>
-    <p:sldId id="289" r:id="rId19"/>
-    <p:sldId id="290" r:id="rId20"/>
-    <p:sldId id="291" r:id="rId21"/>
-    <p:sldId id="292" r:id="rId22"/>
-    <p:sldId id="275" r:id="rId23"/>
-    <p:sldId id="279" r:id="rId24"/>
-    <p:sldId id="280" r:id="rId25"/>
-    <p:sldId id="276" r:id="rId26"/>
-    <p:sldId id="277" r:id="rId27"/>
-    <p:sldId id="281" r:id="rId28"/>
-    <p:sldId id="282" r:id="rId29"/>
-    <p:sldId id="283" r:id="rId30"/>
-    <p:sldId id="285" r:id="rId31"/>
-    <p:sldId id="284" r:id="rId32"/>
-    <p:sldId id="263" r:id="rId33"/>
-    <p:sldId id="293" r:id="rId34"/>
+    <p:sldId id="266" r:id="rId7"/>
+    <p:sldId id="264" r:id="rId8"/>
+    <p:sldId id="271" r:id="rId9"/>
+    <p:sldId id="272" r:id="rId10"/>
+    <p:sldId id="273" r:id="rId11"/>
+    <p:sldId id="294" r:id="rId12"/>
+    <p:sldId id="289" r:id="rId13"/>
+    <p:sldId id="290" r:id="rId14"/>
+    <p:sldId id="292" r:id="rId15"/>
+    <p:sldId id="275" r:id="rId16"/>
+    <p:sldId id="276" r:id="rId17"/>
+    <p:sldId id="263" r:id="rId18"/>
   </p:sldIdLst>
   <p:sldSz cx="9144000" cy="6858000" type="screen4x3"/>
   <p:notesSz cx="7010400" cy="9296400"/>
@@ -174,7 +158,7 @@
   </p:defaultTextStyle>
   <p:extLst>
     <p:ext uri="{EFAFB233-063F-42B5-8137-9DF3F51BA10A}">
-      <p15:sldGuideLst xmlns:p15="http://schemas.microsoft.com/office/powerpoint/2012/main" xmlns="">
+      <p15:sldGuideLst xmlns:p15="http://schemas.microsoft.com/office/powerpoint/2012/main">
         <p15:guide id="1" orient="horz" pos="2160">
           <p15:clr>
             <a:srgbClr val="A4A3A4"/>
@@ -188,7 +172,7 @@
       </p15:sldGuideLst>
     </p:ext>
     <p:ext uri="{2D200454-40CA-4A62-9FC3-DE9A4176ACB9}">
-      <p15:notesGuideLst xmlns:p15="http://schemas.microsoft.com/office/powerpoint/2012/main" xmlns="">
+      <p15:notesGuideLst xmlns:p15="http://schemas.microsoft.com/office/powerpoint/2012/main">
         <p15:guide id="1" orient="horz" pos="2928">
           <p15:clr>
             <a:srgbClr val="A4A3A4"/>
@@ -209,48 +193,6 @@
 <p:cmAuthorLst xmlns:a="http://schemas.openxmlformats.org/drawingml/2006/main" xmlns:r="http://schemas.openxmlformats.org/officeDocument/2006/relationships" xmlns:p="http://schemas.openxmlformats.org/presentationml/2006/main">
   <p:cmAuthor id="0" name="Helio " initials="ha" lastIdx="4" clrIdx="0"/>
 </p:cmAuthorLst>
-</file>
-
-<file path=ppt/comments/comment1.xml><?xml version="1.0" encoding="utf-8"?>
-<p:cmLst xmlns:a="http://schemas.openxmlformats.org/drawingml/2006/main" xmlns:r="http://schemas.openxmlformats.org/officeDocument/2006/relationships" xmlns:p="http://schemas.openxmlformats.org/presentationml/2006/main">
-  <p:cm authorId="0" dt="2014-05-18T09:06:01.150" idx="1">
-    <p:pos x="3267" y="440"/>
-    <p:text>sugestão: 
-Caso de uso gestor: passe 3 casos de uso para o lado esquerdo.
-passe um caso de uso para a "cabeça do gestor". 
-Apresente como um unica figura.</p:text>
-  </p:cm>
-</p:cmLst>
-</file>
-
-<file path=ppt/comments/comment2.xml><?xml version="1.0" encoding="utf-8"?>
-<p:cmLst xmlns:a="http://schemas.openxmlformats.org/drawingml/2006/main" xmlns:r="http://schemas.openxmlformats.org/officeDocument/2006/relationships" xmlns:p="http://schemas.openxmlformats.org/presentationml/2006/main">
-  <p:cm authorId="0" dt="2014-05-18T09:18:31.135" idx="2">
-    <p:pos x="4259" y="440"/>
-    <p:text>Caso de Uso: Cadastro Paciente:
-A ideia é tornar visivel. As vezes basta aumentar a figura ou trabalhar o posicionamento.
-Somente divida se for inevitável.</p:text>
-  </p:cm>
-</p:cmLst>
-</file>
-
-<file path=ppt/comments/comment3.xml><?xml version="1.0" encoding="utf-8"?>
-<p:cmLst xmlns:a="http://schemas.openxmlformats.org/drawingml/2006/main" xmlns:r="http://schemas.openxmlformats.org/officeDocument/2006/relationships" xmlns:p="http://schemas.openxmlformats.org/presentationml/2006/main">
-  <p:cm authorId="0" dt="2014-05-18T09:19:36.916" idx="3">
-    <p:pos x="3244" y="440"/>
-    <p:text/>
-  </p:cm>
-</p:cmLst>
-</file>
-
-<file path=ppt/comments/comment4.xml><?xml version="1.0" encoding="utf-8"?>
-<p:cmLst xmlns:a="http://schemas.openxmlformats.org/drawingml/2006/main" xmlns:r="http://schemas.openxmlformats.org/officeDocument/2006/relationships" xmlns:p="http://schemas.openxmlformats.org/presentationml/2006/main">
-  <p:cm authorId="0" dt="2014-05-18T09:26:53.119" idx="4">
-    <p:pos x="1917" y="2107"/>
-    <p:text>Conclusão:
-Trocar "Ponto Fraco" por "Nas proximas interações da implementação novas funcionalidades serão agregadas ao sistema"</p:text>
-  </p:cm>
-</p:cmLst>
 </file>
 
 <file path=ppt/handoutMasters/handoutMaster1.xml><?xml version="1.0" encoding="utf-8"?>
@@ -336,7 +278,7 @@
             <a:fld id="{387DC7E4-63C1-42C9-AC56-2D8DD4349572}" type="datetimeFigureOut">
               <a:rPr lang="pt-BR" smtClean="0"/>
               <a:pPr/>
-              <a:t>18/5/2014</a:t>
+              <a:t>09/06/2014</a:t>
             </a:fld>
             <a:endParaRPr lang="pt-BR"/>
           </a:p>
@@ -412,7 +354,7 @@
     </p:spTree>
     <p:extLst>
       <p:ext uri="{BB962C8B-B14F-4D97-AF65-F5344CB8AC3E}">
-        <p14:creationId xmlns:p14="http://schemas.microsoft.com/office/powerpoint/2010/main" xmlns="" val="3690707936"/>
+        <p14:creationId xmlns:p14="http://schemas.microsoft.com/office/powerpoint/2010/main" val="3690707936"/>
       </p:ext>
     </p:extLst>
   </p:cSld>
@@ -726,7 +668,7 @@
     </p:spTree>
     <p:extLst>
       <p:ext uri="{BB962C8B-B14F-4D97-AF65-F5344CB8AC3E}">
-        <p14:creationId xmlns:p14="http://schemas.microsoft.com/office/powerpoint/2010/main" xmlns="" val="753547333"/>
+        <p14:creationId xmlns:p14="http://schemas.microsoft.com/office/powerpoint/2010/main" val="753547333"/>
       </p:ext>
     </p:extLst>
   </p:cSld>
@@ -935,7 +877,7 @@
     </p:spTree>
     <p:extLst>
       <p:ext uri="{BB962C8B-B14F-4D97-AF65-F5344CB8AC3E}">
-        <p14:creationId xmlns:p14="http://schemas.microsoft.com/office/powerpoint/2010/main" xmlns="" val="552911737"/>
+        <p14:creationId xmlns:p14="http://schemas.microsoft.com/office/powerpoint/2010/main" val="552911737"/>
       </p:ext>
     </p:extLst>
   </p:cSld>
@@ -2205,11 +2147,7 @@
           <a:p>
             <a:r>
               <a:rPr lang="pt-BR" dirty="0" smtClean="0"/>
-              <a:t>Clique para editar o estilo do </a:t>
-            </a:r>
-            <a:r>
-              <a:rPr lang="pt-BR" dirty="0" smtClean="0"/>
-              <a:t>título mestre</a:t>
+              <a:t>Clique para editar o estilo do título mestre</a:t>
             </a:r>
             <a:endParaRPr lang="pt-BR" dirty="0"/>
           </a:p>
@@ -5026,7 +4964,7 @@
           <a:p>
             <a:r>
               <a:rPr lang="pt-BR" dirty="0" smtClean="0"/>
-              <a:t>09/06/2014</a:t>
+              <a:t>10/06/2014</a:t>
             </a:r>
             <a:endParaRPr lang="pt-BR" dirty="0"/>
           </a:p>
@@ -5137,7 +5075,7 @@
           <a:p>
             <a:r>
               <a:rPr lang="pt-BR" dirty="0" smtClean="0"/>
-              <a:t>Escopo do Sistema</a:t>
+              <a:t>Diagrama de Classe</a:t>
             </a:r>
             <a:endParaRPr lang="pt-BR" dirty="0"/>
           </a:p>
@@ -5159,8 +5097,8 @@
           <a:lstStyle/>
           <a:p>
             <a:r>
-              <a:rPr lang="pt-BR" dirty="0"/>
-              <a:t>09/06/2014</a:t>
+              <a:rPr lang="pt-BR" dirty="0" smtClean="0"/>
+              <a:t>10/06/2014</a:t>
             </a:r>
             <a:endParaRPr lang="pt-BR" dirty="0" smtClean="0"/>
           </a:p>
@@ -5216,100 +5154,82 @@
           </a:p>
         </p:txBody>
       </p:sp>
-      <p:sp>
-        <p:nvSpPr>
-          <p:cNvPr id="2" name="Retângulo 1"/>
-          <p:cNvSpPr/>
+      <p:pic>
+        <p:nvPicPr>
+          <p:cNvPr id="2" name="Imagem 1"/>
+          <p:cNvPicPr>
+            <a:picLocks noChangeAspect="1"/>
+          </p:cNvPicPr>
           <p:nvPr/>
-        </p:nvSpPr>
+        </p:nvPicPr>
+        <p:blipFill>
+          <a:blip r:embed="rId2">
+            <a:extLst>
+              <a:ext uri="{28A0092B-C50C-407E-A947-70E740481C1C}">
+                <a14:useLocalDpi xmlns:a14="http://schemas.microsoft.com/office/drawing/2010/main" val="0"/>
+              </a:ext>
+            </a:extLst>
+          </a:blip>
+          <a:stretch>
+            <a:fillRect/>
+          </a:stretch>
+        </p:blipFill>
         <p:spPr>
           <a:xfrm>
-            <a:off x="838200" y="1660416"/>
-            <a:ext cx="7694240" cy="2246769"/>
+            <a:off x="251520" y="2060848"/>
+            <a:ext cx="8867842" cy="4248472"/>
           </a:xfrm>
           <a:prstGeom prst="rect">
             <a:avLst/>
           </a:prstGeom>
         </p:spPr>
+      </p:pic>
+      <p:sp>
+        <p:nvSpPr>
+          <p:cNvPr id="10" name="Retângulo 9"/>
+          <p:cNvSpPr/>
+          <p:nvPr/>
+        </p:nvSpPr>
+        <p:spPr>
+          <a:xfrm>
+            <a:off x="539552" y="1463513"/>
+            <a:ext cx="8478688" cy="523220"/>
+          </a:xfrm>
+          <a:prstGeom prst="rect">
+            <a:avLst/>
+          </a:prstGeom>
+        </p:spPr>
         <p:txBody>
           <a:bodyPr wrap="square">
             <a:spAutoFit/>
           </a:bodyPr>
           <a:lstStyle/>
           <a:p>
-            <a:pPr>
+            <a:pPr lvl="0">
               <a:buClr>
-                <a:schemeClr val="bg2"/>
+                <a:srgbClr val="FFCC00"/>
               </a:buClr>
             </a:pPr>
             <a:r>
-              <a:rPr lang="pt-BR" sz="2800" dirty="0" smtClean="0"/>
-              <a:t>Casos de uso para apresentação:</a:t>
-            </a:r>
-            <a:endParaRPr lang="pt-BR" sz="2800" dirty="0"/>
-          </a:p>
-          <a:p>
-            <a:pPr marL="285750" indent="-285750">
-              <a:buClr>
-                <a:schemeClr val="bg2"/>
-              </a:buClr>
-              <a:buFont typeface="Wingdings" panose="05000000000000000000" pitchFamily="2" charset="2"/>
-              <a:buChar char=""/>
-            </a:pPr>
-            <a:r>
-              <a:rPr lang="pt-BR" sz="2800" dirty="0" smtClean="0"/>
-              <a:t>Verificar resultado de exame online</a:t>
-            </a:r>
-          </a:p>
-          <a:p>
-            <a:pPr marL="285750" indent="-285750">
-              <a:buClr>
-                <a:schemeClr val="bg2"/>
-              </a:buClr>
-              <a:buFont typeface="Wingdings" panose="05000000000000000000" pitchFamily="2" charset="2"/>
-              <a:buChar char=""/>
-            </a:pPr>
-            <a:r>
-              <a:rPr lang="pt-BR" sz="2800" dirty="0" smtClean="0"/>
-              <a:t>Cadastrar </a:t>
-            </a:r>
-            <a:r>
-              <a:rPr lang="pt-BR" sz="2800" dirty="0"/>
-              <a:t>pacientes no sistema</a:t>
-            </a:r>
-          </a:p>
-          <a:p>
-            <a:pPr marL="285750" indent="-285750">
-              <a:buClr>
-                <a:schemeClr val="bg2"/>
-              </a:buClr>
-              <a:buFont typeface="Wingdings" panose="05000000000000000000" pitchFamily="2" charset="2"/>
-              <a:buChar char=""/>
-            </a:pPr>
-            <a:r>
-              <a:rPr lang="pt-BR" sz="2800" dirty="0" smtClean="0"/>
-              <a:t>Gerar relatórios de fluxo de exames</a:t>
-            </a:r>
-          </a:p>
-          <a:p>
-            <a:pPr marL="285750" indent="-285750">
-              <a:buClr>
-                <a:schemeClr val="bg2"/>
-              </a:buClr>
-              <a:buFont typeface="Wingdings" panose="05000000000000000000" pitchFamily="2" charset="2"/>
-              <a:buChar char=""/>
-            </a:pPr>
-            <a:r>
-              <a:rPr lang="pt-BR" sz="2800" dirty="0" smtClean="0"/>
-              <a:t>Gerar código de verificação de exame</a:t>
-            </a:r>
+              <a:rPr lang="pt-BR" sz="2800" dirty="0">
+                <a:solidFill>
+                  <a:srgbClr val="0070C0"/>
+                </a:solidFill>
+              </a:rPr>
+              <a:t>Caso de Uso: Verificar Resultado de Exame Online</a:t>
+            </a:r>
+            <a:endParaRPr lang="pt-BR" sz="2800" dirty="0">
+              <a:solidFill>
+                <a:srgbClr val="0070C0"/>
+              </a:solidFill>
+            </a:endParaRPr>
           </a:p>
         </p:txBody>
       </p:sp>
     </p:spTree>
     <p:extLst>
       <p:ext uri="{BB962C8B-B14F-4D97-AF65-F5344CB8AC3E}">
-        <p14:creationId xmlns:p14="http://schemas.microsoft.com/office/powerpoint/2010/main" xmlns="" val="2996355730"/>
+        <p14:creationId xmlns:p14="http://schemas.microsoft.com/office/powerpoint/2010/main" val="368072451"/>
       </p:ext>
     </p:extLst>
   </p:cSld>
@@ -5363,38 +5283,30 @@
           <a:p>
             <a:r>
               <a:rPr lang="pt-BR" dirty="0" smtClean="0"/>
-              <a:t>Diagrama </a:t>
-            </a:r>
-            <a:r>
-              <a:rPr lang="pt-BR" dirty="0"/>
-              <a:t>de </a:t>
-            </a:r>
+              <a:t>Diagrama de Comunicação</a:t>
+            </a:r>
+            <a:endParaRPr lang="pt-BR" dirty="0"/>
+          </a:p>
+        </p:txBody>
+      </p:sp>
+      <p:sp>
+        <p:nvSpPr>
+          <p:cNvPr id="6" name="Espaço Reservado para Data 5"/>
+          <p:cNvSpPr>
+            <a:spLocks noGrp="1"/>
+          </p:cNvSpPr>
+          <p:nvPr>
+            <p:ph type="dt" sz="half" idx="10"/>
+          </p:nvPr>
+        </p:nvSpPr>
+        <p:spPr/>
+        <p:txBody>
+          <a:bodyPr/>
+          <a:lstStyle/>
+          <a:p>
             <a:r>
               <a:rPr lang="pt-BR" dirty="0" smtClean="0"/>
-              <a:t>Comunicação</a:t>
-            </a:r>
-            <a:endParaRPr lang="pt-BR" dirty="0"/>
-          </a:p>
-        </p:txBody>
-      </p:sp>
-      <p:sp>
-        <p:nvSpPr>
-          <p:cNvPr id="6" name="Espaço Reservado para Data 5"/>
-          <p:cNvSpPr>
-            <a:spLocks noGrp="1"/>
-          </p:cNvSpPr>
-          <p:nvPr>
-            <p:ph type="dt" sz="half" idx="10"/>
-          </p:nvPr>
-        </p:nvSpPr>
-        <p:spPr/>
-        <p:txBody>
-          <a:bodyPr/>
-          <a:lstStyle/>
-          <a:p>
-            <a:r>
-              <a:rPr lang="pt-BR" dirty="0"/>
-              <a:t>09/06/2014</a:t>
+              <a:t>10/06/2014</a:t>
             </a:r>
             <a:endParaRPr lang="pt-BR" dirty="0" smtClean="0"/>
           </a:p>
@@ -5452,38 +5364,82 @@
       </p:sp>
       <p:pic>
         <p:nvPicPr>
-          <p:cNvPr id="3" name="Imagem 2"/>
+          <p:cNvPr id="10" name="Imagem 9" descr="aluno.jpg"/>
           <p:cNvPicPr>
             <a:picLocks noChangeAspect="1"/>
           </p:cNvPicPr>
           <p:nvPr/>
         </p:nvPicPr>
         <p:blipFill>
-          <a:blip r:embed="rId2" cstate="print">
-            <a:extLst>
-              <a:ext uri="{28A0092B-C50C-407E-A947-70E740481C1C}">
-                <a14:useLocalDpi xmlns:a14="http://schemas.microsoft.com/office/drawing/2010/main" xmlns="" val="0"/>
-              </a:ext>
-            </a:extLst>
-          </a:blip>
+          <a:blip r:embed="rId2" cstate="print"/>
           <a:stretch>
             <a:fillRect/>
           </a:stretch>
         </p:blipFill>
         <p:spPr>
           <a:xfrm>
-            <a:off x="251520" y="1763796"/>
-            <a:ext cx="8784976" cy="4401508"/>
+            <a:off x="899592" y="1508664"/>
+            <a:ext cx="7632848" cy="4767150"/>
           </a:xfrm>
           <a:prstGeom prst="rect">
             <a:avLst/>
           </a:prstGeom>
         </p:spPr>
       </p:pic>
+      <p:sp>
+        <p:nvSpPr>
+          <p:cNvPr id="2" name="Retângulo 1"/>
+          <p:cNvSpPr/>
+          <p:nvPr/>
+        </p:nvSpPr>
+        <p:spPr>
+          <a:xfrm>
+            <a:off x="205408" y="5906482"/>
+            <a:ext cx="5814392" cy="400110"/>
+          </a:xfrm>
+          <a:prstGeom prst="rect">
+            <a:avLst/>
+          </a:prstGeom>
+        </p:spPr>
+        <p:txBody>
+          <a:bodyPr wrap="square">
+            <a:spAutoFit/>
+          </a:bodyPr>
+          <a:lstStyle/>
+          <a:p>
+            <a:pPr lvl="0">
+              <a:buClr>
+                <a:srgbClr val="FFCC00"/>
+              </a:buClr>
+            </a:pPr>
+            <a:r>
+              <a:rPr lang="pt-BR" sz="2000" dirty="0">
+                <a:solidFill>
+                  <a:srgbClr val="0070C0"/>
+                </a:solidFill>
+              </a:rPr>
+              <a:t>Caso de </a:t>
+            </a:r>
+            <a:r>
+              <a:rPr lang="pt-BR" sz="2000" dirty="0" smtClean="0">
+                <a:solidFill>
+                  <a:srgbClr val="0070C0"/>
+                </a:solidFill>
+              </a:rPr>
+              <a:t>Uso: Cadastrar Pacientes no Sistema</a:t>
+            </a:r>
+            <a:endParaRPr lang="pt-BR" sz="2000" dirty="0">
+              <a:solidFill>
+                <a:srgbClr val="0070C0"/>
+              </a:solidFill>
+            </a:endParaRPr>
+          </a:p>
+        </p:txBody>
+      </p:sp>
     </p:spTree>
     <p:extLst>
       <p:ext uri="{BB962C8B-B14F-4D97-AF65-F5344CB8AC3E}">
-        <p14:creationId xmlns:p14="http://schemas.microsoft.com/office/powerpoint/2010/main" xmlns="" val="4277231462"/>
+        <p14:creationId xmlns:p14="http://schemas.microsoft.com/office/powerpoint/2010/main" val="1234869730"/>
       </p:ext>
     </p:extLst>
   </p:cSld>
@@ -5560,7 +5516,7 @@
           <a:p>
             <a:r>
               <a:rPr lang="pt-BR" dirty="0"/>
-              <a:t>09/06/2014</a:t>
+              <a:t>10/06/2014</a:t>
             </a:r>
             <a:endParaRPr lang="pt-BR" dirty="0" smtClean="0"/>
           </a:p>
@@ -5628,7 +5584,7 @@
           <a:blip r:embed="rId2" cstate="print">
             <a:extLst>
               <a:ext uri="{28A0092B-C50C-407E-A947-70E740481C1C}">
-                <a14:useLocalDpi xmlns:a14="http://schemas.microsoft.com/office/drawing/2010/main" xmlns="" val="0"/>
+                <a14:useLocalDpi xmlns:a14="http://schemas.microsoft.com/office/drawing/2010/main" val="0"/>
               </a:ext>
             </a:extLst>
           </a:blip>
@@ -5638,18 +5594,60 @@
         </p:blipFill>
         <p:spPr>
           <a:xfrm>
-            <a:off x="1975194" y="1494958"/>
-            <a:ext cx="5765157" cy="5277556"/>
+            <a:off x="2034028" y="1498267"/>
+            <a:ext cx="5075944" cy="4739045"/>
           </a:xfrm>
           <a:prstGeom prst="rect">
             <a:avLst/>
           </a:prstGeom>
         </p:spPr>
       </p:pic>
+      <p:sp>
+        <p:nvSpPr>
+          <p:cNvPr id="3" name="Retângulo 2"/>
+          <p:cNvSpPr/>
+          <p:nvPr/>
+        </p:nvSpPr>
+        <p:spPr>
+          <a:xfrm>
+            <a:off x="251520" y="5948609"/>
+            <a:ext cx="6750496" cy="369332"/>
+          </a:xfrm>
+          <a:prstGeom prst="rect">
+            <a:avLst/>
+          </a:prstGeom>
+        </p:spPr>
+        <p:txBody>
+          <a:bodyPr wrap="square">
+            <a:spAutoFit/>
+          </a:bodyPr>
+          <a:lstStyle/>
+          <a:p>
+            <a:pPr lvl="0">
+              <a:buClr>
+                <a:srgbClr val="FFCC00"/>
+              </a:buClr>
+            </a:pPr>
+            <a:r>
+              <a:rPr lang="pt-BR" dirty="0">
+                <a:solidFill>
+                  <a:srgbClr val="0070C0"/>
+                </a:solidFill>
+              </a:rPr>
+              <a:t>Caso de Uso: Cadastrar Pacientes no Sistema</a:t>
+            </a:r>
+            <a:endParaRPr lang="pt-BR" dirty="0">
+              <a:solidFill>
+                <a:srgbClr val="0070C0"/>
+              </a:solidFill>
+            </a:endParaRPr>
+          </a:p>
+        </p:txBody>
+      </p:sp>
     </p:spTree>
     <p:extLst>
       <p:ext uri="{BB962C8B-B14F-4D97-AF65-F5344CB8AC3E}">
-        <p14:creationId xmlns:p14="http://schemas.microsoft.com/office/powerpoint/2010/main" xmlns="" val="1162909256"/>
+        <p14:creationId xmlns:p14="http://schemas.microsoft.com/office/powerpoint/2010/main" val="1273683969"/>
       </p:ext>
     </p:extLst>
   </p:cSld>
@@ -5726,7 +5724,7 @@
           <a:p>
             <a:r>
               <a:rPr lang="pt-BR" dirty="0"/>
-              <a:t>09/06/2014</a:t>
+              <a:t>10/06/2014</a:t>
             </a:r>
             <a:endParaRPr lang="pt-BR" dirty="0" smtClean="0"/>
           </a:p>
@@ -5784,17 +5782,17 @@
       </p:sp>
       <p:pic>
         <p:nvPicPr>
-          <p:cNvPr id="4" name="Imagem 3"/>
+          <p:cNvPr id="2" name="Imagem 1"/>
           <p:cNvPicPr>
             <a:picLocks noChangeAspect="1"/>
           </p:cNvPicPr>
           <p:nvPr/>
         </p:nvPicPr>
         <p:blipFill>
-          <a:blip r:embed="rId2" cstate="print">
+          <a:blip r:embed="rId2">
             <a:extLst>
               <a:ext uri="{28A0092B-C50C-407E-A947-70E740481C1C}">
-                <a14:useLocalDpi xmlns:a14="http://schemas.microsoft.com/office/drawing/2010/main" xmlns="" val="0"/>
+                <a14:useLocalDpi xmlns:a14="http://schemas.microsoft.com/office/drawing/2010/main" val="0"/>
               </a:ext>
             </a:extLst>
           </a:blip>
@@ -5804,18 +5802,60 @@
         </p:blipFill>
         <p:spPr>
           <a:xfrm>
-            <a:off x="2843808" y="1484784"/>
-            <a:ext cx="3573533" cy="4728246"/>
+            <a:off x="1043608" y="1500626"/>
+            <a:ext cx="7560840" cy="4808694"/>
           </a:xfrm>
           <a:prstGeom prst="rect">
             <a:avLst/>
           </a:prstGeom>
         </p:spPr>
       </p:pic>
+      <p:sp>
+        <p:nvSpPr>
+          <p:cNvPr id="4" name="Retângulo 3"/>
+          <p:cNvSpPr/>
+          <p:nvPr/>
+        </p:nvSpPr>
+        <p:spPr>
+          <a:xfrm>
+            <a:off x="325016" y="5877272"/>
+            <a:ext cx="5598368" cy="353943"/>
+          </a:xfrm>
+          <a:prstGeom prst="rect">
+            <a:avLst/>
+          </a:prstGeom>
+        </p:spPr>
+        <p:txBody>
+          <a:bodyPr wrap="square">
+            <a:spAutoFit/>
+          </a:bodyPr>
+          <a:lstStyle/>
+          <a:p>
+            <a:pPr lvl="0">
+              <a:buClr>
+                <a:srgbClr val="FFCC00"/>
+              </a:buClr>
+            </a:pPr>
+            <a:r>
+              <a:rPr lang="pt-BR" sz="1700" dirty="0">
+                <a:solidFill>
+                  <a:srgbClr val="0070C0"/>
+                </a:solidFill>
+              </a:rPr>
+              <a:t>Caso de Uso: Cadastrar Pacientes no Sistema</a:t>
+            </a:r>
+            <a:endParaRPr lang="pt-BR" sz="1700" dirty="0">
+              <a:solidFill>
+                <a:srgbClr val="0070C0"/>
+              </a:solidFill>
+            </a:endParaRPr>
+          </a:p>
+        </p:txBody>
+      </p:sp>
     </p:spTree>
     <p:extLst>
       <p:ext uri="{BB962C8B-B14F-4D97-AF65-F5344CB8AC3E}">
-        <p14:creationId xmlns:p14="http://schemas.microsoft.com/office/powerpoint/2010/main" xmlns="" val="368072451"/>
+        <p14:creationId xmlns:p14="http://schemas.microsoft.com/office/powerpoint/2010/main" val="2007851057"/>
       </p:ext>
     </p:extLst>
   </p:cSld>
@@ -5892,7 +5932,7 @@
           <a:p>
             <a:r>
               <a:rPr lang="pt-BR" dirty="0"/>
-              <a:t>09/06/2014</a:t>
+              <a:t>10/06/2014</a:t>
             </a:r>
             <a:endParaRPr lang="pt-BR" dirty="0" smtClean="0"/>
           </a:p>
@@ -5960,7 +6000,7 @@
           <a:blip r:embed="rId2" cstate="print">
             <a:extLst>
               <a:ext uri="{28A0092B-C50C-407E-A947-70E740481C1C}">
-                <a14:useLocalDpi xmlns:a14="http://schemas.microsoft.com/office/drawing/2010/main" xmlns="" val="0"/>
+                <a14:useLocalDpi xmlns:a14="http://schemas.microsoft.com/office/drawing/2010/main" val="0"/>
               </a:ext>
             </a:extLst>
           </a:blip>
@@ -5970,18 +6010,125 @@
         </p:blipFill>
         <p:spPr>
           <a:xfrm>
-            <a:off x="254697" y="1695030"/>
-            <a:ext cx="8853807" cy="4542282"/>
+            <a:off x="255807" y="2610534"/>
+            <a:ext cx="8892480" cy="3626778"/>
           </a:xfrm>
           <a:prstGeom prst="rect">
             <a:avLst/>
           </a:prstGeom>
         </p:spPr>
       </p:pic>
+      <p:pic>
+        <p:nvPicPr>
+          <p:cNvPr id="4" name="Imagem 3"/>
+          <p:cNvPicPr>
+            <a:picLocks noChangeAspect="1"/>
+          </p:cNvPicPr>
+          <p:nvPr/>
+        </p:nvPicPr>
+        <p:blipFill>
+          <a:blip r:embed="rId3" cstate="print">
+            <a:extLst>
+              <a:ext uri="{28A0092B-C50C-407E-A947-70E740481C1C}">
+                <a14:useLocalDpi xmlns:a14="http://schemas.microsoft.com/office/drawing/2010/main" val="0"/>
+              </a:ext>
+            </a:extLst>
+          </a:blip>
+          <a:stretch>
+            <a:fillRect/>
+          </a:stretch>
+        </p:blipFill>
+        <p:spPr>
+          <a:xfrm>
+            <a:off x="858174" y="1498568"/>
+            <a:ext cx="2057642" cy="1138344"/>
+          </a:xfrm>
+          <a:prstGeom prst="rect">
+            <a:avLst/>
+          </a:prstGeom>
+        </p:spPr>
+      </p:pic>
+      <p:sp>
+        <p:nvSpPr>
+          <p:cNvPr id="3" name="Retângulo 2"/>
+          <p:cNvSpPr/>
+          <p:nvPr/>
+        </p:nvSpPr>
+        <p:spPr>
+          <a:xfrm>
+            <a:off x="3246621" y="1511798"/>
+            <a:ext cx="5440179" cy="1015663"/>
+          </a:xfrm>
+          <a:prstGeom prst="rect">
+            <a:avLst/>
+          </a:prstGeom>
+        </p:spPr>
+        <p:txBody>
+          <a:bodyPr wrap="square">
+            <a:spAutoFit/>
+          </a:bodyPr>
+          <a:lstStyle/>
+          <a:p>
+            <a:pPr lvl="0">
+              <a:buClr>
+                <a:srgbClr val="FFCC00"/>
+              </a:buClr>
+            </a:pPr>
+            <a:r>
+              <a:rPr lang="pt-BR" sz="2000" dirty="0">
+                <a:solidFill>
+                  <a:srgbClr val="0070C0"/>
+                </a:solidFill>
+              </a:rPr>
+              <a:t>Caso de Uso: Cadastrar Pacientes no </a:t>
+            </a:r>
+            <a:r>
+              <a:rPr lang="pt-BR" sz="2000" dirty="0" smtClean="0">
+                <a:solidFill>
+                  <a:srgbClr val="0070C0"/>
+                </a:solidFill>
+              </a:rPr>
+              <a:t>Sistema</a:t>
+            </a:r>
+          </a:p>
+          <a:p>
+            <a:pPr lvl="0">
+              <a:buClr>
+                <a:srgbClr val="FFCC00"/>
+              </a:buClr>
+            </a:pPr>
+            <a:endParaRPr lang="pt-BR" sz="2000" dirty="0" smtClean="0">
+              <a:solidFill>
+                <a:srgbClr val="0070C0"/>
+              </a:solidFill>
+            </a:endParaRPr>
+          </a:p>
+          <a:p>
+            <a:pPr lvl="0">
+              <a:buClr>
+                <a:srgbClr val="FFCC00"/>
+              </a:buClr>
+            </a:pPr>
+            <a:r>
+              <a:rPr lang="pt-BR" sz="2000" dirty="0" smtClean="0">
+                <a:solidFill>
+                  <a:srgbClr val="0070C0"/>
+                </a:solidFill>
+              </a:rPr>
+              <a:t>Continuação do diagrama</a:t>
+            </a:r>
+            <a:endParaRPr lang="pt-BR" sz="2000" dirty="0">
+              <a:solidFill>
+                <a:srgbClr val="0070C0"/>
+              </a:solidFill>
+            </a:endParaRPr>
+          </a:p>
+        </p:txBody>
+      </p:sp>
     </p:spTree>
     <p:extLst>
       <p:ext uri="{BB962C8B-B14F-4D97-AF65-F5344CB8AC3E}">
-        <p14:creationId xmlns:p14="http://schemas.microsoft.com/office/powerpoint/2010/main" xmlns="" val="917990213"/>
+        <p14:creationId xmlns:p14="http://schemas.microsoft.com/office/powerpoint/2010/main" val="1486041614"/>
       </p:ext>
     </p:extLst>
   </p:cSld>
@@ -6058,7 +6205,7 @@
           <a:p>
             <a:r>
               <a:rPr lang="pt-BR" dirty="0"/>
-              <a:t>09/06/2014</a:t>
+              <a:t>10/06/2014</a:t>
             </a:r>
             <a:endParaRPr lang="pt-BR" dirty="0" smtClean="0"/>
           </a:p>
@@ -6116,22 +6263,28 @@
       </p:sp>
       <p:pic>
         <p:nvPicPr>
-          <p:cNvPr id="9" name="Imagem 8" descr="aluno.jpg"/>
+          <p:cNvPr id="2" name="Imagem 1"/>
           <p:cNvPicPr>
             <a:picLocks noChangeAspect="1"/>
           </p:cNvPicPr>
           <p:nvPr/>
         </p:nvPicPr>
         <p:blipFill>
-          <a:blip r:embed="rId2" cstate="print"/>
+          <a:blip r:embed="rId2">
+            <a:extLst>
+              <a:ext uri="{28A0092B-C50C-407E-A947-70E740481C1C}">
+                <a14:useLocalDpi xmlns:a14="http://schemas.microsoft.com/office/drawing/2010/main" val="0"/>
+              </a:ext>
+            </a:extLst>
+          </a:blip>
           <a:stretch>
             <a:fillRect/>
           </a:stretch>
         </p:blipFill>
         <p:spPr>
           <a:xfrm>
-            <a:off x="467544" y="1508664"/>
-            <a:ext cx="8487946" cy="5301208"/>
+            <a:off x="323528" y="1988840"/>
+            <a:ext cx="8745786" cy="4248472"/>
           </a:xfrm>
           <a:prstGeom prst="rect">
             <a:avLst/>
@@ -6140,47 +6293,49 @@
       </p:pic>
       <p:sp>
         <p:nvSpPr>
-          <p:cNvPr id="10" name="CaixaDeTexto 9"/>
-          <p:cNvSpPr txBox="1"/>
+          <p:cNvPr id="4" name="Retângulo 3"/>
+          <p:cNvSpPr/>
           <p:nvPr/>
         </p:nvSpPr>
         <p:spPr>
           <a:xfrm>
-            <a:off x="395536" y="6021288"/>
-            <a:ext cx="2082621" cy="646331"/>
+            <a:off x="346138" y="1518573"/>
+            <a:ext cx="7898270" cy="461665"/>
           </a:xfrm>
           <a:prstGeom prst="rect">
             <a:avLst/>
           </a:prstGeom>
-          <a:noFill/>
         </p:spPr>
         <p:txBody>
-          <a:bodyPr wrap="none" rtlCol="0">
+          <a:bodyPr wrap="square">
             <a:spAutoFit/>
           </a:bodyPr>
           <a:lstStyle/>
           <a:p>
-            <a:r>
-              <a:rPr lang="pt-BR" dirty="0" smtClean="0">
+            <a:pPr lvl="0">
+              <a:buClr>
+                <a:srgbClr val="FFCC00"/>
+              </a:buClr>
+            </a:pPr>
+            <a:r>
+              <a:rPr lang="pt-BR" sz="2400" dirty="0">
                 <a:solidFill>
-                  <a:srgbClr val="0000FF"/>
+                  <a:srgbClr val="0070C0"/>
                 </a:solidFill>
               </a:rPr>
-              <a:t>Caso de Uso:</a:t>
-            </a:r>
-          </a:p>
-          <a:p>
-            <a:r>
-              <a:rPr lang="pt-BR" dirty="0" smtClean="0">
+              <a:t>Caso de Uso: </a:t>
+            </a:r>
+            <a:r>
+              <a:rPr lang="pt-BR" sz="2400" dirty="0" smtClean="0">
                 <a:solidFill>
-                  <a:srgbClr val="0000FF"/>
+                  <a:srgbClr val="0070C0"/>
                 </a:solidFill>
               </a:rPr>
-              <a:t>Cadastro Paciente</a:t>
-            </a:r>
-            <a:endParaRPr lang="pt-BR" dirty="0">
+              <a:t>Gerar Relatórios de Fluxo de Exames</a:t>
+            </a:r>
+            <a:endParaRPr lang="pt-BR" sz="2400" dirty="0">
               <a:solidFill>
-                <a:srgbClr val="0000FF"/>
+                <a:srgbClr val="0070C0"/>
               </a:solidFill>
             </a:endParaRPr>
           </a:p>
@@ -6189,7 +6344,7 @@
     </p:spTree>
     <p:extLst>
       <p:ext uri="{BB962C8B-B14F-4D97-AF65-F5344CB8AC3E}">
-        <p14:creationId xmlns:p14="http://schemas.microsoft.com/office/powerpoint/2010/main" xmlns="" val="269218475"/>
+        <p14:creationId xmlns:p14="http://schemas.microsoft.com/office/powerpoint/2010/main" val="2149158567"/>
       </p:ext>
     </p:extLst>
   </p:cSld>
@@ -6243,7 +6398,7 @@
           <a:p>
             <a:r>
               <a:rPr lang="pt-BR" dirty="0" smtClean="0"/>
-              <a:t>Diagrama de Comunicação</a:t>
+              <a:t>Diagrama de Classe</a:t>
             </a:r>
             <a:endParaRPr lang="pt-BR" dirty="0"/>
           </a:p>
@@ -6266,7 +6421,7 @@
           <a:p>
             <a:r>
               <a:rPr lang="pt-BR" dirty="0"/>
-              <a:t>09/06/2014</a:t>
+              <a:t>10/06/2014</a:t>
             </a:r>
             <a:endParaRPr lang="pt-BR" dirty="0" smtClean="0"/>
           </a:p>
@@ -6324,7 +6479,7 @@
       </p:sp>
       <p:pic>
         <p:nvPicPr>
-          <p:cNvPr id="2" name="Imagem 1"/>
+          <p:cNvPr id="9" name="Imagem 8"/>
           <p:cNvPicPr>
             <a:picLocks noChangeAspect="1"/>
           </p:cNvPicPr>
@@ -6334,7 +6489,7 @@
           <a:blip r:embed="rId2" cstate="print">
             <a:extLst>
               <a:ext uri="{28A0092B-C50C-407E-A947-70E740481C1C}">
-                <a14:useLocalDpi xmlns:a14="http://schemas.microsoft.com/office/drawing/2010/main" xmlns="" val="0"/>
+                <a14:useLocalDpi xmlns:a14="http://schemas.microsoft.com/office/drawing/2010/main" val="0"/>
               </a:ext>
             </a:extLst>
           </a:blip>
@@ -6344,18 +6499,60 @@
         </p:blipFill>
         <p:spPr>
           <a:xfrm>
-            <a:off x="251520" y="1628800"/>
-            <a:ext cx="8865699" cy="4501258"/>
+            <a:off x="640396" y="1750635"/>
+            <a:ext cx="8038728" cy="4500850"/>
           </a:xfrm>
           <a:prstGeom prst="rect">
             <a:avLst/>
           </a:prstGeom>
         </p:spPr>
       </p:pic>
+      <p:sp>
+        <p:nvSpPr>
+          <p:cNvPr id="2" name="Retângulo 1"/>
+          <p:cNvSpPr/>
+          <p:nvPr/>
+        </p:nvSpPr>
+        <p:spPr>
+          <a:xfrm>
+            <a:off x="375465" y="1413863"/>
+            <a:ext cx="8283588" cy="461665"/>
+          </a:xfrm>
+          <a:prstGeom prst="rect">
+            <a:avLst/>
+          </a:prstGeom>
+        </p:spPr>
+        <p:txBody>
+          <a:bodyPr wrap="square">
+            <a:spAutoFit/>
+          </a:bodyPr>
+          <a:lstStyle/>
+          <a:p>
+            <a:pPr lvl="0">
+              <a:buClr>
+                <a:srgbClr val="FFCC00"/>
+              </a:buClr>
+            </a:pPr>
+            <a:r>
+              <a:rPr lang="pt-BR" sz="2400" dirty="0">
+                <a:solidFill>
+                  <a:srgbClr val="0070C0"/>
+                </a:solidFill>
+              </a:rPr>
+              <a:t>Caso de Uso: Gerar Relatórios de Fluxo de Exames</a:t>
+            </a:r>
+            <a:endParaRPr lang="pt-BR" sz="2400" dirty="0">
+              <a:solidFill>
+                <a:srgbClr val="0070C0"/>
+              </a:solidFill>
+            </a:endParaRPr>
+          </a:p>
+        </p:txBody>
+      </p:sp>
     </p:spTree>
     <p:extLst>
       <p:ext uri="{BB962C8B-B14F-4D97-AF65-F5344CB8AC3E}">
-        <p14:creationId xmlns:p14="http://schemas.microsoft.com/office/powerpoint/2010/main" xmlns="" val="2856898022"/>
+        <p14:creationId xmlns:p14="http://schemas.microsoft.com/office/powerpoint/2010/main" val="3479499341"/>
       </p:ext>
     </p:extLst>
   </p:cSld>
@@ -6409,7 +6606,7 @@
           <a:p>
             <a:r>
               <a:rPr lang="pt-BR" dirty="0" smtClean="0"/>
-              <a:t>Diagrama de Comunicação</a:t>
+              <a:t>Conclusão</a:t>
             </a:r>
             <a:endParaRPr lang="pt-BR" dirty="0"/>
           </a:p>
@@ -6417,6 +6614,76 @@
       </p:sp>
       <p:sp>
         <p:nvSpPr>
+          <p:cNvPr id="19459" name="Rectangle 3"/>
+          <p:cNvSpPr>
+            <a:spLocks noGrp="1" noChangeArrowheads="1"/>
+          </p:cNvSpPr>
+          <p:nvPr>
+            <p:ph type="body" idx="1"/>
+          </p:nvPr>
+        </p:nvSpPr>
+        <p:spPr/>
+        <p:txBody>
+          <a:bodyPr/>
+          <a:lstStyle/>
+          <a:p>
+            <a:r>
+              <a:rPr lang="pt-BR" dirty="0" smtClean="0"/>
+              <a:t>O </a:t>
+            </a:r>
+            <a:r>
+              <a:rPr lang="pt-BR" dirty="0" smtClean="0"/>
+              <a:t>ponto principal </a:t>
+            </a:r>
+            <a:r>
+              <a:rPr lang="pt-BR" dirty="0" smtClean="0"/>
+              <a:t>do sistema é a possibilidade de controle e gestão que ele oferece para a clínica, além de facilidade para o paciente que for realizar um exame.</a:t>
+            </a:r>
+          </a:p>
+          <a:p>
+            <a:r>
+              <a:rPr lang="pt-BR" dirty="0" smtClean="0"/>
+              <a:t>Um ponto a ser melhorado no </a:t>
+            </a:r>
+            <a:r>
+              <a:rPr lang="pt-BR" dirty="0" smtClean="0"/>
+              <a:t>sistema é a quantidade pequena de funcionalidades dele</a:t>
+            </a:r>
+            <a:r>
+              <a:rPr lang="pt-BR" dirty="0" smtClean="0"/>
+              <a:t>.</a:t>
+            </a:r>
+          </a:p>
+          <a:p>
+            <a:r>
+              <a:rPr lang="pt-BR" dirty="0" smtClean="0"/>
+              <a:t>No futuro </a:t>
+            </a:r>
+            <a:r>
+              <a:rPr lang="pt-BR" dirty="0"/>
+              <a:t>poderá ser acrescentado um sistema de agendamento de exames online no website da clínica e </a:t>
+            </a:r>
+            <a:r>
+              <a:rPr lang="pt-BR" dirty="0" smtClean="0"/>
+              <a:t>o </a:t>
+            </a:r>
+            <a:r>
+              <a:rPr lang="pt-BR" dirty="0"/>
+              <a:t>ajuste do website para dispositivos </a:t>
+            </a:r>
+            <a:r>
+              <a:rPr lang="pt-BR" dirty="0" smtClean="0"/>
+              <a:t>mobile.</a:t>
+            </a:r>
+            <a:endParaRPr lang="pt-BR" dirty="0"/>
+          </a:p>
+          <a:p>
+            <a:endParaRPr lang="pt-BR" dirty="0" smtClean="0"/>
+          </a:p>
+        </p:txBody>
+      </p:sp>
+      <p:sp>
+        <p:nvSpPr>
           <p:cNvPr id="6" name="Espaço Reservado para Data 5"/>
           <p:cNvSpPr>
             <a:spLocks noGrp="1"/>
@@ -6432,11 +6699,8 @@
           <a:p>
             <a:r>
               <a:rPr lang="pt-BR" dirty="0"/>
-              <a:t>09/06/2014</a:t>
-            </a:r>
-            <a:endParaRPr lang="pt-BR" dirty="0" smtClean="0"/>
-          </a:p>
-          <a:p>
+              <a:t>10/06/2014</a:t>
+            </a:r>
             <a:endParaRPr lang="pt-BR" dirty="0"/>
           </a:p>
         </p:txBody>
@@ -6488,404 +6752,7 @@
           </a:p>
         </p:txBody>
       </p:sp>
-      <p:pic>
-        <p:nvPicPr>
-          <p:cNvPr id="3" name="Imagem 2"/>
-          <p:cNvPicPr>
-            <a:picLocks noChangeAspect="1"/>
-          </p:cNvPicPr>
-          <p:nvPr/>
-        </p:nvPicPr>
-        <p:blipFill>
-          <a:blip r:embed="rId2" cstate="print">
-            <a:extLst>
-              <a:ext uri="{28A0092B-C50C-407E-A947-70E740481C1C}">
-                <a14:useLocalDpi xmlns:a14="http://schemas.microsoft.com/office/drawing/2010/main" xmlns="" val="0"/>
-              </a:ext>
-            </a:extLst>
-          </a:blip>
-          <a:stretch>
-            <a:fillRect/>
-          </a:stretch>
-        </p:blipFill>
-        <p:spPr>
-          <a:xfrm>
-            <a:off x="251520" y="2060848"/>
-            <a:ext cx="8777060" cy="3809675"/>
-          </a:xfrm>
-          <a:prstGeom prst="rect">
-            <a:avLst/>
-          </a:prstGeom>
-        </p:spPr>
-      </p:pic>
     </p:spTree>
-    <p:extLst>
-      <p:ext uri="{BB962C8B-B14F-4D97-AF65-F5344CB8AC3E}">
-        <p14:creationId xmlns:p14="http://schemas.microsoft.com/office/powerpoint/2010/main" xmlns="" val="1363267461"/>
-      </p:ext>
-    </p:extLst>
-  </p:cSld>
-  <p:clrMapOvr>
-    <a:masterClrMapping/>
-  </p:clrMapOvr>
-  <p:transition spd="med">
-    <p:fade/>
-  </p:transition>
-  <p:timing>
-    <p:tnLst>
-      <p:par>
-        <p:cTn id="1" dur="indefinite" restart="never" nodeType="tmRoot"/>
-      </p:par>
-    </p:tnLst>
-  </p:timing>
-</p:sld>
-</file>
-
-<file path=ppt/slides/slide18.xml><?xml version="1.0" encoding="utf-8"?>
-<p:sld xmlns:a="http://schemas.openxmlformats.org/drawingml/2006/main" xmlns:r="http://schemas.openxmlformats.org/officeDocument/2006/relationships" xmlns:p="http://schemas.openxmlformats.org/presentationml/2006/main">
-  <p:cSld>
-    <p:spTree>
-      <p:nvGrpSpPr>
-        <p:cNvPr id="1" name=""/>
-        <p:cNvGrpSpPr/>
-        <p:nvPr/>
-      </p:nvGrpSpPr>
-      <p:grpSpPr>
-        <a:xfrm>
-          <a:off x="0" y="0"/>
-          <a:ext cx="0" cy="0"/>
-          <a:chOff x="0" y="0"/>
-          <a:chExt cx="0" cy="0"/>
-        </a:xfrm>
-      </p:grpSpPr>
-      <p:sp>
-        <p:nvSpPr>
-          <p:cNvPr id="19458" name="Rectangle 2"/>
-          <p:cNvSpPr>
-            <a:spLocks noGrp="1" noChangeArrowheads="1"/>
-          </p:cNvSpPr>
-          <p:nvPr>
-            <p:ph type="title"/>
-          </p:nvPr>
-        </p:nvSpPr>
-        <p:spPr/>
-        <p:txBody>
-          <a:bodyPr/>
-          <a:lstStyle/>
-          <a:p>
-            <a:r>
-              <a:rPr lang="pt-BR" dirty="0" smtClean="0"/>
-              <a:t>Diagrama de Classe</a:t>
-            </a:r>
-            <a:endParaRPr lang="pt-BR" dirty="0"/>
-          </a:p>
-        </p:txBody>
-      </p:sp>
-      <p:sp>
-        <p:nvSpPr>
-          <p:cNvPr id="6" name="Espaço Reservado para Data 5"/>
-          <p:cNvSpPr>
-            <a:spLocks noGrp="1"/>
-          </p:cNvSpPr>
-          <p:nvPr>
-            <p:ph type="dt" sz="half" idx="10"/>
-          </p:nvPr>
-        </p:nvSpPr>
-        <p:spPr/>
-        <p:txBody>
-          <a:bodyPr/>
-          <a:lstStyle/>
-          <a:p>
-            <a:r>
-              <a:rPr lang="pt-BR" dirty="0"/>
-              <a:t>09/06/2014</a:t>
-            </a:r>
-            <a:endParaRPr lang="pt-BR" dirty="0" smtClean="0"/>
-          </a:p>
-          <a:p>
-            <a:endParaRPr lang="pt-BR" dirty="0"/>
-          </a:p>
-        </p:txBody>
-      </p:sp>
-      <p:sp>
-        <p:nvSpPr>
-          <p:cNvPr id="7" name="Espaço Reservado para Número de Slide 6"/>
-          <p:cNvSpPr>
-            <a:spLocks noGrp="1"/>
-          </p:cNvSpPr>
-          <p:nvPr>
-            <p:ph type="sldNum" sz="quarter" idx="12"/>
-          </p:nvPr>
-        </p:nvSpPr>
-        <p:spPr/>
-        <p:txBody>
-          <a:bodyPr/>
-          <a:lstStyle/>
-          <a:p>
-            <a:fld id="{516476CB-12D4-456A-BCEE-8469A8C40045}" type="slidenum">
-              <a:rPr lang="pt-BR" smtClean="0"/>
-              <a:pPr/>
-              <a:t>18</a:t>
-            </a:fld>
-            <a:endParaRPr lang="pt-BR" dirty="0"/>
-          </a:p>
-        </p:txBody>
-      </p:sp>
-      <p:sp>
-        <p:nvSpPr>
-          <p:cNvPr id="8" name="Espaço Reservado para Rodapé 7"/>
-          <p:cNvSpPr>
-            <a:spLocks noGrp="1"/>
-          </p:cNvSpPr>
-          <p:nvPr>
-            <p:ph type="ftr" sz="quarter" idx="11"/>
-          </p:nvPr>
-        </p:nvSpPr>
-        <p:spPr/>
-        <p:txBody>
-          <a:bodyPr/>
-          <a:lstStyle/>
-          <a:p>
-            <a:r>
-              <a:rPr lang="pt-BR" dirty="0" smtClean="0"/>
-              <a:t>Veris Faculdades TCM/3ADS</a:t>
-            </a:r>
-            <a:endParaRPr lang="pt-BR" dirty="0"/>
-          </a:p>
-        </p:txBody>
-      </p:sp>
-      <p:pic>
-        <p:nvPicPr>
-          <p:cNvPr id="2" name="Imagem 1"/>
-          <p:cNvPicPr>
-            <a:picLocks noChangeAspect="1"/>
-          </p:cNvPicPr>
-          <p:nvPr/>
-        </p:nvPicPr>
-        <p:blipFill>
-          <a:blip r:embed="rId2" cstate="print">
-            <a:extLst>
-              <a:ext uri="{28A0092B-C50C-407E-A947-70E740481C1C}">
-                <a14:useLocalDpi xmlns:a14="http://schemas.microsoft.com/office/drawing/2010/main" xmlns="" val="0"/>
-              </a:ext>
-            </a:extLst>
-          </a:blip>
-          <a:stretch>
-            <a:fillRect/>
-          </a:stretch>
-        </p:blipFill>
-        <p:spPr>
-          <a:xfrm>
-            <a:off x="2034028" y="1509355"/>
-            <a:ext cx="5075944" cy="4739045"/>
-          </a:xfrm>
-          <a:prstGeom prst="rect">
-            <a:avLst/>
-          </a:prstGeom>
-        </p:spPr>
-      </p:pic>
-    </p:spTree>
-    <p:extLst>
-      <p:ext uri="{BB962C8B-B14F-4D97-AF65-F5344CB8AC3E}">
-        <p14:creationId xmlns:p14="http://schemas.microsoft.com/office/powerpoint/2010/main" xmlns="" val="1273683969"/>
-      </p:ext>
-    </p:extLst>
-  </p:cSld>
-  <p:clrMapOvr>
-    <a:masterClrMapping/>
-  </p:clrMapOvr>
-  <p:transition spd="med">
-    <p:fade/>
-  </p:transition>
-  <p:timing>
-    <p:tnLst>
-      <p:par>
-        <p:cTn id="1" dur="indefinite" restart="never" nodeType="tmRoot"/>
-      </p:par>
-    </p:tnLst>
-  </p:timing>
-</p:sld>
-</file>
-
-<file path=ppt/slides/slide19.xml><?xml version="1.0" encoding="utf-8"?>
-<p:sld xmlns:a="http://schemas.openxmlformats.org/drawingml/2006/main" xmlns:r="http://schemas.openxmlformats.org/officeDocument/2006/relationships" xmlns:p="http://schemas.openxmlformats.org/presentationml/2006/main">
-  <p:cSld>
-    <p:spTree>
-      <p:nvGrpSpPr>
-        <p:cNvPr id="1" name=""/>
-        <p:cNvGrpSpPr/>
-        <p:nvPr/>
-      </p:nvGrpSpPr>
-      <p:grpSpPr>
-        <a:xfrm>
-          <a:off x="0" y="0"/>
-          <a:ext cx="0" cy="0"/>
-          <a:chOff x="0" y="0"/>
-          <a:chExt cx="0" cy="0"/>
-        </a:xfrm>
-      </p:grpSpPr>
-      <p:sp>
-        <p:nvSpPr>
-          <p:cNvPr id="19458" name="Rectangle 2"/>
-          <p:cNvSpPr>
-            <a:spLocks noGrp="1" noChangeArrowheads="1"/>
-          </p:cNvSpPr>
-          <p:nvPr>
-            <p:ph type="title"/>
-          </p:nvPr>
-        </p:nvSpPr>
-        <p:spPr/>
-        <p:txBody>
-          <a:bodyPr/>
-          <a:lstStyle/>
-          <a:p>
-            <a:r>
-              <a:rPr lang="pt-BR" dirty="0" smtClean="0"/>
-              <a:t>Diagrama de Classe</a:t>
-            </a:r>
-            <a:endParaRPr lang="pt-BR" dirty="0"/>
-          </a:p>
-        </p:txBody>
-      </p:sp>
-      <p:sp>
-        <p:nvSpPr>
-          <p:cNvPr id="6" name="Espaço Reservado para Data 5"/>
-          <p:cNvSpPr>
-            <a:spLocks noGrp="1"/>
-          </p:cNvSpPr>
-          <p:nvPr>
-            <p:ph type="dt" sz="half" idx="10"/>
-          </p:nvPr>
-        </p:nvSpPr>
-        <p:spPr/>
-        <p:txBody>
-          <a:bodyPr/>
-          <a:lstStyle/>
-          <a:p>
-            <a:r>
-              <a:rPr lang="pt-BR" dirty="0"/>
-              <a:t>09/06/2014</a:t>
-            </a:r>
-            <a:endParaRPr lang="pt-BR" dirty="0" smtClean="0"/>
-          </a:p>
-          <a:p>
-            <a:endParaRPr lang="pt-BR" dirty="0"/>
-          </a:p>
-        </p:txBody>
-      </p:sp>
-      <p:sp>
-        <p:nvSpPr>
-          <p:cNvPr id="7" name="Espaço Reservado para Número de Slide 6"/>
-          <p:cNvSpPr>
-            <a:spLocks noGrp="1"/>
-          </p:cNvSpPr>
-          <p:nvPr>
-            <p:ph type="sldNum" sz="quarter" idx="12"/>
-          </p:nvPr>
-        </p:nvSpPr>
-        <p:spPr/>
-        <p:txBody>
-          <a:bodyPr/>
-          <a:lstStyle/>
-          <a:p>
-            <a:fld id="{516476CB-12D4-456A-BCEE-8469A8C40045}" type="slidenum">
-              <a:rPr lang="pt-BR" smtClean="0"/>
-              <a:pPr/>
-              <a:t>19</a:t>
-            </a:fld>
-            <a:endParaRPr lang="pt-BR" dirty="0"/>
-          </a:p>
-        </p:txBody>
-      </p:sp>
-      <p:sp>
-        <p:nvSpPr>
-          <p:cNvPr id="8" name="Espaço Reservado para Rodapé 7"/>
-          <p:cNvSpPr>
-            <a:spLocks noGrp="1"/>
-          </p:cNvSpPr>
-          <p:nvPr>
-            <p:ph type="ftr" sz="quarter" idx="11"/>
-          </p:nvPr>
-        </p:nvSpPr>
-        <p:spPr/>
-        <p:txBody>
-          <a:bodyPr/>
-          <a:lstStyle/>
-          <a:p>
-            <a:r>
-              <a:rPr lang="pt-BR" dirty="0" smtClean="0"/>
-              <a:t>Veris Faculdades TCM/3ADS</a:t>
-            </a:r>
-            <a:endParaRPr lang="pt-BR" dirty="0"/>
-          </a:p>
-        </p:txBody>
-      </p:sp>
-      <p:pic>
-        <p:nvPicPr>
-          <p:cNvPr id="3" name="Imagem 2"/>
-          <p:cNvPicPr>
-            <a:picLocks noChangeAspect="1"/>
-          </p:cNvPicPr>
-          <p:nvPr/>
-        </p:nvPicPr>
-        <p:blipFill>
-          <a:blip r:embed="rId2" cstate="print">
-            <a:extLst>
-              <a:ext uri="{28A0092B-C50C-407E-A947-70E740481C1C}">
-                <a14:useLocalDpi xmlns:a14="http://schemas.microsoft.com/office/drawing/2010/main" xmlns="" val="0"/>
-              </a:ext>
-            </a:extLst>
-          </a:blip>
-          <a:stretch>
-            <a:fillRect/>
-          </a:stretch>
-        </p:blipFill>
-        <p:spPr>
-          <a:xfrm>
-            <a:off x="2684285" y="1511827"/>
-            <a:ext cx="3775429" cy="4748968"/>
-          </a:xfrm>
-          <a:prstGeom prst="rect">
-            <a:avLst/>
-          </a:prstGeom>
-        </p:spPr>
-      </p:pic>
-      <p:pic>
-        <p:nvPicPr>
-          <p:cNvPr id="9" name="Imagem 8"/>
-          <p:cNvPicPr>
-            <a:picLocks noChangeAspect="1"/>
-          </p:cNvPicPr>
-          <p:nvPr/>
-        </p:nvPicPr>
-        <p:blipFill>
-          <a:blip r:embed="rId3" cstate="print">
-            <a:extLst>
-              <a:ext uri="{28A0092B-C50C-407E-A947-70E740481C1C}">
-                <a14:useLocalDpi xmlns:a14="http://schemas.microsoft.com/office/drawing/2010/main" xmlns="" val="0"/>
-              </a:ext>
-            </a:extLst>
-          </a:blip>
-          <a:stretch>
-            <a:fillRect/>
-          </a:stretch>
-        </p:blipFill>
-        <p:spPr>
-          <a:xfrm>
-            <a:off x="6444208" y="5085184"/>
-            <a:ext cx="1296144" cy="450833"/>
-          </a:xfrm>
-          <a:prstGeom prst="rect">
-            <a:avLst/>
-          </a:prstGeom>
-        </p:spPr>
-      </p:pic>
-    </p:spTree>
-    <p:extLst>
-      <p:ext uri="{BB962C8B-B14F-4D97-AF65-F5344CB8AC3E}">
-        <p14:creationId xmlns:p14="http://schemas.microsoft.com/office/powerpoint/2010/main" xmlns="" val="2007851057"/>
-      </p:ext>
-    </p:extLst>
   </p:cSld>
   <p:clrMapOvr>
     <a:masterClrMapping/>
@@ -6995,8 +6862,9 @@
           <a:p>
             <a:r>
               <a:rPr lang="pt-BR" dirty="0" smtClean="0"/>
-              <a:t>09/06/2014</a:t>
-            </a:r>
+              <a:t>10/06/2014</a:t>
+            </a:r>
+            <a:endParaRPr lang="pt-BR" dirty="0" smtClean="0"/>
           </a:p>
           <a:p>
             <a:endParaRPr lang="pt-BR" dirty="0"/>
@@ -7051,1726 +6919,6 @@
         </p:txBody>
       </p:sp>
     </p:spTree>
-  </p:cSld>
-  <p:clrMapOvr>
-    <a:masterClrMapping/>
-  </p:clrMapOvr>
-  <p:transition spd="med">
-    <p:fade/>
-  </p:transition>
-  <p:timing>
-    <p:tnLst>
-      <p:par>
-        <p:cTn id="1" dur="indefinite" restart="never" nodeType="tmRoot"/>
-      </p:par>
-    </p:tnLst>
-  </p:timing>
-</p:sld>
-</file>
-
-<file path=ppt/slides/slide20.xml><?xml version="1.0" encoding="utf-8"?>
-<p:sld xmlns:a="http://schemas.openxmlformats.org/drawingml/2006/main" xmlns:r="http://schemas.openxmlformats.org/officeDocument/2006/relationships" xmlns:p="http://schemas.openxmlformats.org/presentationml/2006/main">
-  <p:cSld>
-    <p:spTree>
-      <p:nvGrpSpPr>
-        <p:cNvPr id="1" name=""/>
-        <p:cNvGrpSpPr/>
-        <p:nvPr/>
-      </p:nvGrpSpPr>
-      <p:grpSpPr>
-        <a:xfrm>
-          <a:off x="0" y="0"/>
-          <a:ext cx="0" cy="0"/>
-          <a:chOff x="0" y="0"/>
-          <a:chExt cx="0" cy="0"/>
-        </a:xfrm>
-      </p:grpSpPr>
-      <p:sp>
-        <p:nvSpPr>
-          <p:cNvPr id="19458" name="Rectangle 2"/>
-          <p:cNvSpPr>
-            <a:spLocks noGrp="1" noChangeArrowheads="1"/>
-          </p:cNvSpPr>
-          <p:nvPr>
-            <p:ph type="title"/>
-          </p:nvPr>
-        </p:nvSpPr>
-        <p:spPr/>
-        <p:txBody>
-          <a:bodyPr/>
-          <a:lstStyle/>
-          <a:p>
-            <a:r>
-              <a:rPr lang="pt-BR" dirty="0" smtClean="0"/>
-              <a:t>Diagrama de Classe</a:t>
-            </a:r>
-            <a:endParaRPr lang="pt-BR" dirty="0"/>
-          </a:p>
-        </p:txBody>
-      </p:sp>
-      <p:sp>
-        <p:nvSpPr>
-          <p:cNvPr id="6" name="Espaço Reservado para Data 5"/>
-          <p:cNvSpPr>
-            <a:spLocks noGrp="1"/>
-          </p:cNvSpPr>
-          <p:nvPr>
-            <p:ph type="dt" sz="half" idx="10"/>
-          </p:nvPr>
-        </p:nvSpPr>
-        <p:spPr/>
-        <p:txBody>
-          <a:bodyPr/>
-          <a:lstStyle/>
-          <a:p>
-            <a:r>
-              <a:rPr lang="pt-BR" dirty="0"/>
-              <a:t>09/06/2014</a:t>
-            </a:r>
-            <a:endParaRPr lang="pt-BR" dirty="0" smtClean="0"/>
-          </a:p>
-          <a:p>
-            <a:endParaRPr lang="pt-BR" dirty="0"/>
-          </a:p>
-        </p:txBody>
-      </p:sp>
-      <p:sp>
-        <p:nvSpPr>
-          <p:cNvPr id="7" name="Espaço Reservado para Número de Slide 6"/>
-          <p:cNvSpPr>
-            <a:spLocks noGrp="1"/>
-          </p:cNvSpPr>
-          <p:nvPr>
-            <p:ph type="sldNum" sz="quarter" idx="12"/>
-          </p:nvPr>
-        </p:nvSpPr>
-        <p:spPr/>
-        <p:txBody>
-          <a:bodyPr/>
-          <a:lstStyle/>
-          <a:p>
-            <a:fld id="{516476CB-12D4-456A-BCEE-8469A8C40045}" type="slidenum">
-              <a:rPr lang="pt-BR" smtClean="0"/>
-              <a:pPr/>
-              <a:t>20</a:t>
-            </a:fld>
-            <a:endParaRPr lang="pt-BR" dirty="0"/>
-          </a:p>
-        </p:txBody>
-      </p:sp>
-      <p:sp>
-        <p:nvSpPr>
-          <p:cNvPr id="8" name="Espaço Reservado para Rodapé 7"/>
-          <p:cNvSpPr>
-            <a:spLocks noGrp="1"/>
-          </p:cNvSpPr>
-          <p:nvPr>
-            <p:ph type="ftr" sz="quarter" idx="11"/>
-          </p:nvPr>
-        </p:nvSpPr>
-        <p:spPr/>
-        <p:txBody>
-          <a:bodyPr/>
-          <a:lstStyle/>
-          <a:p>
-            <a:r>
-              <a:rPr lang="pt-BR" dirty="0" smtClean="0"/>
-              <a:t>Veris Faculdades TCM/3ADS</a:t>
-            </a:r>
-            <a:endParaRPr lang="pt-BR" dirty="0"/>
-          </a:p>
-        </p:txBody>
-      </p:sp>
-      <p:pic>
-        <p:nvPicPr>
-          <p:cNvPr id="3" name="Imagem 2"/>
-          <p:cNvPicPr>
-            <a:picLocks noChangeAspect="1"/>
-          </p:cNvPicPr>
-          <p:nvPr/>
-        </p:nvPicPr>
-        <p:blipFill>
-          <a:blip r:embed="rId2" cstate="print">
-            <a:extLst>
-              <a:ext uri="{28A0092B-C50C-407E-A947-70E740481C1C}">
-                <a14:useLocalDpi xmlns:a14="http://schemas.microsoft.com/office/drawing/2010/main" xmlns="" val="0"/>
-              </a:ext>
-            </a:extLst>
-          </a:blip>
-          <a:stretch>
-            <a:fillRect/>
-          </a:stretch>
-        </p:blipFill>
-        <p:spPr>
-          <a:xfrm>
-            <a:off x="1859731" y="1464101"/>
-            <a:ext cx="5424538" cy="4845219"/>
-          </a:xfrm>
-          <a:prstGeom prst="rect">
-            <a:avLst/>
-          </a:prstGeom>
-        </p:spPr>
-      </p:pic>
-    </p:spTree>
-    <p:extLst>
-      <p:ext uri="{BB962C8B-B14F-4D97-AF65-F5344CB8AC3E}">
-        <p14:creationId xmlns:p14="http://schemas.microsoft.com/office/powerpoint/2010/main" xmlns="" val="479288004"/>
-      </p:ext>
-    </p:extLst>
-  </p:cSld>
-  <p:clrMapOvr>
-    <a:masterClrMapping/>
-  </p:clrMapOvr>
-  <p:transition spd="med">
-    <p:fade/>
-  </p:transition>
-  <p:timing>
-    <p:tnLst>
-      <p:par>
-        <p:cTn id="1" dur="indefinite" restart="never" nodeType="tmRoot"/>
-      </p:par>
-    </p:tnLst>
-  </p:timing>
-</p:sld>
-</file>
-
-<file path=ppt/slides/slide21.xml><?xml version="1.0" encoding="utf-8"?>
-<p:sld xmlns:a="http://schemas.openxmlformats.org/drawingml/2006/main" xmlns:r="http://schemas.openxmlformats.org/officeDocument/2006/relationships" xmlns:p="http://schemas.openxmlformats.org/presentationml/2006/main">
-  <p:cSld>
-    <p:spTree>
-      <p:nvGrpSpPr>
-        <p:cNvPr id="1" name=""/>
-        <p:cNvGrpSpPr/>
-        <p:nvPr/>
-      </p:nvGrpSpPr>
-      <p:grpSpPr>
-        <a:xfrm>
-          <a:off x="0" y="0"/>
-          <a:ext cx="0" cy="0"/>
-          <a:chOff x="0" y="0"/>
-          <a:chExt cx="0" cy="0"/>
-        </a:xfrm>
-      </p:grpSpPr>
-      <p:sp>
-        <p:nvSpPr>
-          <p:cNvPr id="19458" name="Rectangle 2"/>
-          <p:cNvSpPr>
-            <a:spLocks noGrp="1" noChangeArrowheads="1"/>
-          </p:cNvSpPr>
-          <p:nvPr>
-            <p:ph type="title"/>
-          </p:nvPr>
-        </p:nvSpPr>
-        <p:spPr/>
-        <p:txBody>
-          <a:bodyPr/>
-          <a:lstStyle/>
-          <a:p>
-            <a:r>
-              <a:rPr lang="pt-BR" dirty="0" smtClean="0"/>
-              <a:t>Diagrama de Classe</a:t>
-            </a:r>
-            <a:endParaRPr lang="pt-BR" dirty="0"/>
-          </a:p>
-        </p:txBody>
-      </p:sp>
-      <p:sp>
-        <p:nvSpPr>
-          <p:cNvPr id="6" name="Espaço Reservado para Data 5"/>
-          <p:cNvSpPr>
-            <a:spLocks noGrp="1"/>
-          </p:cNvSpPr>
-          <p:nvPr>
-            <p:ph type="dt" sz="half" idx="10"/>
-          </p:nvPr>
-        </p:nvSpPr>
-        <p:spPr/>
-        <p:txBody>
-          <a:bodyPr/>
-          <a:lstStyle/>
-          <a:p>
-            <a:r>
-              <a:rPr lang="pt-BR" dirty="0"/>
-              <a:t>09/06/2014</a:t>
-            </a:r>
-            <a:endParaRPr lang="pt-BR" dirty="0" smtClean="0"/>
-          </a:p>
-          <a:p>
-            <a:endParaRPr lang="pt-BR" dirty="0"/>
-          </a:p>
-        </p:txBody>
-      </p:sp>
-      <p:sp>
-        <p:nvSpPr>
-          <p:cNvPr id="7" name="Espaço Reservado para Número de Slide 6"/>
-          <p:cNvSpPr>
-            <a:spLocks noGrp="1"/>
-          </p:cNvSpPr>
-          <p:nvPr>
-            <p:ph type="sldNum" sz="quarter" idx="12"/>
-          </p:nvPr>
-        </p:nvSpPr>
-        <p:spPr/>
-        <p:txBody>
-          <a:bodyPr/>
-          <a:lstStyle/>
-          <a:p>
-            <a:fld id="{516476CB-12D4-456A-BCEE-8469A8C40045}" type="slidenum">
-              <a:rPr lang="pt-BR" smtClean="0"/>
-              <a:pPr/>
-              <a:t>21</a:t>
-            </a:fld>
-            <a:endParaRPr lang="pt-BR" dirty="0"/>
-          </a:p>
-        </p:txBody>
-      </p:sp>
-      <p:sp>
-        <p:nvSpPr>
-          <p:cNvPr id="8" name="Espaço Reservado para Rodapé 7"/>
-          <p:cNvSpPr>
-            <a:spLocks noGrp="1"/>
-          </p:cNvSpPr>
-          <p:nvPr>
-            <p:ph type="ftr" sz="quarter" idx="11"/>
-          </p:nvPr>
-        </p:nvSpPr>
-        <p:spPr/>
-        <p:txBody>
-          <a:bodyPr/>
-          <a:lstStyle/>
-          <a:p>
-            <a:r>
-              <a:rPr lang="pt-BR" dirty="0" smtClean="0"/>
-              <a:t>Veris Faculdades TCM/3ADS</a:t>
-            </a:r>
-            <a:endParaRPr lang="pt-BR" dirty="0"/>
-          </a:p>
-        </p:txBody>
-      </p:sp>
-      <p:pic>
-        <p:nvPicPr>
-          <p:cNvPr id="2" name="Imagem 1"/>
-          <p:cNvPicPr>
-            <a:picLocks noChangeAspect="1"/>
-          </p:cNvPicPr>
-          <p:nvPr/>
-        </p:nvPicPr>
-        <p:blipFill>
-          <a:blip r:embed="rId2" cstate="print">
-            <a:extLst>
-              <a:ext uri="{28A0092B-C50C-407E-A947-70E740481C1C}">
-                <a14:useLocalDpi xmlns:a14="http://schemas.microsoft.com/office/drawing/2010/main" xmlns="" val="0"/>
-              </a:ext>
-            </a:extLst>
-          </a:blip>
-          <a:stretch>
-            <a:fillRect/>
-          </a:stretch>
-        </p:blipFill>
-        <p:spPr>
-          <a:xfrm>
-            <a:off x="255807" y="2621622"/>
-            <a:ext cx="8892480" cy="3626778"/>
-          </a:xfrm>
-          <a:prstGeom prst="rect">
-            <a:avLst/>
-          </a:prstGeom>
-        </p:spPr>
-      </p:pic>
-      <p:pic>
-        <p:nvPicPr>
-          <p:cNvPr id="4" name="Imagem 3"/>
-          <p:cNvPicPr>
-            <a:picLocks noChangeAspect="1"/>
-          </p:cNvPicPr>
-          <p:nvPr/>
-        </p:nvPicPr>
-        <p:blipFill>
-          <a:blip r:embed="rId3" cstate="print">
-            <a:extLst>
-              <a:ext uri="{28A0092B-C50C-407E-A947-70E740481C1C}">
-                <a14:useLocalDpi xmlns:a14="http://schemas.microsoft.com/office/drawing/2010/main" xmlns="" val="0"/>
-              </a:ext>
-            </a:extLst>
-          </a:blip>
-          <a:stretch>
-            <a:fillRect/>
-          </a:stretch>
-        </p:blipFill>
-        <p:spPr>
-          <a:xfrm>
-            <a:off x="899592" y="1483279"/>
-            <a:ext cx="1985634" cy="1138344"/>
-          </a:xfrm>
-          <a:prstGeom prst="rect">
-            <a:avLst/>
-          </a:prstGeom>
-        </p:spPr>
-      </p:pic>
-    </p:spTree>
-    <p:extLst>
-      <p:ext uri="{BB962C8B-B14F-4D97-AF65-F5344CB8AC3E}">
-        <p14:creationId xmlns:p14="http://schemas.microsoft.com/office/powerpoint/2010/main" xmlns="" val="1486041614"/>
-      </p:ext>
-    </p:extLst>
-  </p:cSld>
-  <p:clrMapOvr>
-    <a:masterClrMapping/>
-  </p:clrMapOvr>
-  <p:transition spd="med">
-    <p:fade/>
-  </p:transition>
-  <p:timing>
-    <p:tnLst>
-      <p:par>
-        <p:cTn id="1" dur="indefinite" restart="never" nodeType="tmRoot"/>
-      </p:par>
-    </p:tnLst>
-  </p:timing>
-</p:sld>
-</file>
-
-<file path=ppt/slides/slide22.xml><?xml version="1.0" encoding="utf-8"?>
-<p:sld xmlns:a="http://schemas.openxmlformats.org/drawingml/2006/main" xmlns:r="http://schemas.openxmlformats.org/officeDocument/2006/relationships" xmlns:p="http://schemas.openxmlformats.org/presentationml/2006/main">
-  <p:cSld>
-    <p:spTree>
-      <p:nvGrpSpPr>
-        <p:cNvPr id="1" name=""/>
-        <p:cNvGrpSpPr/>
-        <p:nvPr/>
-      </p:nvGrpSpPr>
-      <p:grpSpPr>
-        <a:xfrm>
-          <a:off x="0" y="0"/>
-          <a:ext cx="0" cy="0"/>
-          <a:chOff x="0" y="0"/>
-          <a:chExt cx="0" cy="0"/>
-        </a:xfrm>
-      </p:grpSpPr>
-      <p:sp>
-        <p:nvSpPr>
-          <p:cNvPr id="19458" name="Rectangle 2"/>
-          <p:cNvSpPr>
-            <a:spLocks noGrp="1" noChangeArrowheads="1"/>
-          </p:cNvSpPr>
-          <p:nvPr>
-            <p:ph type="title"/>
-          </p:nvPr>
-        </p:nvSpPr>
-        <p:spPr/>
-        <p:txBody>
-          <a:bodyPr/>
-          <a:lstStyle/>
-          <a:p>
-            <a:r>
-              <a:rPr lang="pt-BR" dirty="0" smtClean="0"/>
-              <a:t>Diagrama de Comunicação</a:t>
-            </a:r>
-            <a:endParaRPr lang="pt-BR" dirty="0"/>
-          </a:p>
-        </p:txBody>
-      </p:sp>
-      <p:sp>
-        <p:nvSpPr>
-          <p:cNvPr id="6" name="Espaço Reservado para Data 5"/>
-          <p:cNvSpPr>
-            <a:spLocks noGrp="1"/>
-          </p:cNvSpPr>
-          <p:nvPr>
-            <p:ph type="dt" sz="half" idx="10"/>
-          </p:nvPr>
-        </p:nvSpPr>
-        <p:spPr/>
-        <p:txBody>
-          <a:bodyPr/>
-          <a:lstStyle/>
-          <a:p>
-            <a:r>
-              <a:rPr lang="pt-BR" dirty="0"/>
-              <a:t>09/06/2014</a:t>
-            </a:r>
-            <a:endParaRPr lang="pt-BR" dirty="0" smtClean="0"/>
-          </a:p>
-          <a:p>
-            <a:endParaRPr lang="pt-BR" dirty="0"/>
-          </a:p>
-        </p:txBody>
-      </p:sp>
-      <p:sp>
-        <p:nvSpPr>
-          <p:cNvPr id="7" name="Espaço Reservado para Número de Slide 6"/>
-          <p:cNvSpPr>
-            <a:spLocks noGrp="1"/>
-          </p:cNvSpPr>
-          <p:nvPr>
-            <p:ph type="sldNum" sz="quarter" idx="12"/>
-          </p:nvPr>
-        </p:nvSpPr>
-        <p:spPr/>
-        <p:txBody>
-          <a:bodyPr/>
-          <a:lstStyle/>
-          <a:p>
-            <a:fld id="{516476CB-12D4-456A-BCEE-8469A8C40045}" type="slidenum">
-              <a:rPr lang="pt-BR" smtClean="0"/>
-              <a:pPr/>
-              <a:t>22</a:t>
-            </a:fld>
-            <a:endParaRPr lang="pt-BR" dirty="0"/>
-          </a:p>
-        </p:txBody>
-      </p:sp>
-      <p:sp>
-        <p:nvSpPr>
-          <p:cNvPr id="8" name="Espaço Reservado para Rodapé 7"/>
-          <p:cNvSpPr>
-            <a:spLocks noGrp="1"/>
-          </p:cNvSpPr>
-          <p:nvPr>
-            <p:ph type="ftr" sz="quarter" idx="11"/>
-          </p:nvPr>
-        </p:nvSpPr>
-        <p:spPr/>
-        <p:txBody>
-          <a:bodyPr/>
-          <a:lstStyle/>
-          <a:p>
-            <a:r>
-              <a:rPr lang="pt-BR" dirty="0" smtClean="0"/>
-              <a:t>Veris Faculdades TCM/3ADS</a:t>
-            </a:r>
-            <a:endParaRPr lang="pt-BR" dirty="0"/>
-          </a:p>
-        </p:txBody>
-      </p:sp>
-      <p:pic>
-        <p:nvPicPr>
-          <p:cNvPr id="3" name="Imagem 2"/>
-          <p:cNvPicPr>
-            <a:picLocks noChangeAspect="1"/>
-          </p:cNvPicPr>
-          <p:nvPr/>
-        </p:nvPicPr>
-        <p:blipFill>
-          <a:blip r:embed="rId2" cstate="print">
-            <a:extLst>
-              <a:ext uri="{28A0092B-C50C-407E-A947-70E740481C1C}">
-                <a14:useLocalDpi xmlns:a14="http://schemas.microsoft.com/office/drawing/2010/main" xmlns="" val="0"/>
-              </a:ext>
-            </a:extLst>
-          </a:blip>
-          <a:stretch>
-            <a:fillRect/>
-          </a:stretch>
-        </p:blipFill>
-        <p:spPr>
-          <a:xfrm>
-            <a:off x="245428" y="1700808"/>
-            <a:ext cx="8898571" cy="4520191"/>
-          </a:xfrm>
-          <a:prstGeom prst="rect">
-            <a:avLst/>
-          </a:prstGeom>
-        </p:spPr>
-      </p:pic>
-    </p:spTree>
-    <p:extLst>
-      <p:ext uri="{BB962C8B-B14F-4D97-AF65-F5344CB8AC3E}">
-        <p14:creationId xmlns:p14="http://schemas.microsoft.com/office/powerpoint/2010/main" xmlns="" val="2149158567"/>
-      </p:ext>
-    </p:extLst>
-  </p:cSld>
-  <p:clrMapOvr>
-    <a:masterClrMapping/>
-  </p:clrMapOvr>
-  <p:transition spd="med">
-    <p:fade/>
-  </p:transition>
-  <p:timing>
-    <p:tnLst>
-      <p:par>
-        <p:cTn id="1" dur="indefinite" restart="never" nodeType="tmRoot"/>
-      </p:par>
-    </p:tnLst>
-  </p:timing>
-</p:sld>
-</file>
-
-<file path=ppt/slides/slide23.xml><?xml version="1.0" encoding="utf-8"?>
-<p:sld xmlns:a="http://schemas.openxmlformats.org/drawingml/2006/main" xmlns:r="http://schemas.openxmlformats.org/officeDocument/2006/relationships" xmlns:p="http://schemas.openxmlformats.org/presentationml/2006/main">
-  <p:cSld>
-    <p:spTree>
-      <p:nvGrpSpPr>
-        <p:cNvPr id="1" name=""/>
-        <p:cNvGrpSpPr/>
-        <p:nvPr/>
-      </p:nvGrpSpPr>
-      <p:grpSpPr>
-        <a:xfrm>
-          <a:off x="0" y="0"/>
-          <a:ext cx="0" cy="0"/>
-          <a:chOff x="0" y="0"/>
-          <a:chExt cx="0" cy="0"/>
-        </a:xfrm>
-      </p:grpSpPr>
-      <p:sp>
-        <p:nvSpPr>
-          <p:cNvPr id="19458" name="Rectangle 2"/>
-          <p:cNvSpPr>
-            <a:spLocks noGrp="1" noChangeArrowheads="1"/>
-          </p:cNvSpPr>
-          <p:nvPr>
-            <p:ph type="title"/>
-          </p:nvPr>
-        </p:nvSpPr>
-        <p:spPr/>
-        <p:txBody>
-          <a:bodyPr/>
-          <a:lstStyle/>
-          <a:p>
-            <a:r>
-              <a:rPr lang="pt-BR" dirty="0" smtClean="0"/>
-              <a:t>Diagrama de Comunicação</a:t>
-            </a:r>
-            <a:endParaRPr lang="pt-BR" dirty="0"/>
-          </a:p>
-        </p:txBody>
-      </p:sp>
-      <p:sp>
-        <p:nvSpPr>
-          <p:cNvPr id="6" name="Espaço Reservado para Data 5"/>
-          <p:cNvSpPr>
-            <a:spLocks noGrp="1"/>
-          </p:cNvSpPr>
-          <p:nvPr>
-            <p:ph type="dt" sz="half" idx="10"/>
-          </p:nvPr>
-        </p:nvSpPr>
-        <p:spPr/>
-        <p:txBody>
-          <a:bodyPr/>
-          <a:lstStyle/>
-          <a:p>
-            <a:r>
-              <a:rPr lang="pt-BR" dirty="0"/>
-              <a:t>09/06/2014</a:t>
-            </a:r>
-            <a:endParaRPr lang="pt-BR" dirty="0" smtClean="0"/>
-          </a:p>
-          <a:p>
-            <a:endParaRPr lang="pt-BR" dirty="0"/>
-          </a:p>
-        </p:txBody>
-      </p:sp>
-      <p:sp>
-        <p:nvSpPr>
-          <p:cNvPr id="7" name="Espaço Reservado para Número de Slide 6"/>
-          <p:cNvSpPr>
-            <a:spLocks noGrp="1"/>
-          </p:cNvSpPr>
-          <p:nvPr>
-            <p:ph type="sldNum" sz="quarter" idx="12"/>
-          </p:nvPr>
-        </p:nvSpPr>
-        <p:spPr/>
-        <p:txBody>
-          <a:bodyPr/>
-          <a:lstStyle/>
-          <a:p>
-            <a:fld id="{516476CB-12D4-456A-BCEE-8469A8C40045}" type="slidenum">
-              <a:rPr lang="pt-BR" smtClean="0"/>
-              <a:pPr/>
-              <a:t>23</a:t>
-            </a:fld>
-            <a:endParaRPr lang="pt-BR" dirty="0"/>
-          </a:p>
-        </p:txBody>
-      </p:sp>
-      <p:sp>
-        <p:nvSpPr>
-          <p:cNvPr id="8" name="Espaço Reservado para Rodapé 7"/>
-          <p:cNvSpPr>
-            <a:spLocks noGrp="1"/>
-          </p:cNvSpPr>
-          <p:nvPr>
-            <p:ph type="ftr" sz="quarter" idx="11"/>
-          </p:nvPr>
-        </p:nvSpPr>
-        <p:spPr/>
-        <p:txBody>
-          <a:bodyPr/>
-          <a:lstStyle/>
-          <a:p>
-            <a:r>
-              <a:rPr lang="pt-BR" dirty="0" smtClean="0"/>
-              <a:t>Veris Faculdades TCM/3ADS</a:t>
-            </a:r>
-            <a:endParaRPr lang="pt-BR" dirty="0"/>
-          </a:p>
-        </p:txBody>
-      </p:sp>
-      <p:pic>
-        <p:nvPicPr>
-          <p:cNvPr id="2" name="Imagem 1"/>
-          <p:cNvPicPr>
-            <a:picLocks noChangeAspect="1"/>
-          </p:cNvPicPr>
-          <p:nvPr/>
-        </p:nvPicPr>
-        <p:blipFill>
-          <a:blip r:embed="rId2" cstate="print">
-            <a:extLst>
-              <a:ext uri="{28A0092B-C50C-407E-A947-70E740481C1C}">
-                <a14:useLocalDpi xmlns:a14="http://schemas.microsoft.com/office/drawing/2010/main" xmlns="" val="0"/>
-              </a:ext>
-            </a:extLst>
-          </a:blip>
-          <a:stretch>
-            <a:fillRect/>
-          </a:stretch>
-        </p:blipFill>
-        <p:spPr>
-          <a:xfrm>
-            <a:off x="323528" y="1497494"/>
-            <a:ext cx="8580397" cy="4726843"/>
-          </a:xfrm>
-          <a:prstGeom prst="rect">
-            <a:avLst/>
-          </a:prstGeom>
-        </p:spPr>
-      </p:pic>
-    </p:spTree>
-    <p:extLst>
-      <p:ext uri="{BB962C8B-B14F-4D97-AF65-F5344CB8AC3E}">
-        <p14:creationId xmlns:p14="http://schemas.microsoft.com/office/powerpoint/2010/main" xmlns="" val="3605697371"/>
-      </p:ext>
-    </p:extLst>
-  </p:cSld>
-  <p:clrMapOvr>
-    <a:masterClrMapping/>
-  </p:clrMapOvr>
-  <p:transition spd="med">
-    <p:fade/>
-  </p:transition>
-  <p:timing>
-    <p:tnLst>
-      <p:par>
-        <p:cTn id="1" dur="indefinite" restart="never" nodeType="tmRoot"/>
-      </p:par>
-    </p:tnLst>
-  </p:timing>
-</p:sld>
-</file>
-
-<file path=ppt/slides/slide24.xml><?xml version="1.0" encoding="utf-8"?>
-<p:sld xmlns:a="http://schemas.openxmlformats.org/drawingml/2006/main" xmlns:r="http://schemas.openxmlformats.org/officeDocument/2006/relationships" xmlns:p="http://schemas.openxmlformats.org/presentationml/2006/main">
-  <p:cSld>
-    <p:spTree>
-      <p:nvGrpSpPr>
-        <p:cNvPr id="1" name=""/>
-        <p:cNvGrpSpPr/>
-        <p:nvPr/>
-      </p:nvGrpSpPr>
-      <p:grpSpPr>
-        <a:xfrm>
-          <a:off x="0" y="0"/>
-          <a:ext cx="0" cy="0"/>
-          <a:chOff x="0" y="0"/>
-          <a:chExt cx="0" cy="0"/>
-        </a:xfrm>
-      </p:grpSpPr>
-      <p:sp>
-        <p:nvSpPr>
-          <p:cNvPr id="19458" name="Rectangle 2"/>
-          <p:cNvSpPr>
-            <a:spLocks noGrp="1" noChangeArrowheads="1"/>
-          </p:cNvSpPr>
-          <p:nvPr>
-            <p:ph type="title"/>
-          </p:nvPr>
-        </p:nvSpPr>
-        <p:spPr/>
-        <p:txBody>
-          <a:bodyPr/>
-          <a:lstStyle/>
-          <a:p>
-            <a:r>
-              <a:rPr lang="pt-BR" dirty="0" smtClean="0"/>
-              <a:t>Diagrama de Comunicação</a:t>
-            </a:r>
-            <a:endParaRPr lang="pt-BR" dirty="0"/>
-          </a:p>
-        </p:txBody>
-      </p:sp>
-      <p:sp>
-        <p:nvSpPr>
-          <p:cNvPr id="6" name="Espaço Reservado para Data 5"/>
-          <p:cNvSpPr>
-            <a:spLocks noGrp="1"/>
-          </p:cNvSpPr>
-          <p:nvPr>
-            <p:ph type="dt" sz="half" idx="10"/>
-          </p:nvPr>
-        </p:nvSpPr>
-        <p:spPr/>
-        <p:txBody>
-          <a:bodyPr/>
-          <a:lstStyle/>
-          <a:p>
-            <a:r>
-              <a:rPr lang="pt-BR" dirty="0"/>
-              <a:t>09/06/2014</a:t>
-            </a:r>
-            <a:endParaRPr lang="pt-BR" dirty="0" smtClean="0"/>
-          </a:p>
-          <a:p>
-            <a:endParaRPr lang="pt-BR" dirty="0"/>
-          </a:p>
-        </p:txBody>
-      </p:sp>
-      <p:sp>
-        <p:nvSpPr>
-          <p:cNvPr id="7" name="Espaço Reservado para Número de Slide 6"/>
-          <p:cNvSpPr>
-            <a:spLocks noGrp="1"/>
-          </p:cNvSpPr>
-          <p:nvPr>
-            <p:ph type="sldNum" sz="quarter" idx="12"/>
-          </p:nvPr>
-        </p:nvSpPr>
-        <p:spPr/>
-        <p:txBody>
-          <a:bodyPr/>
-          <a:lstStyle/>
-          <a:p>
-            <a:fld id="{516476CB-12D4-456A-BCEE-8469A8C40045}" type="slidenum">
-              <a:rPr lang="pt-BR" smtClean="0"/>
-              <a:pPr/>
-              <a:t>24</a:t>
-            </a:fld>
-            <a:endParaRPr lang="pt-BR" dirty="0"/>
-          </a:p>
-        </p:txBody>
-      </p:sp>
-      <p:sp>
-        <p:nvSpPr>
-          <p:cNvPr id="8" name="Espaço Reservado para Rodapé 7"/>
-          <p:cNvSpPr>
-            <a:spLocks noGrp="1"/>
-          </p:cNvSpPr>
-          <p:nvPr>
-            <p:ph type="ftr" sz="quarter" idx="11"/>
-          </p:nvPr>
-        </p:nvSpPr>
-        <p:spPr/>
-        <p:txBody>
-          <a:bodyPr/>
-          <a:lstStyle/>
-          <a:p>
-            <a:r>
-              <a:rPr lang="pt-BR" dirty="0" smtClean="0"/>
-              <a:t>Veris Faculdades TCM/3ADS</a:t>
-            </a:r>
-            <a:endParaRPr lang="pt-BR" dirty="0"/>
-          </a:p>
-        </p:txBody>
-      </p:sp>
-      <p:pic>
-        <p:nvPicPr>
-          <p:cNvPr id="3" name="Imagem 2"/>
-          <p:cNvPicPr>
-            <a:picLocks noChangeAspect="1"/>
-          </p:cNvPicPr>
-          <p:nvPr/>
-        </p:nvPicPr>
-        <p:blipFill>
-          <a:blip r:embed="rId2" cstate="print">
-            <a:extLst>
-              <a:ext uri="{28A0092B-C50C-407E-A947-70E740481C1C}">
-                <a14:useLocalDpi xmlns:a14="http://schemas.microsoft.com/office/drawing/2010/main" xmlns="" val="0"/>
-              </a:ext>
-            </a:extLst>
-          </a:blip>
-          <a:stretch>
-            <a:fillRect/>
-          </a:stretch>
-        </p:blipFill>
-        <p:spPr>
-          <a:xfrm>
-            <a:off x="251520" y="2924944"/>
-            <a:ext cx="8808516" cy="2163720"/>
-          </a:xfrm>
-          <a:prstGeom prst="rect">
-            <a:avLst/>
-          </a:prstGeom>
-        </p:spPr>
-      </p:pic>
-    </p:spTree>
-    <p:extLst>
-      <p:ext uri="{BB962C8B-B14F-4D97-AF65-F5344CB8AC3E}">
-        <p14:creationId xmlns:p14="http://schemas.microsoft.com/office/powerpoint/2010/main" xmlns="" val="278049137"/>
-      </p:ext>
-    </p:extLst>
-  </p:cSld>
-  <p:clrMapOvr>
-    <a:masterClrMapping/>
-  </p:clrMapOvr>
-  <p:transition spd="med">
-    <p:fade/>
-  </p:transition>
-  <p:timing>
-    <p:tnLst>
-      <p:par>
-        <p:cTn id="1" dur="indefinite" restart="never" nodeType="tmRoot"/>
-      </p:par>
-    </p:tnLst>
-  </p:timing>
-</p:sld>
-</file>
-
-<file path=ppt/slides/slide25.xml><?xml version="1.0" encoding="utf-8"?>
-<p:sld xmlns:a="http://schemas.openxmlformats.org/drawingml/2006/main" xmlns:r="http://schemas.openxmlformats.org/officeDocument/2006/relationships" xmlns:p="http://schemas.openxmlformats.org/presentationml/2006/main">
-  <p:cSld>
-    <p:spTree>
-      <p:nvGrpSpPr>
-        <p:cNvPr id="1" name=""/>
-        <p:cNvGrpSpPr/>
-        <p:nvPr/>
-      </p:nvGrpSpPr>
-      <p:grpSpPr>
-        <a:xfrm>
-          <a:off x="0" y="0"/>
-          <a:ext cx="0" cy="0"/>
-          <a:chOff x="0" y="0"/>
-          <a:chExt cx="0" cy="0"/>
-        </a:xfrm>
-      </p:grpSpPr>
-      <p:sp>
-        <p:nvSpPr>
-          <p:cNvPr id="19458" name="Rectangle 2"/>
-          <p:cNvSpPr>
-            <a:spLocks noGrp="1" noChangeArrowheads="1"/>
-          </p:cNvSpPr>
-          <p:nvPr>
-            <p:ph type="title"/>
-          </p:nvPr>
-        </p:nvSpPr>
-        <p:spPr/>
-        <p:txBody>
-          <a:bodyPr/>
-          <a:lstStyle/>
-          <a:p>
-            <a:r>
-              <a:rPr lang="pt-BR" dirty="0" smtClean="0"/>
-              <a:t>Diagrama de Classe</a:t>
-            </a:r>
-            <a:endParaRPr lang="pt-BR" dirty="0"/>
-          </a:p>
-        </p:txBody>
-      </p:sp>
-      <p:sp>
-        <p:nvSpPr>
-          <p:cNvPr id="6" name="Espaço Reservado para Data 5"/>
-          <p:cNvSpPr>
-            <a:spLocks noGrp="1"/>
-          </p:cNvSpPr>
-          <p:nvPr>
-            <p:ph type="dt" sz="half" idx="10"/>
-          </p:nvPr>
-        </p:nvSpPr>
-        <p:spPr/>
-        <p:txBody>
-          <a:bodyPr/>
-          <a:lstStyle/>
-          <a:p>
-            <a:r>
-              <a:rPr lang="pt-BR" dirty="0"/>
-              <a:t>09/06/2014</a:t>
-            </a:r>
-            <a:endParaRPr lang="pt-BR" dirty="0" smtClean="0"/>
-          </a:p>
-          <a:p>
-            <a:endParaRPr lang="pt-BR" dirty="0"/>
-          </a:p>
-        </p:txBody>
-      </p:sp>
-      <p:sp>
-        <p:nvSpPr>
-          <p:cNvPr id="7" name="Espaço Reservado para Número de Slide 6"/>
-          <p:cNvSpPr>
-            <a:spLocks noGrp="1"/>
-          </p:cNvSpPr>
-          <p:nvPr>
-            <p:ph type="sldNum" sz="quarter" idx="12"/>
-          </p:nvPr>
-        </p:nvSpPr>
-        <p:spPr/>
-        <p:txBody>
-          <a:bodyPr/>
-          <a:lstStyle/>
-          <a:p>
-            <a:fld id="{516476CB-12D4-456A-BCEE-8469A8C40045}" type="slidenum">
-              <a:rPr lang="pt-BR" smtClean="0"/>
-              <a:pPr/>
-              <a:t>25</a:t>
-            </a:fld>
-            <a:endParaRPr lang="pt-BR" dirty="0"/>
-          </a:p>
-        </p:txBody>
-      </p:sp>
-      <p:sp>
-        <p:nvSpPr>
-          <p:cNvPr id="8" name="Espaço Reservado para Rodapé 7"/>
-          <p:cNvSpPr>
-            <a:spLocks noGrp="1"/>
-          </p:cNvSpPr>
-          <p:nvPr>
-            <p:ph type="ftr" sz="quarter" idx="11"/>
-          </p:nvPr>
-        </p:nvSpPr>
-        <p:spPr/>
-        <p:txBody>
-          <a:bodyPr/>
-          <a:lstStyle/>
-          <a:p>
-            <a:r>
-              <a:rPr lang="pt-BR" dirty="0" smtClean="0"/>
-              <a:t>Veris Faculdades TCM/3ADS</a:t>
-            </a:r>
-            <a:endParaRPr lang="pt-BR" dirty="0"/>
-          </a:p>
-        </p:txBody>
-      </p:sp>
-      <p:pic>
-        <p:nvPicPr>
-          <p:cNvPr id="9" name="Imagem 8"/>
-          <p:cNvPicPr>
-            <a:picLocks noChangeAspect="1"/>
-          </p:cNvPicPr>
-          <p:nvPr/>
-        </p:nvPicPr>
-        <p:blipFill>
-          <a:blip r:embed="rId2" cstate="print">
-            <a:extLst>
-              <a:ext uri="{28A0092B-C50C-407E-A947-70E740481C1C}">
-                <a14:useLocalDpi xmlns:a14="http://schemas.microsoft.com/office/drawing/2010/main" xmlns="" val="0"/>
-              </a:ext>
-            </a:extLst>
-          </a:blip>
-          <a:stretch>
-            <a:fillRect/>
-          </a:stretch>
-        </p:blipFill>
-        <p:spPr>
-          <a:xfrm>
-            <a:off x="640396" y="1750635"/>
-            <a:ext cx="8038728" cy="4500850"/>
-          </a:xfrm>
-          <a:prstGeom prst="rect">
-            <a:avLst/>
-          </a:prstGeom>
-        </p:spPr>
-      </p:pic>
-      <p:pic>
-        <p:nvPicPr>
-          <p:cNvPr id="10" name="Imagem 9"/>
-          <p:cNvPicPr>
-            <a:picLocks noChangeAspect="1"/>
-          </p:cNvPicPr>
-          <p:nvPr/>
-        </p:nvPicPr>
-        <p:blipFill>
-          <a:blip r:embed="rId3" cstate="print">
-            <a:extLst>
-              <a:ext uri="{28A0092B-C50C-407E-A947-70E740481C1C}">
-                <a14:useLocalDpi xmlns:a14="http://schemas.microsoft.com/office/drawing/2010/main" xmlns="" val="0"/>
-              </a:ext>
-            </a:extLst>
-          </a:blip>
-          <a:stretch>
-            <a:fillRect/>
-          </a:stretch>
-        </p:blipFill>
-        <p:spPr>
-          <a:xfrm>
-            <a:off x="611560" y="1453915"/>
-            <a:ext cx="3538736" cy="414696"/>
-          </a:xfrm>
-          <a:prstGeom prst="rect">
-            <a:avLst/>
-          </a:prstGeom>
-        </p:spPr>
-      </p:pic>
-    </p:spTree>
-    <p:extLst>
-      <p:ext uri="{BB962C8B-B14F-4D97-AF65-F5344CB8AC3E}">
-        <p14:creationId xmlns:p14="http://schemas.microsoft.com/office/powerpoint/2010/main" xmlns="" val="3479499341"/>
-      </p:ext>
-    </p:extLst>
-  </p:cSld>
-  <p:clrMapOvr>
-    <a:masterClrMapping/>
-  </p:clrMapOvr>
-  <p:transition spd="med">
-    <p:fade/>
-  </p:transition>
-  <p:timing>
-    <p:tnLst>
-      <p:par>
-        <p:cTn id="1" dur="indefinite" restart="never" nodeType="tmRoot"/>
-      </p:par>
-    </p:tnLst>
-  </p:timing>
-</p:sld>
-</file>
-
-<file path=ppt/slides/slide26.xml><?xml version="1.0" encoding="utf-8"?>
-<p:sld xmlns:a="http://schemas.openxmlformats.org/drawingml/2006/main" xmlns:r="http://schemas.openxmlformats.org/officeDocument/2006/relationships" xmlns:p="http://schemas.openxmlformats.org/presentationml/2006/main">
-  <p:cSld>
-    <p:spTree>
-      <p:nvGrpSpPr>
-        <p:cNvPr id="1" name=""/>
-        <p:cNvGrpSpPr/>
-        <p:nvPr/>
-      </p:nvGrpSpPr>
-      <p:grpSpPr>
-        <a:xfrm>
-          <a:off x="0" y="0"/>
-          <a:ext cx="0" cy="0"/>
-          <a:chOff x="0" y="0"/>
-          <a:chExt cx="0" cy="0"/>
-        </a:xfrm>
-      </p:grpSpPr>
-      <p:sp>
-        <p:nvSpPr>
-          <p:cNvPr id="19458" name="Rectangle 2"/>
-          <p:cNvSpPr>
-            <a:spLocks noGrp="1" noChangeArrowheads="1"/>
-          </p:cNvSpPr>
-          <p:nvPr>
-            <p:ph type="title"/>
-          </p:nvPr>
-        </p:nvSpPr>
-        <p:spPr/>
-        <p:txBody>
-          <a:bodyPr/>
-          <a:lstStyle/>
-          <a:p>
-            <a:r>
-              <a:rPr lang="pt-BR" dirty="0" smtClean="0"/>
-              <a:t>Diagrama de Comunicação</a:t>
-            </a:r>
-            <a:endParaRPr lang="pt-BR" dirty="0"/>
-          </a:p>
-        </p:txBody>
-      </p:sp>
-      <p:sp>
-        <p:nvSpPr>
-          <p:cNvPr id="6" name="Espaço Reservado para Data 5"/>
-          <p:cNvSpPr>
-            <a:spLocks noGrp="1"/>
-          </p:cNvSpPr>
-          <p:nvPr>
-            <p:ph type="dt" sz="half" idx="10"/>
-          </p:nvPr>
-        </p:nvSpPr>
-        <p:spPr/>
-        <p:txBody>
-          <a:bodyPr/>
-          <a:lstStyle/>
-          <a:p>
-            <a:r>
-              <a:rPr lang="pt-BR" dirty="0"/>
-              <a:t>09/06/2014</a:t>
-            </a:r>
-            <a:endParaRPr lang="pt-BR" dirty="0" smtClean="0"/>
-          </a:p>
-          <a:p>
-            <a:endParaRPr lang="pt-BR" dirty="0"/>
-          </a:p>
-        </p:txBody>
-      </p:sp>
-      <p:sp>
-        <p:nvSpPr>
-          <p:cNvPr id="7" name="Espaço Reservado para Número de Slide 6"/>
-          <p:cNvSpPr>
-            <a:spLocks noGrp="1"/>
-          </p:cNvSpPr>
-          <p:nvPr>
-            <p:ph type="sldNum" sz="quarter" idx="12"/>
-          </p:nvPr>
-        </p:nvSpPr>
-        <p:spPr/>
-        <p:txBody>
-          <a:bodyPr/>
-          <a:lstStyle/>
-          <a:p>
-            <a:fld id="{516476CB-12D4-456A-BCEE-8469A8C40045}" type="slidenum">
-              <a:rPr lang="pt-BR" smtClean="0"/>
-              <a:pPr/>
-              <a:t>26</a:t>
-            </a:fld>
-            <a:endParaRPr lang="pt-BR" dirty="0"/>
-          </a:p>
-        </p:txBody>
-      </p:sp>
-      <p:sp>
-        <p:nvSpPr>
-          <p:cNvPr id="8" name="Espaço Reservado para Rodapé 7"/>
-          <p:cNvSpPr>
-            <a:spLocks noGrp="1"/>
-          </p:cNvSpPr>
-          <p:nvPr>
-            <p:ph type="ftr" sz="quarter" idx="11"/>
-          </p:nvPr>
-        </p:nvSpPr>
-        <p:spPr/>
-        <p:txBody>
-          <a:bodyPr/>
-          <a:lstStyle/>
-          <a:p>
-            <a:r>
-              <a:rPr lang="pt-BR" dirty="0" smtClean="0"/>
-              <a:t>Veris Faculdades TCM/3ADS</a:t>
-            </a:r>
-            <a:endParaRPr lang="pt-BR" dirty="0"/>
-          </a:p>
-        </p:txBody>
-      </p:sp>
-      <p:pic>
-        <p:nvPicPr>
-          <p:cNvPr id="9" name="Imagem 8"/>
-          <p:cNvPicPr>
-            <a:picLocks noChangeAspect="1"/>
-          </p:cNvPicPr>
-          <p:nvPr/>
-        </p:nvPicPr>
-        <p:blipFill>
-          <a:blip r:embed="rId2" cstate="print">
-            <a:extLst>
-              <a:ext uri="{28A0092B-C50C-407E-A947-70E740481C1C}">
-                <a14:useLocalDpi xmlns:a14="http://schemas.microsoft.com/office/drawing/2010/main" xmlns="" val="0"/>
-              </a:ext>
-            </a:extLst>
-          </a:blip>
-          <a:stretch>
-            <a:fillRect/>
-          </a:stretch>
-        </p:blipFill>
-        <p:spPr>
-          <a:xfrm>
-            <a:off x="360040" y="1484784"/>
-            <a:ext cx="8604448" cy="4787822"/>
-          </a:xfrm>
-          <a:prstGeom prst="rect">
-            <a:avLst/>
-          </a:prstGeom>
-        </p:spPr>
-      </p:pic>
-    </p:spTree>
-    <p:extLst>
-      <p:ext uri="{BB962C8B-B14F-4D97-AF65-F5344CB8AC3E}">
-        <p14:creationId xmlns:p14="http://schemas.microsoft.com/office/powerpoint/2010/main" xmlns="" val="2927019537"/>
-      </p:ext>
-    </p:extLst>
-  </p:cSld>
-  <p:clrMapOvr>
-    <a:masterClrMapping/>
-  </p:clrMapOvr>
-  <p:transition spd="med">
-    <p:fade/>
-  </p:transition>
-  <p:timing>
-    <p:tnLst>
-      <p:par>
-        <p:cTn id="1" dur="indefinite" restart="never" nodeType="tmRoot"/>
-      </p:par>
-    </p:tnLst>
-  </p:timing>
-</p:sld>
-</file>
-
-<file path=ppt/slides/slide27.xml><?xml version="1.0" encoding="utf-8"?>
-<p:sld xmlns:a="http://schemas.openxmlformats.org/drawingml/2006/main" xmlns:r="http://schemas.openxmlformats.org/officeDocument/2006/relationships" xmlns:p="http://schemas.openxmlformats.org/presentationml/2006/main">
-  <p:cSld>
-    <p:spTree>
-      <p:nvGrpSpPr>
-        <p:cNvPr id="1" name=""/>
-        <p:cNvGrpSpPr/>
-        <p:nvPr/>
-      </p:nvGrpSpPr>
-      <p:grpSpPr>
-        <a:xfrm>
-          <a:off x="0" y="0"/>
-          <a:ext cx="0" cy="0"/>
-          <a:chOff x="0" y="0"/>
-          <a:chExt cx="0" cy="0"/>
-        </a:xfrm>
-      </p:grpSpPr>
-      <p:sp>
-        <p:nvSpPr>
-          <p:cNvPr id="19458" name="Rectangle 2"/>
-          <p:cNvSpPr>
-            <a:spLocks noGrp="1" noChangeArrowheads="1"/>
-          </p:cNvSpPr>
-          <p:nvPr>
-            <p:ph type="title"/>
-          </p:nvPr>
-        </p:nvSpPr>
-        <p:spPr/>
-        <p:txBody>
-          <a:bodyPr/>
-          <a:lstStyle/>
-          <a:p>
-            <a:r>
-              <a:rPr lang="pt-BR" dirty="0" smtClean="0"/>
-              <a:t>Diagrama de Comunicação</a:t>
-            </a:r>
-            <a:endParaRPr lang="pt-BR" dirty="0"/>
-          </a:p>
-        </p:txBody>
-      </p:sp>
-      <p:sp>
-        <p:nvSpPr>
-          <p:cNvPr id="6" name="Espaço Reservado para Data 5"/>
-          <p:cNvSpPr>
-            <a:spLocks noGrp="1"/>
-          </p:cNvSpPr>
-          <p:nvPr>
-            <p:ph type="dt" sz="half" idx="10"/>
-          </p:nvPr>
-        </p:nvSpPr>
-        <p:spPr/>
-        <p:txBody>
-          <a:bodyPr/>
-          <a:lstStyle/>
-          <a:p>
-            <a:r>
-              <a:rPr lang="pt-BR" dirty="0"/>
-              <a:t>09/06/2014</a:t>
-            </a:r>
-            <a:endParaRPr lang="pt-BR" dirty="0" smtClean="0"/>
-          </a:p>
-          <a:p>
-            <a:endParaRPr lang="pt-BR" dirty="0"/>
-          </a:p>
-        </p:txBody>
-      </p:sp>
-      <p:sp>
-        <p:nvSpPr>
-          <p:cNvPr id="7" name="Espaço Reservado para Número de Slide 6"/>
-          <p:cNvSpPr>
-            <a:spLocks noGrp="1"/>
-          </p:cNvSpPr>
-          <p:nvPr>
-            <p:ph type="sldNum" sz="quarter" idx="12"/>
-          </p:nvPr>
-        </p:nvSpPr>
-        <p:spPr/>
-        <p:txBody>
-          <a:bodyPr/>
-          <a:lstStyle/>
-          <a:p>
-            <a:fld id="{516476CB-12D4-456A-BCEE-8469A8C40045}" type="slidenum">
-              <a:rPr lang="pt-BR" smtClean="0"/>
-              <a:pPr/>
-              <a:t>27</a:t>
-            </a:fld>
-            <a:endParaRPr lang="pt-BR" dirty="0"/>
-          </a:p>
-        </p:txBody>
-      </p:sp>
-      <p:sp>
-        <p:nvSpPr>
-          <p:cNvPr id="8" name="Espaço Reservado para Rodapé 7"/>
-          <p:cNvSpPr>
-            <a:spLocks noGrp="1"/>
-          </p:cNvSpPr>
-          <p:nvPr>
-            <p:ph type="ftr" sz="quarter" idx="11"/>
-          </p:nvPr>
-        </p:nvSpPr>
-        <p:spPr/>
-        <p:txBody>
-          <a:bodyPr/>
-          <a:lstStyle/>
-          <a:p>
-            <a:r>
-              <a:rPr lang="pt-BR" dirty="0" smtClean="0"/>
-              <a:t>Veris Faculdades TCM/3ADS</a:t>
-            </a:r>
-            <a:endParaRPr lang="pt-BR" dirty="0"/>
-          </a:p>
-        </p:txBody>
-      </p:sp>
-      <p:pic>
-        <p:nvPicPr>
-          <p:cNvPr id="3" name="Imagem 2"/>
-          <p:cNvPicPr>
-            <a:picLocks noChangeAspect="1"/>
-          </p:cNvPicPr>
-          <p:nvPr/>
-        </p:nvPicPr>
-        <p:blipFill>
-          <a:blip r:embed="rId2" cstate="print">
-            <a:extLst>
-              <a:ext uri="{28A0092B-C50C-407E-A947-70E740481C1C}">
-                <a14:useLocalDpi xmlns:a14="http://schemas.microsoft.com/office/drawing/2010/main" xmlns="" val="0"/>
-              </a:ext>
-            </a:extLst>
-          </a:blip>
-          <a:stretch>
-            <a:fillRect/>
-          </a:stretch>
-        </p:blipFill>
-        <p:spPr>
-          <a:xfrm>
-            <a:off x="251520" y="1699192"/>
-            <a:ext cx="8863958" cy="4322096"/>
-          </a:xfrm>
-          <a:prstGeom prst="rect">
-            <a:avLst/>
-          </a:prstGeom>
-        </p:spPr>
-      </p:pic>
-    </p:spTree>
-    <p:extLst>
-      <p:ext uri="{BB962C8B-B14F-4D97-AF65-F5344CB8AC3E}">
-        <p14:creationId xmlns:p14="http://schemas.microsoft.com/office/powerpoint/2010/main" xmlns="" val="2764742115"/>
-      </p:ext>
-    </p:extLst>
-  </p:cSld>
-  <p:clrMapOvr>
-    <a:masterClrMapping/>
-  </p:clrMapOvr>
-  <p:transition spd="med">
-    <p:fade/>
-  </p:transition>
-  <p:timing>
-    <p:tnLst>
-      <p:par>
-        <p:cTn id="1" dur="indefinite" restart="never" nodeType="tmRoot"/>
-      </p:par>
-    </p:tnLst>
-  </p:timing>
-</p:sld>
-</file>
-
-<file path=ppt/slides/slide28.xml><?xml version="1.0" encoding="utf-8"?>
-<p:sld xmlns:a="http://schemas.openxmlformats.org/drawingml/2006/main" xmlns:r="http://schemas.openxmlformats.org/officeDocument/2006/relationships" xmlns:p="http://schemas.openxmlformats.org/presentationml/2006/main">
-  <p:cSld>
-    <p:spTree>
-      <p:nvGrpSpPr>
-        <p:cNvPr id="1" name=""/>
-        <p:cNvGrpSpPr/>
-        <p:nvPr/>
-      </p:nvGrpSpPr>
-      <p:grpSpPr>
-        <a:xfrm>
-          <a:off x="0" y="0"/>
-          <a:ext cx="0" cy="0"/>
-          <a:chOff x="0" y="0"/>
-          <a:chExt cx="0" cy="0"/>
-        </a:xfrm>
-      </p:grpSpPr>
-      <p:sp>
-        <p:nvSpPr>
-          <p:cNvPr id="19458" name="Rectangle 2"/>
-          <p:cNvSpPr>
-            <a:spLocks noGrp="1" noChangeArrowheads="1"/>
-          </p:cNvSpPr>
-          <p:nvPr>
-            <p:ph type="title"/>
-          </p:nvPr>
-        </p:nvSpPr>
-        <p:spPr/>
-        <p:txBody>
-          <a:bodyPr/>
-          <a:lstStyle/>
-          <a:p>
-            <a:r>
-              <a:rPr lang="pt-BR" dirty="0" smtClean="0"/>
-              <a:t>Diagrama de Comunicação</a:t>
-            </a:r>
-            <a:endParaRPr lang="pt-BR" dirty="0"/>
-          </a:p>
-        </p:txBody>
-      </p:sp>
-      <p:sp>
-        <p:nvSpPr>
-          <p:cNvPr id="6" name="Espaço Reservado para Data 5"/>
-          <p:cNvSpPr>
-            <a:spLocks noGrp="1"/>
-          </p:cNvSpPr>
-          <p:nvPr>
-            <p:ph type="dt" sz="half" idx="10"/>
-          </p:nvPr>
-        </p:nvSpPr>
-        <p:spPr/>
-        <p:txBody>
-          <a:bodyPr/>
-          <a:lstStyle/>
-          <a:p>
-            <a:r>
-              <a:rPr lang="pt-BR" dirty="0"/>
-              <a:t>09/06/2014</a:t>
-            </a:r>
-            <a:endParaRPr lang="pt-BR" dirty="0" smtClean="0"/>
-          </a:p>
-          <a:p>
-            <a:endParaRPr lang="pt-BR" dirty="0"/>
-          </a:p>
-        </p:txBody>
-      </p:sp>
-      <p:sp>
-        <p:nvSpPr>
-          <p:cNvPr id="7" name="Espaço Reservado para Número de Slide 6"/>
-          <p:cNvSpPr>
-            <a:spLocks noGrp="1"/>
-          </p:cNvSpPr>
-          <p:nvPr>
-            <p:ph type="sldNum" sz="quarter" idx="12"/>
-          </p:nvPr>
-        </p:nvSpPr>
-        <p:spPr/>
-        <p:txBody>
-          <a:bodyPr/>
-          <a:lstStyle/>
-          <a:p>
-            <a:fld id="{516476CB-12D4-456A-BCEE-8469A8C40045}" type="slidenum">
-              <a:rPr lang="pt-BR" smtClean="0"/>
-              <a:pPr/>
-              <a:t>28</a:t>
-            </a:fld>
-            <a:endParaRPr lang="pt-BR" dirty="0"/>
-          </a:p>
-        </p:txBody>
-      </p:sp>
-      <p:sp>
-        <p:nvSpPr>
-          <p:cNvPr id="8" name="Espaço Reservado para Rodapé 7"/>
-          <p:cNvSpPr>
-            <a:spLocks noGrp="1"/>
-          </p:cNvSpPr>
-          <p:nvPr>
-            <p:ph type="ftr" sz="quarter" idx="11"/>
-          </p:nvPr>
-        </p:nvSpPr>
-        <p:spPr/>
-        <p:txBody>
-          <a:bodyPr/>
-          <a:lstStyle/>
-          <a:p>
-            <a:r>
-              <a:rPr lang="pt-BR" dirty="0" smtClean="0"/>
-              <a:t>Veris Faculdades TCM/3ADS</a:t>
-            </a:r>
-            <a:endParaRPr lang="pt-BR" dirty="0"/>
-          </a:p>
-        </p:txBody>
-      </p:sp>
-      <p:pic>
-        <p:nvPicPr>
-          <p:cNvPr id="2" name="Imagem 1"/>
-          <p:cNvPicPr>
-            <a:picLocks noChangeAspect="1"/>
-          </p:cNvPicPr>
-          <p:nvPr/>
-        </p:nvPicPr>
-        <p:blipFill>
-          <a:blip r:embed="rId2" cstate="print">
-            <a:extLst>
-              <a:ext uri="{28A0092B-C50C-407E-A947-70E740481C1C}">
-                <a14:useLocalDpi xmlns:a14="http://schemas.microsoft.com/office/drawing/2010/main" xmlns="" val="0"/>
-              </a:ext>
-            </a:extLst>
-          </a:blip>
-          <a:stretch>
-            <a:fillRect/>
-          </a:stretch>
-        </p:blipFill>
-        <p:spPr>
-          <a:xfrm>
-            <a:off x="251520" y="2414456"/>
-            <a:ext cx="8855968" cy="2894943"/>
-          </a:xfrm>
-          <a:prstGeom prst="rect">
-            <a:avLst/>
-          </a:prstGeom>
-        </p:spPr>
-      </p:pic>
-    </p:spTree>
-    <p:extLst>
-      <p:ext uri="{BB962C8B-B14F-4D97-AF65-F5344CB8AC3E}">
-        <p14:creationId xmlns:p14="http://schemas.microsoft.com/office/powerpoint/2010/main" xmlns="" val="2749198392"/>
-      </p:ext>
-    </p:extLst>
-  </p:cSld>
-  <p:clrMapOvr>
-    <a:masterClrMapping/>
-  </p:clrMapOvr>
-  <p:transition spd="med">
-    <p:fade/>
-  </p:transition>
-  <p:timing>
-    <p:tnLst>
-      <p:par>
-        <p:cTn id="1" dur="indefinite" restart="never" nodeType="tmRoot"/>
-      </p:par>
-    </p:tnLst>
-  </p:timing>
-</p:sld>
-</file>
-
-<file path=ppt/slides/slide29.xml><?xml version="1.0" encoding="utf-8"?>
-<p:sld xmlns:a="http://schemas.openxmlformats.org/drawingml/2006/main" xmlns:r="http://schemas.openxmlformats.org/officeDocument/2006/relationships" xmlns:p="http://schemas.openxmlformats.org/presentationml/2006/main">
-  <p:cSld>
-    <p:spTree>
-      <p:nvGrpSpPr>
-        <p:cNvPr id="1" name=""/>
-        <p:cNvGrpSpPr/>
-        <p:nvPr/>
-      </p:nvGrpSpPr>
-      <p:grpSpPr>
-        <a:xfrm>
-          <a:off x="0" y="0"/>
-          <a:ext cx="0" cy="0"/>
-          <a:chOff x="0" y="0"/>
-          <a:chExt cx="0" cy="0"/>
-        </a:xfrm>
-      </p:grpSpPr>
-      <p:sp>
-        <p:nvSpPr>
-          <p:cNvPr id="19458" name="Rectangle 2"/>
-          <p:cNvSpPr>
-            <a:spLocks noGrp="1" noChangeArrowheads="1"/>
-          </p:cNvSpPr>
-          <p:nvPr>
-            <p:ph type="title"/>
-          </p:nvPr>
-        </p:nvSpPr>
-        <p:spPr/>
-        <p:txBody>
-          <a:bodyPr/>
-          <a:lstStyle/>
-          <a:p>
-            <a:r>
-              <a:rPr lang="pt-BR" dirty="0" smtClean="0"/>
-              <a:t>Diagrama de Classe</a:t>
-            </a:r>
-            <a:endParaRPr lang="pt-BR" dirty="0"/>
-          </a:p>
-        </p:txBody>
-      </p:sp>
-      <p:sp>
-        <p:nvSpPr>
-          <p:cNvPr id="6" name="Espaço Reservado para Data 5"/>
-          <p:cNvSpPr>
-            <a:spLocks noGrp="1"/>
-          </p:cNvSpPr>
-          <p:nvPr>
-            <p:ph type="dt" sz="half" idx="10"/>
-          </p:nvPr>
-        </p:nvSpPr>
-        <p:spPr/>
-        <p:txBody>
-          <a:bodyPr/>
-          <a:lstStyle/>
-          <a:p>
-            <a:r>
-              <a:rPr lang="pt-BR" dirty="0"/>
-              <a:t>09/06/2014</a:t>
-            </a:r>
-            <a:endParaRPr lang="pt-BR" dirty="0" smtClean="0"/>
-          </a:p>
-          <a:p>
-            <a:endParaRPr lang="pt-BR" dirty="0"/>
-          </a:p>
-        </p:txBody>
-      </p:sp>
-      <p:sp>
-        <p:nvSpPr>
-          <p:cNvPr id="7" name="Espaço Reservado para Número de Slide 6"/>
-          <p:cNvSpPr>
-            <a:spLocks noGrp="1"/>
-          </p:cNvSpPr>
-          <p:nvPr>
-            <p:ph type="sldNum" sz="quarter" idx="12"/>
-          </p:nvPr>
-        </p:nvSpPr>
-        <p:spPr/>
-        <p:txBody>
-          <a:bodyPr/>
-          <a:lstStyle/>
-          <a:p>
-            <a:fld id="{516476CB-12D4-456A-BCEE-8469A8C40045}" type="slidenum">
-              <a:rPr lang="pt-BR" smtClean="0"/>
-              <a:pPr/>
-              <a:t>29</a:t>
-            </a:fld>
-            <a:endParaRPr lang="pt-BR" dirty="0"/>
-          </a:p>
-        </p:txBody>
-      </p:sp>
-      <p:sp>
-        <p:nvSpPr>
-          <p:cNvPr id="8" name="Espaço Reservado para Rodapé 7"/>
-          <p:cNvSpPr>
-            <a:spLocks noGrp="1"/>
-          </p:cNvSpPr>
-          <p:nvPr>
-            <p:ph type="ftr" sz="quarter" idx="11"/>
-          </p:nvPr>
-        </p:nvSpPr>
-        <p:spPr/>
-        <p:txBody>
-          <a:bodyPr/>
-          <a:lstStyle/>
-          <a:p>
-            <a:r>
-              <a:rPr lang="pt-BR" dirty="0" smtClean="0"/>
-              <a:t>Veris Faculdades TCM/3ADS</a:t>
-            </a:r>
-            <a:endParaRPr lang="pt-BR" dirty="0"/>
-          </a:p>
-        </p:txBody>
-      </p:sp>
-      <p:pic>
-        <p:nvPicPr>
-          <p:cNvPr id="4" name="Imagem 3"/>
-          <p:cNvPicPr>
-            <a:picLocks noChangeAspect="1"/>
-          </p:cNvPicPr>
-          <p:nvPr/>
-        </p:nvPicPr>
-        <p:blipFill>
-          <a:blip r:embed="rId2" cstate="print">
-            <a:extLst>
-              <a:ext uri="{28A0092B-C50C-407E-A947-70E740481C1C}">
-                <a14:useLocalDpi xmlns:a14="http://schemas.microsoft.com/office/drawing/2010/main" xmlns="" val="0"/>
-              </a:ext>
-            </a:extLst>
-          </a:blip>
-          <a:stretch>
-            <a:fillRect/>
-          </a:stretch>
-        </p:blipFill>
-        <p:spPr>
-          <a:xfrm>
-            <a:off x="1811985" y="1557407"/>
-            <a:ext cx="5520030" cy="4751913"/>
-          </a:xfrm>
-          <a:prstGeom prst="rect">
-            <a:avLst/>
-          </a:prstGeom>
-        </p:spPr>
-      </p:pic>
-    </p:spTree>
-    <p:extLst>
-      <p:ext uri="{BB962C8B-B14F-4D97-AF65-F5344CB8AC3E}">
-        <p14:creationId xmlns:p14="http://schemas.microsoft.com/office/powerpoint/2010/main" xmlns="" val="3861423228"/>
-      </p:ext>
-    </p:extLst>
   </p:cSld>
   <p:clrMapOvr>
     <a:masterClrMapping/>
@@ -8844,8 +6992,8 @@
           <a:lstStyle/>
           <a:p>
             <a:r>
-              <a:rPr lang="pt-BR" dirty="0"/>
-              <a:t>09/06/2014</a:t>
+              <a:rPr lang="pt-BR" dirty="0" smtClean="0"/>
+              <a:t>10/06/2014</a:t>
             </a:r>
             <a:endParaRPr lang="pt-BR" dirty="0" smtClean="0"/>
           </a:p>
@@ -8913,7 +7061,7 @@
           <a:blip r:embed="rId2" cstate="print">
             <a:extLst>
               <a:ext uri="{28A0092B-C50C-407E-A947-70E740481C1C}">
-                <a14:useLocalDpi xmlns:a14="http://schemas.microsoft.com/office/drawing/2010/main" xmlns="" val="0"/>
+                <a14:useLocalDpi xmlns:a14="http://schemas.microsoft.com/office/drawing/2010/main" val="0"/>
               </a:ext>
             </a:extLst>
           </a:blip>
@@ -8934,660 +7082,7 @@
     </p:spTree>
     <p:extLst>
       <p:ext uri="{BB962C8B-B14F-4D97-AF65-F5344CB8AC3E}">
-        <p14:creationId xmlns:p14="http://schemas.microsoft.com/office/powerpoint/2010/main" xmlns="" val="1503807568"/>
-      </p:ext>
-    </p:extLst>
-  </p:cSld>
-  <p:clrMapOvr>
-    <a:masterClrMapping/>
-  </p:clrMapOvr>
-  <p:transition spd="med">
-    <p:fade/>
-  </p:transition>
-  <p:timing>
-    <p:tnLst>
-      <p:par>
-        <p:cTn id="1" dur="indefinite" restart="never" nodeType="tmRoot"/>
-      </p:par>
-    </p:tnLst>
-  </p:timing>
-</p:sld>
-</file>
-
-<file path=ppt/slides/slide30.xml><?xml version="1.0" encoding="utf-8"?>
-<p:sld xmlns:a="http://schemas.openxmlformats.org/drawingml/2006/main" xmlns:r="http://schemas.openxmlformats.org/officeDocument/2006/relationships" xmlns:p="http://schemas.openxmlformats.org/presentationml/2006/main">
-  <p:cSld>
-    <p:spTree>
-      <p:nvGrpSpPr>
-        <p:cNvPr id="1" name=""/>
-        <p:cNvGrpSpPr/>
-        <p:nvPr/>
-      </p:nvGrpSpPr>
-      <p:grpSpPr>
-        <a:xfrm>
-          <a:off x="0" y="0"/>
-          <a:ext cx="0" cy="0"/>
-          <a:chOff x="0" y="0"/>
-          <a:chExt cx="0" cy="0"/>
-        </a:xfrm>
-      </p:grpSpPr>
-      <p:sp>
-        <p:nvSpPr>
-          <p:cNvPr id="19458" name="Rectangle 2"/>
-          <p:cNvSpPr>
-            <a:spLocks noGrp="1" noChangeArrowheads="1"/>
-          </p:cNvSpPr>
-          <p:nvPr>
-            <p:ph type="title"/>
-          </p:nvPr>
-        </p:nvSpPr>
-        <p:spPr/>
-        <p:txBody>
-          <a:bodyPr/>
-          <a:lstStyle/>
-          <a:p>
-            <a:r>
-              <a:rPr lang="pt-BR" dirty="0" smtClean="0"/>
-              <a:t>Diagrama de Classe</a:t>
-            </a:r>
-            <a:endParaRPr lang="pt-BR" dirty="0"/>
-          </a:p>
-        </p:txBody>
-      </p:sp>
-      <p:sp>
-        <p:nvSpPr>
-          <p:cNvPr id="6" name="Espaço Reservado para Data 5"/>
-          <p:cNvSpPr>
-            <a:spLocks noGrp="1"/>
-          </p:cNvSpPr>
-          <p:nvPr>
-            <p:ph type="dt" sz="half" idx="10"/>
-          </p:nvPr>
-        </p:nvSpPr>
-        <p:spPr/>
-        <p:txBody>
-          <a:bodyPr/>
-          <a:lstStyle/>
-          <a:p>
-            <a:r>
-              <a:rPr lang="pt-BR" dirty="0"/>
-              <a:t>09/06/2014</a:t>
-            </a:r>
-            <a:endParaRPr lang="pt-BR" dirty="0" smtClean="0"/>
-          </a:p>
-          <a:p>
-            <a:endParaRPr lang="pt-BR" dirty="0"/>
-          </a:p>
-        </p:txBody>
-      </p:sp>
-      <p:sp>
-        <p:nvSpPr>
-          <p:cNvPr id="7" name="Espaço Reservado para Número de Slide 6"/>
-          <p:cNvSpPr>
-            <a:spLocks noGrp="1"/>
-          </p:cNvSpPr>
-          <p:nvPr>
-            <p:ph type="sldNum" sz="quarter" idx="12"/>
-          </p:nvPr>
-        </p:nvSpPr>
-        <p:spPr/>
-        <p:txBody>
-          <a:bodyPr/>
-          <a:lstStyle/>
-          <a:p>
-            <a:fld id="{516476CB-12D4-456A-BCEE-8469A8C40045}" type="slidenum">
-              <a:rPr lang="pt-BR" smtClean="0"/>
-              <a:pPr/>
-              <a:t>30</a:t>
-            </a:fld>
-            <a:endParaRPr lang="pt-BR" dirty="0"/>
-          </a:p>
-        </p:txBody>
-      </p:sp>
-      <p:sp>
-        <p:nvSpPr>
-          <p:cNvPr id="8" name="Espaço Reservado para Rodapé 7"/>
-          <p:cNvSpPr>
-            <a:spLocks noGrp="1"/>
-          </p:cNvSpPr>
-          <p:nvPr>
-            <p:ph type="ftr" sz="quarter" idx="11"/>
-          </p:nvPr>
-        </p:nvSpPr>
-        <p:spPr/>
-        <p:txBody>
-          <a:bodyPr/>
-          <a:lstStyle/>
-          <a:p>
-            <a:r>
-              <a:rPr lang="pt-BR" dirty="0" smtClean="0"/>
-              <a:t>Veris Faculdades TCM/3ADS</a:t>
-            </a:r>
-            <a:endParaRPr lang="pt-BR" dirty="0"/>
-          </a:p>
-        </p:txBody>
-      </p:sp>
-      <p:pic>
-        <p:nvPicPr>
-          <p:cNvPr id="2" name="Imagem 1"/>
-          <p:cNvPicPr>
-            <a:picLocks noChangeAspect="1"/>
-          </p:cNvPicPr>
-          <p:nvPr/>
-        </p:nvPicPr>
-        <p:blipFill>
-          <a:blip r:embed="rId2" cstate="print">
-            <a:extLst>
-              <a:ext uri="{28A0092B-C50C-407E-A947-70E740481C1C}">
-                <a14:useLocalDpi xmlns:a14="http://schemas.microsoft.com/office/drawing/2010/main" xmlns="" val="0"/>
-              </a:ext>
-            </a:extLst>
-          </a:blip>
-          <a:stretch>
-            <a:fillRect/>
-          </a:stretch>
-        </p:blipFill>
-        <p:spPr>
-          <a:xfrm>
-            <a:off x="3059832" y="1490727"/>
-            <a:ext cx="3193848" cy="4818593"/>
-          </a:xfrm>
-          <a:prstGeom prst="rect">
-            <a:avLst/>
-          </a:prstGeom>
-        </p:spPr>
-      </p:pic>
-    </p:spTree>
-    <p:extLst>
-      <p:ext uri="{BB962C8B-B14F-4D97-AF65-F5344CB8AC3E}">
-        <p14:creationId xmlns:p14="http://schemas.microsoft.com/office/powerpoint/2010/main" xmlns="" val="3864861450"/>
-      </p:ext>
-    </p:extLst>
-  </p:cSld>
-  <p:clrMapOvr>
-    <a:masterClrMapping/>
-  </p:clrMapOvr>
-  <p:transition spd="med">
-    <p:fade/>
-  </p:transition>
-  <p:timing>
-    <p:tnLst>
-      <p:par>
-        <p:cTn id="1" dur="indefinite" restart="never" nodeType="tmRoot"/>
-      </p:par>
-    </p:tnLst>
-  </p:timing>
-</p:sld>
-</file>
-
-<file path=ppt/slides/slide31.xml><?xml version="1.0" encoding="utf-8"?>
-<p:sld xmlns:a="http://schemas.openxmlformats.org/drawingml/2006/main" xmlns:r="http://schemas.openxmlformats.org/officeDocument/2006/relationships" xmlns:p="http://schemas.openxmlformats.org/presentationml/2006/main">
-  <p:cSld>
-    <p:spTree>
-      <p:nvGrpSpPr>
-        <p:cNvPr id="1" name=""/>
-        <p:cNvGrpSpPr/>
-        <p:nvPr/>
-      </p:nvGrpSpPr>
-      <p:grpSpPr>
-        <a:xfrm>
-          <a:off x="0" y="0"/>
-          <a:ext cx="0" cy="0"/>
-          <a:chOff x="0" y="0"/>
-          <a:chExt cx="0" cy="0"/>
-        </a:xfrm>
-      </p:grpSpPr>
-      <p:sp>
-        <p:nvSpPr>
-          <p:cNvPr id="19458" name="Rectangle 2"/>
-          <p:cNvSpPr>
-            <a:spLocks noGrp="1" noChangeArrowheads="1"/>
-          </p:cNvSpPr>
-          <p:nvPr>
-            <p:ph type="title"/>
-          </p:nvPr>
-        </p:nvSpPr>
-        <p:spPr/>
-        <p:txBody>
-          <a:bodyPr/>
-          <a:lstStyle/>
-          <a:p>
-            <a:r>
-              <a:rPr lang="pt-BR" dirty="0" smtClean="0"/>
-              <a:t>Diagrama de Classe</a:t>
-            </a:r>
-            <a:endParaRPr lang="pt-BR" dirty="0"/>
-          </a:p>
-        </p:txBody>
-      </p:sp>
-      <p:sp>
-        <p:nvSpPr>
-          <p:cNvPr id="6" name="Espaço Reservado para Data 5"/>
-          <p:cNvSpPr>
-            <a:spLocks noGrp="1"/>
-          </p:cNvSpPr>
-          <p:nvPr>
-            <p:ph type="dt" sz="half" idx="10"/>
-          </p:nvPr>
-        </p:nvSpPr>
-        <p:spPr/>
-        <p:txBody>
-          <a:bodyPr/>
-          <a:lstStyle/>
-          <a:p>
-            <a:r>
-              <a:rPr lang="pt-BR" dirty="0"/>
-              <a:t>09/06/2014</a:t>
-            </a:r>
-            <a:endParaRPr lang="pt-BR" dirty="0" smtClean="0"/>
-          </a:p>
-          <a:p>
-            <a:endParaRPr lang="pt-BR" dirty="0"/>
-          </a:p>
-        </p:txBody>
-      </p:sp>
-      <p:sp>
-        <p:nvSpPr>
-          <p:cNvPr id="7" name="Espaço Reservado para Número de Slide 6"/>
-          <p:cNvSpPr>
-            <a:spLocks noGrp="1"/>
-          </p:cNvSpPr>
-          <p:nvPr>
-            <p:ph type="sldNum" sz="quarter" idx="12"/>
-          </p:nvPr>
-        </p:nvSpPr>
-        <p:spPr/>
-        <p:txBody>
-          <a:bodyPr/>
-          <a:lstStyle/>
-          <a:p>
-            <a:fld id="{516476CB-12D4-456A-BCEE-8469A8C40045}" type="slidenum">
-              <a:rPr lang="pt-BR" smtClean="0"/>
-              <a:pPr/>
-              <a:t>31</a:t>
-            </a:fld>
-            <a:endParaRPr lang="pt-BR" dirty="0"/>
-          </a:p>
-        </p:txBody>
-      </p:sp>
-      <p:sp>
-        <p:nvSpPr>
-          <p:cNvPr id="8" name="Espaço Reservado para Rodapé 7"/>
-          <p:cNvSpPr>
-            <a:spLocks noGrp="1"/>
-          </p:cNvSpPr>
-          <p:nvPr>
-            <p:ph type="ftr" sz="quarter" idx="11"/>
-          </p:nvPr>
-        </p:nvSpPr>
-        <p:spPr/>
-        <p:txBody>
-          <a:bodyPr/>
-          <a:lstStyle/>
-          <a:p>
-            <a:r>
-              <a:rPr lang="pt-BR" dirty="0" smtClean="0"/>
-              <a:t>Veris Faculdades TCM/3ADS</a:t>
-            </a:r>
-            <a:endParaRPr lang="pt-BR" dirty="0"/>
-          </a:p>
-        </p:txBody>
-      </p:sp>
-      <p:pic>
-        <p:nvPicPr>
-          <p:cNvPr id="11" name="Imagem 10"/>
-          <p:cNvPicPr>
-            <a:picLocks noChangeAspect="1"/>
-          </p:cNvPicPr>
-          <p:nvPr/>
-        </p:nvPicPr>
-        <p:blipFill>
-          <a:blip r:embed="rId2" cstate="print">
-            <a:extLst>
-              <a:ext uri="{28A0092B-C50C-407E-A947-70E740481C1C}">
-                <a14:useLocalDpi xmlns:a14="http://schemas.microsoft.com/office/drawing/2010/main" xmlns="" val="0"/>
-              </a:ext>
-            </a:extLst>
-          </a:blip>
-          <a:stretch>
-            <a:fillRect/>
-          </a:stretch>
-        </p:blipFill>
-        <p:spPr>
-          <a:xfrm>
-            <a:off x="395536" y="1488045"/>
-            <a:ext cx="8617802" cy="4749267"/>
-          </a:xfrm>
-          <a:prstGeom prst="rect">
-            <a:avLst/>
-          </a:prstGeom>
-        </p:spPr>
-      </p:pic>
-    </p:spTree>
-    <p:extLst>
-      <p:ext uri="{BB962C8B-B14F-4D97-AF65-F5344CB8AC3E}">
-        <p14:creationId xmlns:p14="http://schemas.microsoft.com/office/powerpoint/2010/main" xmlns="" val="252870303"/>
-      </p:ext>
-    </p:extLst>
-  </p:cSld>
-  <p:clrMapOvr>
-    <a:masterClrMapping/>
-  </p:clrMapOvr>
-  <p:transition spd="med">
-    <p:fade/>
-  </p:transition>
-  <p:timing>
-    <p:tnLst>
-      <p:par>
-        <p:cTn id="1" dur="indefinite" restart="never" nodeType="tmRoot"/>
-      </p:par>
-    </p:tnLst>
-  </p:timing>
-</p:sld>
-</file>
-
-<file path=ppt/slides/slide32.xml><?xml version="1.0" encoding="utf-8"?>
-<p:sld xmlns:a="http://schemas.openxmlformats.org/drawingml/2006/main" xmlns:r="http://schemas.openxmlformats.org/officeDocument/2006/relationships" xmlns:p="http://schemas.openxmlformats.org/presentationml/2006/main">
-  <p:cSld>
-    <p:spTree>
-      <p:nvGrpSpPr>
-        <p:cNvPr id="1" name=""/>
-        <p:cNvGrpSpPr/>
-        <p:nvPr/>
-      </p:nvGrpSpPr>
-      <p:grpSpPr>
-        <a:xfrm>
-          <a:off x="0" y="0"/>
-          <a:ext cx="0" cy="0"/>
-          <a:chOff x="0" y="0"/>
-          <a:chExt cx="0" cy="0"/>
-        </a:xfrm>
-      </p:grpSpPr>
-      <p:sp>
-        <p:nvSpPr>
-          <p:cNvPr id="19458" name="Rectangle 2"/>
-          <p:cNvSpPr>
-            <a:spLocks noGrp="1" noChangeArrowheads="1"/>
-          </p:cNvSpPr>
-          <p:nvPr>
-            <p:ph type="title"/>
-          </p:nvPr>
-        </p:nvSpPr>
-        <p:spPr/>
-        <p:txBody>
-          <a:bodyPr/>
-          <a:lstStyle/>
-          <a:p>
-            <a:r>
-              <a:rPr lang="pt-BR" dirty="0" smtClean="0"/>
-              <a:t>Conclusão</a:t>
-            </a:r>
-            <a:endParaRPr lang="pt-BR" dirty="0"/>
-          </a:p>
-        </p:txBody>
-      </p:sp>
-      <p:sp>
-        <p:nvSpPr>
-          <p:cNvPr id="19459" name="Rectangle 3"/>
-          <p:cNvSpPr>
-            <a:spLocks noGrp="1" noChangeArrowheads="1"/>
-          </p:cNvSpPr>
-          <p:nvPr>
-            <p:ph type="body" idx="1"/>
-          </p:nvPr>
-        </p:nvSpPr>
-        <p:spPr/>
-        <p:txBody>
-          <a:bodyPr/>
-          <a:lstStyle/>
-          <a:p>
-            <a:r>
-              <a:rPr lang="pt-BR" dirty="0" smtClean="0"/>
-              <a:t>O ponto forte do sistema é a possibilidade de controle e gestão que ele oferece para a clínica, além de facilidade para o paciente que for realizar um exame.</a:t>
-            </a:r>
-          </a:p>
-          <a:p>
-            <a:r>
-              <a:rPr lang="pt-BR" dirty="0" smtClean="0"/>
-              <a:t>O </a:t>
-            </a:r>
-            <a:r>
-              <a:rPr lang="pt-BR" dirty="0" smtClean="0"/>
-              <a:t>ponto fraco </a:t>
-            </a:r>
-            <a:r>
-              <a:rPr lang="pt-BR" dirty="0" smtClean="0"/>
-              <a:t>do sistema é a quantidade pequena de funcionalidades dele.</a:t>
-            </a:r>
-          </a:p>
-        </p:txBody>
-      </p:sp>
-      <p:sp>
-        <p:nvSpPr>
-          <p:cNvPr id="6" name="Espaço Reservado para Data 5"/>
-          <p:cNvSpPr>
-            <a:spLocks noGrp="1"/>
-          </p:cNvSpPr>
-          <p:nvPr>
-            <p:ph type="dt" sz="half" idx="10"/>
-          </p:nvPr>
-        </p:nvSpPr>
-        <p:spPr/>
-        <p:txBody>
-          <a:bodyPr/>
-          <a:lstStyle/>
-          <a:p>
-            <a:r>
-              <a:rPr lang="pt-BR" dirty="0"/>
-              <a:t>09/06/2014</a:t>
-            </a:r>
-          </a:p>
-        </p:txBody>
-      </p:sp>
-      <p:sp>
-        <p:nvSpPr>
-          <p:cNvPr id="7" name="Espaço Reservado para Número de Slide 6"/>
-          <p:cNvSpPr>
-            <a:spLocks noGrp="1"/>
-          </p:cNvSpPr>
-          <p:nvPr>
-            <p:ph type="sldNum" sz="quarter" idx="12"/>
-          </p:nvPr>
-        </p:nvSpPr>
-        <p:spPr/>
-        <p:txBody>
-          <a:bodyPr/>
-          <a:lstStyle/>
-          <a:p>
-            <a:fld id="{516476CB-12D4-456A-BCEE-8469A8C40045}" type="slidenum">
-              <a:rPr lang="pt-BR" smtClean="0"/>
-              <a:pPr/>
-              <a:t>32</a:t>
-            </a:fld>
-            <a:endParaRPr lang="pt-BR" dirty="0"/>
-          </a:p>
-        </p:txBody>
-      </p:sp>
-      <p:sp>
-        <p:nvSpPr>
-          <p:cNvPr id="8" name="Espaço Reservado para Rodapé 7"/>
-          <p:cNvSpPr>
-            <a:spLocks noGrp="1"/>
-          </p:cNvSpPr>
-          <p:nvPr>
-            <p:ph type="ftr" sz="quarter" idx="11"/>
-          </p:nvPr>
-        </p:nvSpPr>
-        <p:spPr/>
-        <p:txBody>
-          <a:bodyPr/>
-          <a:lstStyle/>
-          <a:p>
-            <a:r>
-              <a:rPr lang="pt-BR" dirty="0" smtClean="0"/>
-              <a:t>Veris Faculdades TCM/3ADS</a:t>
-            </a:r>
-            <a:endParaRPr lang="pt-BR" dirty="0"/>
-          </a:p>
-        </p:txBody>
-      </p:sp>
-    </p:spTree>
-  </p:cSld>
-  <p:clrMapOvr>
-    <a:masterClrMapping/>
-  </p:clrMapOvr>
-  <p:transition spd="med">
-    <p:fade/>
-  </p:transition>
-  <p:timing>
-    <p:tnLst>
-      <p:par>
-        <p:cTn id="1" dur="indefinite" restart="never" nodeType="tmRoot"/>
-      </p:par>
-    </p:tnLst>
-  </p:timing>
-</p:sld>
-</file>
-
-<file path=ppt/slides/slide33.xml><?xml version="1.0" encoding="utf-8"?>
-<p:sld xmlns:a="http://schemas.openxmlformats.org/drawingml/2006/main" xmlns:r="http://schemas.openxmlformats.org/officeDocument/2006/relationships" xmlns:p="http://schemas.openxmlformats.org/presentationml/2006/main">
-  <p:cSld>
-    <p:spTree>
-      <p:nvGrpSpPr>
-        <p:cNvPr id="1" name=""/>
-        <p:cNvGrpSpPr/>
-        <p:nvPr/>
-      </p:nvGrpSpPr>
-      <p:grpSpPr>
-        <a:xfrm>
-          <a:off x="0" y="0"/>
-          <a:ext cx="0" cy="0"/>
-          <a:chOff x="0" y="0"/>
-          <a:chExt cx="0" cy="0"/>
-        </a:xfrm>
-      </p:grpSpPr>
-      <p:sp>
-        <p:nvSpPr>
-          <p:cNvPr id="19458" name="Rectangle 2"/>
-          <p:cNvSpPr>
-            <a:spLocks noGrp="1" noChangeArrowheads="1"/>
-          </p:cNvSpPr>
-          <p:nvPr>
-            <p:ph type="title"/>
-          </p:nvPr>
-        </p:nvSpPr>
-        <p:spPr/>
-        <p:txBody>
-          <a:bodyPr/>
-          <a:lstStyle/>
-          <a:p>
-            <a:r>
-              <a:rPr lang="pt-BR" dirty="0" smtClean="0"/>
-              <a:t>Conclusão</a:t>
-            </a:r>
-            <a:endParaRPr lang="pt-BR" dirty="0"/>
-          </a:p>
-        </p:txBody>
-      </p:sp>
-      <p:sp>
-        <p:nvSpPr>
-          <p:cNvPr id="19459" name="Rectangle 3"/>
-          <p:cNvSpPr>
-            <a:spLocks noGrp="1" noChangeArrowheads="1"/>
-          </p:cNvSpPr>
-          <p:nvPr>
-            <p:ph type="body" idx="1"/>
-          </p:nvPr>
-        </p:nvSpPr>
-        <p:spPr/>
-        <p:txBody>
-          <a:bodyPr/>
-          <a:lstStyle/>
-          <a:p>
-            <a:r>
-              <a:rPr lang="pt-BR" dirty="0" smtClean="0"/>
-              <a:t>Em </a:t>
-            </a:r>
-            <a:r>
-              <a:rPr lang="pt-BR" dirty="0"/>
-              <a:t>futuras implantações, poderá ser acrescentado um sistema de agendamento de exames online no website da clínica e realizar o ajuste do website para dispositivos mobile, sempre buscando o máximo de facilidade para o paciente.</a:t>
-            </a:r>
-          </a:p>
-        </p:txBody>
-      </p:sp>
-      <p:sp>
-        <p:nvSpPr>
-          <p:cNvPr id="6" name="Espaço Reservado para Data 5"/>
-          <p:cNvSpPr>
-            <a:spLocks noGrp="1"/>
-          </p:cNvSpPr>
-          <p:nvPr>
-            <p:ph type="dt" sz="half" idx="10"/>
-          </p:nvPr>
-        </p:nvSpPr>
-        <p:spPr/>
-        <p:txBody>
-          <a:bodyPr/>
-          <a:lstStyle/>
-          <a:p>
-            <a:r>
-              <a:rPr lang="pt-BR" dirty="0"/>
-              <a:t>09/06/2014</a:t>
-            </a:r>
-          </a:p>
-        </p:txBody>
-      </p:sp>
-      <p:sp>
-        <p:nvSpPr>
-          <p:cNvPr id="7" name="Espaço Reservado para Número de Slide 6"/>
-          <p:cNvSpPr>
-            <a:spLocks noGrp="1"/>
-          </p:cNvSpPr>
-          <p:nvPr>
-            <p:ph type="sldNum" sz="quarter" idx="12"/>
-          </p:nvPr>
-        </p:nvSpPr>
-        <p:spPr/>
-        <p:txBody>
-          <a:bodyPr/>
-          <a:lstStyle/>
-          <a:p>
-            <a:fld id="{516476CB-12D4-456A-BCEE-8469A8C40045}" type="slidenum">
-              <a:rPr lang="pt-BR" smtClean="0"/>
-              <a:pPr/>
-              <a:t>33</a:t>
-            </a:fld>
-            <a:endParaRPr lang="pt-BR" dirty="0"/>
-          </a:p>
-        </p:txBody>
-      </p:sp>
-      <p:sp>
-        <p:nvSpPr>
-          <p:cNvPr id="8" name="Espaço Reservado para Rodapé 7"/>
-          <p:cNvSpPr>
-            <a:spLocks noGrp="1"/>
-          </p:cNvSpPr>
-          <p:nvPr>
-            <p:ph type="ftr" sz="quarter" idx="11"/>
-          </p:nvPr>
-        </p:nvSpPr>
-        <p:spPr/>
-        <p:txBody>
-          <a:bodyPr/>
-          <a:lstStyle/>
-          <a:p>
-            <a:r>
-              <a:rPr lang="pt-BR" dirty="0" smtClean="0"/>
-              <a:t>Veris Faculdades TCM/3ADS</a:t>
-            </a:r>
-            <a:endParaRPr lang="pt-BR" dirty="0"/>
-          </a:p>
-        </p:txBody>
-      </p:sp>
-    </p:spTree>
-    <p:extLst>
-      <p:ext uri="{BB962C8B-B14F-4D97-AF65-F5344CB8AC3E}">
-        <p14:creationId xmlns:p14="http://schemas.microsoft.com/office/powerpoint/2010/main" xmlns="" val="3588191264"/>
+        <p14:creationId xmlns:p14="http://schemas.microsoft.com/office/powerpoint/2010/main" val="1503807568"/>
       </p:ext>
     </p:extLst>
   </p:cSld>
@@ -9663,8 +7158,8 @@
           <a:lstStyle/>
           <a:p>
             <a:r>
-              <a:rPr lang="pt-BR" dirty="0"/>
-              <a:t>09/06/2014</a:t>
+              <a:rPr lang="pt-BR" dirty="0" smtClean="0"/>
+              <a:t>10/06/2014</a:t>
             </a:r>
             <a:endParaRPr lang="pt-BR" dirty="0" smtClean="0"/>
           </a:p>
@@ -9732,7 +7227,7 @@
           <a:blip r:embed="rId2" cstate="print">
             <a:extLst>
               <a:ext uri="{28A0092B-C50C-407E-A947-70E740481C1C}">
-                <a14:useLocalDpi xmlns:a14="http://schemas.microsoft.com/office/drawing/2010/main" xmlns="" val="0"/>
+                <a14:useLocalDpi xmlns:a14="http://schemas.microsoft.com/office/drawing/2010/main" val="0"/>
               </a:ext>
             </a:extLst>
           </a:blip>
@@ -9753,7 +7248,7 @@
     </p:spTree>
     <p:extLst>
       <p:ext uri="{BB962C8B-B14F-4D97-AF65-F5344CB8AC3E}">
-        <p14:creationId xmlns:p14="http://schemas.microsoft.com/office/powerpoint/2010/main" xmlns="" val="3867898359"/>
+        <p14:creationId xmlns:p14="http://schemas.microsoft.com/office/powerpoint/2010/main" val="3867898359"/>
       </p:ext>
     </p:extLst>
   </p:cSld>
@@ -9829,8 +7324,8 @@
           <a:lstStyle/>
           <a:p>
             <a:r>
-              <a:rPr lang="pt-BR" dirty="0"/>
-              <a:t>09/06/2014</a:t>
+              <a:rPr lang="pt-BR" dirty="0" smtClean="0"/>
+              <a:t>10/06/2014</a:t>
             </a:r>
             <a:endParaRPr lang="pt-BR" dirty="0" smtClean="0"/>
           </a:p>
@@ -9888,17 +7383,17 @@
       </p:sp>
       <p:pic>
         <p:nvPicPr>
-          <p:cNvPr id="2" name="Imagem 1"/>
+          <p:cNvPr id="4" name="Imagem 3"/>
           <p:cNvPicPr>
             <a:picLocks noChangeAspect="1"/>
           </p:cNvPicPr>
           <p:nvPr/>
         </p:nvPicPr>
         <p:blipFill>
-          <a:blip r:embed="rId2" cstate="print">
+          <a:blip r:embed="rId2">
             <a:extLst>
               <a:ext uri="{28A0092B-C50C-407E-A947-70E740481C1C}">
-                <a14:useLocalDpi xmlns:a14="http://schemas.microsoft.com/office/drawing/2010/main" xmlns="" val="0"/>
+                <a14:useLocalDpi xmlns:a14="http://schemas.microsoft.com/office/drawing/2010/main" val="0"/>
               </a:ext>
             </a:extLst>
           </a:blip>
@@ -9908,18 +7403,60 @@
         </p:blipFill>
         <p:spPr>
           <a:xfrm>
-            <a:off x="323528" y="1904659"/>
-            <a:ext cx="8820472" cy="3756589"/>
+            <a:off x="230168" y="2276872"/>
+            <a:ext cx="8913832" cy="3168352"/>
           </a:xfrm>
           <a:prstGeom prst="rect">
             <a:avLst/>
           </a:prstGeom>
         </p:spPr>
       </p:pic>
+      <p:sp>
+        <p:nvSpPr>
+          <p:cNvPr id="5" name="Retângulo 4"/>
+          <p:cNvSpPr/>
+          <p:nvPr/>
+        </p:nvSpPr>
+        <p:spPr>
+          <a:xfrm>
+            <a:off x="457200" y="5615979"/>
+            <a:ext cx="7956557" cy="461665"/>
+          </a:xfrm>
+          <a:prstGeom prst="rect">
+            <a:avLst/>
+          </a:prstGeom>
+        </p:spPr>
+        <p:txBody>
+          <a:bodyPr wrap="square">
+            <a:spAutoFit/>
+          </a:bodyPr>
+          <a:lstStyle/>
+          <a:p>
+            <a:pPr>
+              <a:buClr>
+                <a:schemeClr val="bg2"/>
+              </a:buClr>
+            </a:pPr>
+            <a:r>
+              <a:rPr lang="pt-BR" sz="2400" dirty="0" smtClean="0">
+                <a:solidFill>
+                  <a:srgbClr val="0070C0"/>
+                </a:solidFill>
+              </a:rPr>
+              <a:t>Continuação da ligação de herança no slide seguinte</a:t>
+            </a:r>
+            <a:endParaRPr lang="pt-BR" sz="2400" dirty="0">
+              <a:solidFill>
+                <a:srgbClr val="0070C0"/>
+              </a:solidFill>
+            </a:endParaRPr>
+          </a:p>
+        </p:txBody>
+      </p:sp>
     </p:spTree>
     <p:extLst>
       <p:ext uri="{BB962C8B-B14F-4D97-AF65-F5344CB8AC3E}">
-        <p14:creationId xmlns:p14="http://schemas.microsoft.com/office/powerpoint/2010/main" xmlns="" val="1403961185"/>
+        <p14:creationId xmlns:p14="http://schemas.microsoft.com/office/powerpoint/2010/main" val="1403961185"/>
       </p:ext>
     </p:extLst>
   </p:cSld>
@@ -9995,8 +7532,8 @@
           <a:lstStyle/>
           <a:p>
             <a:r>
-              <a:rPr lang="pt-BR" dirty="0"/>
-              <a:t>09/06/2014</a:t>
+              <a:rPr lang="pt-BR" dirty="0" smtClean="0"/>
+              <a:t>10/06/2014</a:t>
             </a:r>
             <a:endParaRPr lang="pt-BR" dirty="0" smtClean="0"/>
           </a:p>
@@ -10064,7 +7601,7 @@
           <a:blip r:embed="rId2" cstate="print">
             <a:extLst>
               <a:ext uri="{28A0092B-C50C-407E-A947-70E740481C1C}">
-                <a14:useLocalDpi xmlns:a14="http://schemas.microsoft.com/office/drawing/2010/main" xmlns="" val="0"/>
+                <a14:useLocalDpi xmlns:a14="http://schemas.microsoft.com/office/drawing/2010/main" val="0"/>
               </a:ext>
             </a:extLst>
           </a:blip>
@@ -10074,8 +7611,8 @@
         </p:blipFill>
         <p:spPr>
           <a:xfrm>
-            <a:off x="1866936" y="1503749"/>
-            <a:ext cx="5410128" cy="4745195"/>
+            <a:off x="1691680" y="2032506"/>
+            <a:ext cx="2089462" cy="2188582"/>
           </a:xfrm>
           <a:prstGeom prst="rect">
             <a:avLst/>
@@ -10084,14 +7621,14 @@
       </p:pic>
       <p:sp>
         <p:nvSpPr>
-          <p:cNvPr id="5" name="Retângulo 4"/>
+          <p:cNvPr id="9" name="Retângulo 8"/>
           <p:cNvSpPr/>
           <p:nvPr/>
         </p:nvSpPr>
         <p:spPr>
           <a:xfrm>
-            <a:off x="611560" y="5301208"/>
-            <a:ext cx="3096344" cy="707886"/>
+            <a:off x="3953413" y="1795874"/>
+            <a:ext cx="5017086" cy="1200329"/>
           </a:xfrm>
           <a:prstGeom prst="rect">
             <a:avLst/>
@@ -10104,7 +7641,7 @@
           <a:lstStyle/>
           <a:p>
             <a:r>
-              <a:rPr lang="pt-BR" sz="2000" dirty="0" smtClean="0">
+              <a:rPr lang="pt-BR" sz="2400" dirty="0" smtClean="0">
                 <a:solidFill>
                   <a:srgbClr val="FF0000"/>
                 </a:solidFill>
@@ -10112,17 +7649,77 @@
               <a:t>*</a:t>
             </a:r>
             <a:r>
-              <a:rPr lang="pt-BR" sz="2000" dirty="0" smtClean="0"/>
-              <a:t>Continuação dos casos de uso do Gestor.</a:t>
-            </a:r>
-            <a:endParaRPr lang="pt-BR" sz="2000" dirty="0"/>
-          </a:p>
-        </p:txBody>
-      </p:sp>
+              <a:rPr lang="pt-BR" sz="2400" dirty="0" smtClean="0"/>
+              <a:t>Os casos de uso do gestor podem ser melhor visualizados nos slides anterior.</a:t>
+            </a:r>
+            <a:endParaRPr lang="pt-BR" sz="2400" dirty="0"/>
+          </a:p>
+        </p:txBody>
+      </p:sp>
+      <p:pic>
+        <p:nvPicPr>
+          <p:cNvPr id="5" name="Imagem 4"/>
+          <p:cNvPicPr>
+            <a:picLocks noChangeAspect="1"/>
+          </p:cNvPicPr>
+          <p:nvPr/>
+        </p:nvPicPr>
+        <p:blipFill>
+          <a:blip r:embed="rId3" cstate="print">
+            <a:extLst>
+              <a:ext uri="{28A0092B-C50C-407E-A947-70E740481C1C}">
+                <a14:useLocalDpi xmlns:a14="http://schemas.microsoft.com/office/drawing/2010/main" val="0"/>
+              </a:ext>
+            </a:extLst>
+          </a:blip>
+          <a:stretch>
+            <a:fillRect/>
+          </a:stretch>
+        </p:blipFill>
+        <p:spPr>
+          <a:xfrm>
+            <a:off x="457200" y="4011003"/>
+            <a:ext cx="8686800" cy="1722253"/>
+          </a:xfrm>
+          <a:prstGeom prst="rect">
+            <a:avLst/>
+          </a:prstGeom>
+        </p:spPr>
+      </p:pic>
+      <p:pic>
+        <p:nvPicPr>
+          <p:cNvPr id="10" name="Imagem 9"/>
+          <p:cNvPicPr>
+            <a:picLocks noChangeAspect="1"/>
+          </p:cNvPicPr>
+          <p:nvPr/>
+        </p:nvPicPr>
+        <p:blipFill>
+          <a:blip r:embed="rId4" cstate="print">
+            <a:extLst>
+              <a:ext uri="{28A0092B-C50C-407E-A947-70E740481C1C}">
+                <a14:useLocalDpi xmlns:a14="http://schemas.microsoft.com/office/drawing/2010/main" val="0"/>
+              </a:ext>
+            </a:extLst>
+          </a:blip>
+          <a:stretch>
+            <a:fillRect/>
+          </a:stretch>
+        </p:blipFill>
+        <p:spPr>
+          <a:xfrm>
+            <a:off x="1115616" y="2034319"/>
+            <a:ext cx="576064" cy="1970746"/>
+          </a:xfrm>
+          <a:prstGeom prst="rect">
+            <a:avLst/>
+          </a:prstGeom>
+        </p:spPr>
+      </p:pic>
     </p:spTree>
     <p:extLst>
       <p:ext uri="{BB962C8B-B14F-4D97-AF65-F5344CB8AC3E}">
-        <p14:creationId xmlns:p14="http://schemas.microsoft.com/office/powerpoint/2010/main" xmlns="" val="2925749522"/>
+        <p14:creationId xmlns:p14="http://schemas.microsoft.com/office/powerpoint/2010/main" val="3412004320"/>
       </p:ext>
     </p:extLst>
   </p:cSld>
@@ -10161,9 +7758,9 @@
       </p:grpSpPr>
       <p:sp>
         <p:nvSpPr>
-          <p:cNvPr id="19458" name="Rectangle 2"/>
-          <p:cNvSpPr>
-            <a:spLocks noGrp="1" noChangeArrowheads="1"/>
+          <p:cNvPr id="2" name="Título 1"/>
+          <p:cNvSpPr>
+            <a:spLocks noGrp="1"/>
           </p:cNvSpPr>
           <p:nvPr>
             <p:ph type="title"/>
@@ -10176,7 +7773,7 @@
           <a:p>
             <a:r>
               <a:rPr lang="pt-BR" dirty="0" smtClean="0"/>
-              <a:t>Diagrama Caso Uso</a:t>
+              <a:t>Escopo do Sistema</a:t>
             </a:r>
             <a:endParaRPr lang="pt-BR" dirty="0"/>
           </a:p>
@@ -10184,7 +7781,7 @@
       </p:sp>
       <p:sp>
         <p:nvSpPr>
-          <p:cNvPr id="6" name="Espaço Reservado para Data 5"/>
+          <p:cNvPr id="4" name="Espaço Reservado para Data 3"/>
           <p:cNvSpPr>
             <a:spLocks noGrp="1"/>
           </p:cNvSpPr>
@@ -10198,8 +7795,8 @@
           <a:lstStyle/>
           <a:p>
             <a:r>
-              <a:rPr lang="pt-BR" dirty="0"/>
-              <a:t>09/06/2014</a:t>
+              <a:rPr lang="pt-BR" dirty="0" smtClean="0"/>
+              <a:t>10/06/2014</a:t>
             </a:r>
             <a:endParaRPr lang="pt-BR" dirty="0" smtClean="0"/>
           </a:p>
@@ -10210,7 +7807,30 @@
       </p:sp>
       <p:sp>
         <p:nvSpPr>
-          <p:cNvPr id="7" name="Espaço Reservado para Número de Slide 6"/>
+          <p:cNvPr id="5" name="Espaço Reservado para Rodapé 4"/>
+          <p:cNvSpPr>
+            <a:spLocks noGrp="1"/>
+          </p:cNvSpPr>
+          <p:nvPr>
+            <p:ph type="ftr" sz="quarter" idx="11"/>
+          </p:nvPr>
+        </p:nvSpPr>
+        <p:spPr/>
+        <p:txBody>
+          <a:bodyPr/>
+          <a:lstStyle/>
+          <a:p>
+            <a:r>
+              <a:rPr lang="pt-BR" dirty="0" smtClean="0"/>
+              <a:t>Veris Faculdades TCM/3ADS</a:t>
+            </a:r>
+            <a:endParaRPr lang="pt-BR" dirty="0"/>
+          </a:p>
+        </p:txBody>
+      </p:sp>
+      <p:sp>
+        <p:nvSpPr>
+          <p:cNvPr id="6" name="Espaço Reservado para Número de Slide 5"/>
           <p:cNvSpPr>
             <a:spLocks noGrp="1"/>
           </p:cNvSpPr>
@@ -10228,46 +7848,23 @@
               <a:pPr/>
               <a:t>7</a:t>
             </a:fld>
-            <a:endParaRPr lang="pt-BR" dirty="0"/>
-          </a:p>
-        </p:txBody>
-      </p:sp>
-      <p:sp>
-        <p:nvSpPr>
-          <p:cNvPr id="8" name="Espaço Reservado para Rodapé 7"/>
-          <p:cNvSpPr>
-            <a:spLocks noGrp="1"/>
-          </p:cNvSpPr>
-          <p:nvPr>
-            <p:ph type="ftr" sz="quarter" idx="11"/>
-          </p:nvPr>
-        </p:nvSpPr>
-        <p:spPr/>
-        <p:txBody>
-          <a:bodyPr/>
-          <a:lstStyle/>
-          <a:p>
-            <a:r>
-              <a:rPr lang="pt-BR" dirty="0" smtClean="0"/>
-              <a:t>Veris Faculdades TCM/3ADS</a:t>
-            </a:r>
-            <a:endParaRPr lang="pt-BR" dirty="0"/>
+            <a:endParaRPr lang="pt-BR"/>
           </a:p>
         </p:txBody>
       </p:sp>
       <p:pic>
         <p:nvPicPr>
-          <p:cNvPr id="3" name="Imagem 2"/>
+          <p:cNvPr id="9" name="Imagem 8"/>
           <p:cNvPicPr>
             <a:picLocks noChangeAspect="1"/>
           </p:cNvPicPr>
           <p:nvPr/>
         </p:nvPicPr>
         <p:blipFill>
-          <a:blip r:embed="rId2" cstate="print">
+          <a:blip r:embed="rId2">
             <a:extLst>
               <a:ext uri="{28A0092B-C50C-407E-A947-70E740481C1C}">
-                <a14:useLocalDpi xmlns:a14="http://schemas.microsoft.com/office/drawing/2010/main" xmlns="" val="0"/>
+                <a14:useLocalDpi xmlns:a14="http://schemas.microsoft.com/office/drawing/2010/main" val="0"/>
               </a:ext>
             </a:extLst>
           </a:blip>
@@ -10277,105 +7874,8 @@
         </p:blipFill>
         <p:spPr>
           <a:xfrm>
-            <a:off x="1690450" y="2132857"/>
-            <a:ext cx="2089462" cy="2188582"/>
-          </a:xfrm>
-          <a:prstGeom prst="rect">
-            <a:avLst/>
-          </a:prstGeom>
-        </p:spPr>
-      </p:pic>
-      <p:sp>
-        <p:nvSpPr>
-          <p:cNvPr id="9" name="Retângulo 8"/>
-          <p:cNvSpPr/>
-          <p:nvPr/>
-        </p:nvSpPr>
-        <p:spPr>
-          <a:xfrm>
-            <a:off x="3953413" y="1795874"/>
-            <a:ext cx="5017086" cy="1200329"/>
-          </a:xfrm>
-          <a:prstGeom prst="rect">
-            <a:avLst/>
-          </a:prstGeom>
-        </p:spPr>
-        <p:txBody>
-          <a:bodyPr wrap="square">
-            <a:spAutoFit/>
-          </a:bodyPr>
-          <a:lstStyle/>
-          <a:p>
-            <a:r>
-              <a:rPr lang="pt-BR" sz="2400" dirty="0" smtClean="0">
-                <a:solidFill>
-                  <a:srgbClr val="FF0000"/>
-                </a:solidFill>
-              </a:rPr>
-              <a:t>*</a:t>
-            </a:r>
-            <a:r>
-              <a:rPr lang="pt-BR" sz="2400" dirty="0" smtClean="0"/>
-              <a:t>Os casos de uso do gestor podem ser melhor visualizados nos slides anterior.</a:t>
-            </a:r>
-            <a:endParaRPr lang="pt-BR" sz="2400" dirty="0"/>
-          </a:p>
-        </p:txBody>
-      </p:sp>
-      <p:pic>
-        <p:nvPicPr>
-          <p:cNvPr id="5" name="Imagem 4"/>
-          <p:cNvPicPr>
-            <a:picLocks noChangeAspect="1"/>
-          </p:cNvPicPr>
-          <p:nvPr/>
-        </p:nvPicPr>
-        <p:blipFill>
-          <a:blip r:embed="rId3" cstate="print">
-            <a:extLst>
-              <a:ext uri="{28A0092B-C50C-407E-A947-70E740481C1C}">
-                <a14:useLocalDpi xmlns:a14="http://schemas.microsoft.com/office/drawing/2010/main" xmlns="" val="0"/>
-              </a:ext>
-            </a:extLst>
-          </a:blip>
-          <a:stretch>
-            <a:fillRect/>
-          </a:stretch>
-        </p:blipFill>
-        <p:spPr>
-          <a:xfrm>
-            <a:off x="457200" y="4011003"/>
-            <a:ext cx="8686800" cy="1722253"/>
-          </a:xfrm>
-          <a:prstGeom prst="rect">
-            <a:avLst/>
-          </a:prstGeom>
-        </p:spPr>
-      </p:pic>
-      <p:pic>
-        <p:nvPicPr>
-          <p:cNvPr id="10" name="Imagem 9"/>
-          <p:cNvPicPr>
-            <a:picLocks noChangeAspect="1"/>
-          </p:cNvPicPr>
-          <p:nvPr/>
-        </p:nvPicPr>
-        <p:blipFill>
-          <a:blip r:embed="rId4" cstate="print">
-            <a:extLst>
-              <a:ext uri="{28A0092B-C50C-407E-A947-70E740481C1C}">
-                <a14:useLocalDpi xmlns:a14="http://schemas.microsoft.com/office/drawing/2010/main" xmlns="" val="0"/>
-              </a:ext>
-            </a:extLst>
-          </a:blip>
-          <a:stretch>
-            <a:fillRect/>
-          </a:stretch>
-        </p:blipFill>
-        <p:spPr>
-          <a:xfrm>
-            <a:off x="1115616" y="2034319"/>
-            <a:ext cx="576064" cy="1970746"/>
+            <a:off x="303127" y="1844824"/>
+            <a:ext cx="8805377" cy="4176464"/>
           </a:xfrm>
           <a:prstGeom prst="rect">
             <a:avLst/>
@@ -10385,16 +7885,13 @@
     </p:spTree>
     <p:extLst>
       <p:ext uri="{BB962C8B-B14F-4D97-AF65-F5344CB8AC3E}">
-        <p14:creationId xmlns:p14="http://schemas.microsoft.com/office/powerpoint/2010/main" xmlns="" val="3412004320"/>
+        <p14:creationId xmlns:p14="http://schemas.microsoft.com/office/powerpoint/2010/main" val="2898236993"/>
       </p:ext>
     </p:extLst>
   </p:cSld>
   <p:clrMapOvr>
     <a:masterClrMapping/>
   </p:clrMapOvr>
-  <p:transition spd="med">
-    <p:fade/>
-  </p:transition>
   <p:timing>
     <p:tnLst>
       <p:par>
@@ -10424,9 +7921,9 @@
       </p:grpSpPr>
       <p:sp>
         <p:nvSpPr>
-          <p:cNvPr id="2" name="Título 1"/>
-          <p:cNvSpPr>
-            <a:spLocks noGrp="1"/>
+          <p:cNvPr id="19458" name="Rectangle 2"/>
+          <p:cNvSpPr>
+            <a:spLocks noGrp="1" noChangeArrowheads="1"/>
           </p:cNvSpPr>
           <p:nvPr>
             <p:ph type="title"/>
@@ -10447,7 +7944,7 @@
       </p:sp>
       <p:sp>
         <p:nvSpPr>
-          <p:cNvPr id="4" name="Espaço Reservado para Data 3"/>
+          <p:cNvPr id="6" name="Espaço Reservado para Data 5"/>
           <p:cNvSpPr>
             <a:spLocks noGrp="1"/>
           </p:cNvSpPr>
@@ -10461,8 +7958,8 @@
           <a:lstStyle/>
           <a:p>
             <a:r>
-              <a:rPr lang="pt-BR" dirty="0"/>
-              <a:t>09/06/2014</a:t>
+              <a:rPr lang="pt-BR" dirty="0" smtClean="0"/>
+              <a:t>10/06/2014</a:t>
             </a:r>
             <a:endParaRPr lang="pt-BR" dirty="0" smtClean="0"/>
           </a:p>
@@ -10473,30 +7970,7 @@
       </p:sp>
       <p:sp>
         <p:nvSpPr>
-          <p:cNvPr id="5" name="Espaço Reservado para Rodapé 4"/>
-          <p:cNvSpPr>
-            <a:spLocks noGrp="1"/>
-          </p:cNvSpPr>
-          <p:nvPr>
-            <p:ph type="ftr" sz="quarter" idx="11"/>
-          </p:nvPr>
-        </p:nvSpPr>
-        <p:spPr/>
-        <p:txBody>
-          <a:bodyPr/>
-          <a:lstStyle/>
-          <a:p>
-            <a:r>
-              <a:rPr lang="pt-BR" dirty="0" smtClean="0"/>
-              <a:t>Veris Faculdades TCM/3ADS</a:t>
-            </a:r>
-            <a:endParaRPr lang="pt-BR" dirty="0"/>
-          </a:p>
-        </p:txBody>
-      </p:sp>
-      <p:sp>
-        <p:nvSpPr>
-          <p:cNvPr id="6" name="Espaço Reservado para Número de Slide 5"/>
+          <p:cNvPr id="7" name="Espaço Reservado para Número de Slide 6"/>
           <p:cNvSpPr>
             <a:spLocks noGrp="1"/>
           </p:cNvSpPr>
@@ -10514,50 +7988,128 @@
               <a:pPr/>
               <a:t>8</a:t>
             </a:fld>
-            <a:endParaRPr lang="pt-BR"/>
-          </a:p>
-        </p:txBody>
-      </p:sp>
-      <p:pic>
-        <p:nvPicPr>
-          <p:cNvPr id="3" name="Imagem 2"/>
-          <p:cNvPicPr>
-            <a:picLocks noChangeAspect="1"/>
-          </p:cNvPicPr>
+            <a:endParaRPr lang="pt-BR" dirty="0"/>
+          </a:p>
+        </p:txBody>
+      </p:sp>
+      <p:sp>
+        <p:nvSpPr>
+          <p:cNvPr id="8" name="Espaço Reservado para Rodapé 7"/>
+          <p:cNvSpPr>
+            <a:spLocks noGrp="1"/>
+          </p:cNvSpPr>
+          <p:nvPr>
+            <p:ph type="ftr" sz="quarter" idx="11"/>
+          </p:nvPr>
+        </p:nvSpPr>
+        <p:spPr/>
+        <p:txBody>
+          <a:bodyPr/>
+          <a:lstStyle/>
+          <a:p>
+            <a:r>
+              <a:rPr lang="pt-BR" dirty="0" smtClean="0"/>
+              <a:t>Veris Faculdades TCM/3ADS</a:t>
+            </a:r>
+            <a:endParaRPr lang="pt-BR" dirty="0"/>
+          </a:p>
+        </p:txBody>
+      </p:sp>
+      <p:sp>
+        <p:nvSpPr>
+          <p:cNvPr id="2" name="Retângulo 1"/>
+          <p:cNvSpPr/>
           <p:nvPr/>
-        </p:nvPicPr>
-        <p:blipFill>
-          <a:blip r:embed="rId2" cstate="print">
-            <a:extLst>
-              <a:ext uri="{28A0092B-C50C-407E-A947-70E740481C1C}">
-                <a14:useLocalDpi xmlns:a14="http://schemas.microsoft.com/office/drawing/2010/main" xmlns="" val="0"/>
-              </a:ext>
-            </a:extLst>
-          </a:blip>
-          <a:stretch>
-            <a:fillRect/>
-          </a:stretch>
-        </p:blipFill>
+        </p:nvSpPr>
         <p:spPr>
           <a:xfrm>
-            <a:off x="251521" y="2202356"/>
-            <a:ext cx="8784975" cy="3458892"/>
+            <a:off x="838200" y="1660416"/>
+            <a:ext cx="7694240" cy="1815882"/>
           </a:xfrm>
           <a:prstGeom prst="rect">
             <a:avLst/>
           </a:prstGeom>
         </p:spPr>
-      </p:pic>
+        <p:txBody>
+          <a:bodyPr wrap="square">
+            <a:spAutoFit/>
+          </a:bodyPr>
+          <a:lstStyle/>
+          <a:p>
+            <a:pPr>
+              <a:buClr>
+                <a:schemeClr val="bg2"/>
+              </a:buClr>
+            </a:pPr>
+            <a:r>
+              <a:rPr lang="pt-BR" sz="2800" dirty="0" smtClean="0"/>
+              <a:t>Casos de uso para apresentação:</a:t>
+            </a:r>
+            <a:endParaRPr lang="pt-BR" sz="2800" dirty="0"/>
+          </a:p>
+          <a:p>
+            <a:pPr marL="285750" indent="-285750">
+              <a:buClr>
+                <a:schemeClr val="bg2"/>
+              </a:buClr>
+              <a:buFont typeface="Wingdings" panose="05000000000000000000" pitchFamily="2" charset="2"/>
+              <a:buChar char=""/>
+            </a:pPr>
+            <a:r>
+              <a:rPr lang="pt-BR" sz="2800" dirty="0" smtClean="0"/>
+              <a:t>Verificar resultado de exame online</a:t>
+            </a:r>
+          </a:p>
+          <a:p>
+            <a:pPr marL="285750" indent="-285750">
+              <a:buClr>
+                <a:schemeClr val="bg2"/>
+              </a:buClr>
+              <a:buFont typeface="Wingdings" panose="05000000000000000000" pitchFamily="2" charset="2"/>
+              <a:buChar char=""/>
+            </a:pPr>
+            <a:r>
+              <a:rPr lang="pt-BR" sz="2800" dirty="0" smtClean="0"/>
+              <a:t>Cadastrar </a:t>
+            </a:r>
+            <a:r>
+              <a:rPr lang="pt-BR" sz="2800" dirty="0"/>
+              <a:t>pacientes no sistema</a:t>
+            </a:r>
+          </a:p>
+          <a:p>
+            <a:pPr marL="285750" indent="-285750">
+              <a:buClr>
+                <a:schemeClr val="bg2"/>
+              </a:buClr>
+              <a:buFont typeface="Wingdings" panose="05000000000000000000" pitchFamily="2" charset="2"/>
+              <a:buChar char=""/>
+            </a:pPr>
+            <a:r>
+              <a:rPr lang="pt-BR" sz="2800" dirty="0" smtClean="0"/>
+              <a:t>Gerar relatórios de fluxo de </a:t>
+            </a:r>
+            <a:r>
+              <a:rPr lang="pt-BR" sz="2800" dirty="0" smtClean="0"/>
+              <a:t>exames</a:t>
+            </a:r>
+            <a:endParaRPr lang="pt-BR" sz="2800" dirty="0" smtClean="0"/>
+          </a:p>
+        </p:txBody>
+      </p:sp>
     </p:spTree>
     <p:extLst>
       <p:ext uri="{BB962C8B-B14F-4D97-AF65-F5344CB8AC3E}">
-        <p14:creationId xmlns:p14="http://schemas.microsoft.com/office/powerpoint/2010/main" xmlns="" val="2898236993"/>
+        <p14:creationId xmlns:p14="http://schemas.microsoft.com/office/powerpoint/2010/main" val="2996355730"/>
       </p:ext>
     </p:extLst>
   </p:cSld>
   <p:clrMapOvr>
     <a:masterClrMapping/>
   </p:clrMapOvr>
+  <p:transition spd="med">
+    <p:fade/>
+  </p:transition>
   <p:timing>
     <p:tnLst>
       <p:par>
@@ -10587,9 +8139,9 @@
       </p:grpSpPr>
       <p:sp>
         <p:nvSpPr>
-          <p:cNvPr id="2" name="Título 1"/>
-          <p:cNvSpPr>
-            <a:spLocks noGrp="1"/>
+          <p:cNvPr id="19458" name="Rectangle 2"/>
+          <p:cNvSpPr>
+            <a:spLocks noGrp="1" noChangeArrowheads="1"/>
           </p:cNvSpPr>
           <p:nvPr>
             <p:ph type="title"/>
@@ -10602,7 +8154,15 @@
           <a:p>
             <a:r>
               <a:rPr lang="pt-BR" dirty="0" smtClean="0"/>
-              <a:t>Escopo do Sistema</a:t>
+              <a:t>Diagrama </a:t>
+            </a:r>
+            <a:r>
+              <a:rPr lang="pt-BR" dirty="0"/>
+              <a:t>de </a:t>
+            </a:r>
+            <a:r>
+              <a:rPr lang="pt-BR" dirty="0" smtClean="0"/>
+              <a:t>Comunicação</a:t>
             </a:r>
             <a:endParaRPr lang="pt-BR" dirty="0"/>
           </a:p>
@@ -10610,7 +8170,7 @@
       </p:sp>
       <p:sp>
         <p:nvSpPr>
-          <p:cNvPr id="4" name="Espaço Reservado para Data 3"/>
+          <p:cNvPr id="6" name="Espaço Reservado para Data 5"/>
           <p:cNvSpPr>
             <a:spLocks noGrp="1"/>
           </p:cNvSpPr>
@@ -10624,8 +8184,8 @@
           <a:lstStyle/>
           <a:p>
             <a:r>
-              <a:rPr lang="pt-BR" dirty="0"/>
-              <a:t>09/06/2014</a:t>
+              <a:rPr lang="pt-BR" dirty="0" smtClean="0"/>
+              <a:t>10/06/2014</a:t>
             </a:r>
             <a:endParaRPr lang="pt-BR" dirty="0" smtClean="0"/>
           </a:p>
@@ -10636,30 +8196,7 @@
       </p:sp>
       <p:sp>
         <p:nvSpPr>
-          <p:cNvPr id="5" name="Espaço Reservado para Rodapé 4"/>
-          <p:cNvSpPr>
-            <a:spLocks noGrp="1"/>
-          </p:cNvSpPr>
-          <p:nvPr>
-            <p:ph type="ftr" sz="quarter" idx="11"/>
-          </p:nvPr>
-        </p:nvSpPr>
-        <p:spPr/>
-        <p:txBody>
-          <a:bodyPr/>
-          <a:lstStyle/>
-          <a:p>
-            <a:r>
-              <a:rPr lang="pt-BR" dirty="0" smtClean="0"/>
-              <a:t>Veris Faculdades TCM/3ADS</a:t>
-            </a:r>
-            <a:endParaRPr lang="pt-BR" dirty="0"/>
-          </a:p>
-        </p:txBody>
-      </p:sp>
-      <p:sp>
-        <p:nvSpPr>
-          <p:cNvPr id="6" name="Espaço Reservado para Número de Slide 5"/>
+          <p:cNvPr id="7" name="Espaço Reservado para Número de Slide 6"/>
           <p:cNvSpPr>
             <a:spLocks noGrp="1"/>
           </p:cNvSpPr>
@@ -10677,23 +8214,46 @@
               <a:pPr/>
               <a:t>9</a:t>
             </a:fld>
-            <a:endParaRPr lang="pt-BR"/>
+            <a:endParaRPr lang="pt-BR" dirty="0"/>
+          </a:p>
+        </p:txBody>
+      </p:sp>
+      <p:sp>
+        <p:nvSpPr>
+          <p:cNvPr id="8" name="Espaço Reservado para Rodapé 7"/>
+          <p:cNvSpPr>
+            <a:spLocks noGrp="1"/>
+          </p:cNvSpPr>
+          <p:nvPr>
+            <p:ph type="ftr" sz="quarter" idx="11"/>
+          </p:nvPr>
+        </p:nvSpPr>
+        <p:spPr/>
+        <p:txBody>
+          <a:bodyPr/>
+          <a:lstStyle/>
+          <a:p>
+            <a:r>
+              <a:rPr lang="pt-BR" dirty="0" smtClean="0"/>
+              <a:t>Veris Faculdades TCM/3ADS</a:t>
+            </a:r>
+            <a:endParaRPr lang="pt-BR" dirty="0"/>
           </a:p>
         </p:txBody>
       </p:sp>
       <p:pic>
         <p:nvPicPr>
-          <p:cNvPr id="8" name="Imagem 7"/>
+          <p:cNvPr id="4" name="Imagem 3"/>
           <p:cNvPicPr>
             <a:picLocks noChangeAspect="1"/>
           </p:cNvPicPr>
           <p:nvPr/>
         </p:nvPicPr>
         <p:blipFill>
-          <a:blip r:embed="rId2" cstate="print">
+          <a:blip r:embed="rId2">
             <a:extLst>
               <a:ext uri="{28A0092B-C50C-407E-A947-70E740481C1C}">
-                <a14:useLocalDpi xmlns:a14="http://schemas.microsoft.com/office/drawing/2010/main" xmlns="" val="0"/>
+                <a14:useLocalDpi xmlns:a14="http://schemas.microsoft.com/office/drawing/2010/main" val="0"/>
               </a:ext>
             </a:extLst>
           </a:blip>
@@ -10703,24 +8263,85 @@
         </p:blipFill>
         <p:spPr>
           <a:xfrm>
-            <a:off x="251520" y="2780928"/>
-            <a:ext cx="8811393" cy="2264466"/>
+            <a:off x="251759" y="2204864"/>
+            <a:ext cx="8892241" cy="3888432"/>
           </a:xfrm>
           <a:prstGeom prst="rect">
             <a:avLst/>
           </a:prstGeom>
         </p:spPr>
       </p:pic>
+      <p:sp>
+        <p:nvSpPr>
+          <p:cNvPr id="11" name="Retângulo 10"/>
+          <p:cNvSpPr/>
+          <p:nvPr/>
+        </p:nvSpPr>
+        <p:spPr>
+          <a:xfrm>
+            <a:off x="527795" y="1500118"/>
+            <a:ext cx="8340168" cy="523220"/>
+          </a:xfrm>
+          <a:prstGeom prst="rect">
+            <a:avLst/>
+          </a:prstGeom>
+        </p:spPr>
+        <p:txBody>
+          <a:bodyPr wrap="none">
+            <a:spAutoFit/>
+          </a:bodyPr>
+          <a:lstStyle/>
+          <a:p>
+            <a:pPr>
+              <a:buClr>
+                <a:schemeClr val="bg2"/>
+              </a:buClr>
+            </a:pPr>
+            <a:r>
+              <a:rPr lang="pt-BR" sz="2800" dirty="0" smtClean="0">
+                <a:solidFill>
+                  <a:srgbClr val="0070C0"/>
+                </a:solidFill>
+              </a:rPr>
+              <a:t>Caso de Uso: Verificar Resultado </a:t>
+            </a:r>
+            <a:r>
+              <a:rPr lang="pt-BR" sz="2800" dirty="0">
+                <a:solidFill>
+                  <a:srgbClr val="0070C0"/>
+                </a:solidFill>
+              </a:rPr>
+              <a:t>de </a:t>
+            </a:r>
+            <a:r>
+              <a:rPr lang="pt-BR" sz="2800" dirty="0" smtClean="0">
+                <a:solidFill>
+                  <a:srgbClr val="0070C0"/>
+                </a:solidFill>
+              </a:rPr>
+              <a:t>Exame Online</a:t>
+            </a:r>
+            <a:endParaRPr lang="pt-BR" sz="2800" dirty="0">
+              <a:solidFill>
+                <a:srgbClr val="0070C0"/>
+              </a:solidFill>
+            </a:endParaRPr>
+          </a:p>
+        </p:txBody>
+      </p:sp>
     </p:spTree>
     <p:extLst>
       <p:ext uri="{BB962C8B-B14F-4D97-AF65-F5344CB8AC3E}">
-        <p14:creationId xmlns:p14="http://schemas.microsoft.com/office/powerpoint/2010/main" xmlns="" val="3321499385"/>
+        <p14:creationId xmlns:p14="http://schemas.microsoft.com/office/powerpoint/2010/main" val="4277231462"/>
       </p:ext>
     </p:extLst>
   </p:cSld>
   <p:clrMapOvr>
     <a:masterClrMapping/>
   </p:clrMapOvr>
+  <p:transition spd="med">
+    <p:fade/>
+  </p:transition>
   <p:timing>
     <p:tnLst>
       <p:par>

</xml_diff>